<commit_message>
Added Donovan & Kernigan book
</commit_message>
<xml_diff>
--- a/documentations/learning-go.pptx
+++ b/documentations/learning-go.pptx
@@ -9373,7 +9373,6 @@
               <a:rPr lang="fr-FR" dirty="0" smtClean="0"/>
               <a:t>L'import d'un package se fait par son chemin d'importation et peut préciser soit une bibliothèque standard, soit également des packages tiers installés dans des dépôts de sources distants (actuellement supporté : dépôt sous svn, git, mercurial et bazaar)</a:t>
             </a:r>
-            <a:endParaRPr lang="fr-FR" dirty="0" smtClean="0"/>
           </a:p>
         </p:txBody>
       </p:sp>
@@ -9831,8 +9830,23 @@
             </a:r>
             <a:r>
               <a:rPr lang="fr-FR" dirty="0"/>
-              <a:t>https://fr.wikipedia.org/wiki/Go_(langage)</a:t>
-            </a:r>
+              <a:t>https://fr.wikipedia.org/wiki/Go_(langage</a:t>
+            </a:r>
+            <a:r>
+              <a:rPr lang="fr-FR" dirty="0" smtClean="0"/>
+              <a:t>)</a:t>
+            </a:r>
+          </a:p>
+          <a:p>
+            <a:r>
+              <a:rPr lang="fr-FR" dirty="0" smtClean="0"/>
+              <a:t>The Go Programming Language : Donovan, </a:t>
+            </a:r>
+            <a:r>
+              <a:rPr lang="fr-FR" dirty="0" err="1" smtClean="0"/>
+              <a:t>Kernigan</a:t>
+            </a:r>
+            <a:endParaRPr lang="fr-FR" dirty="0"/>
           </a:p>
         </p:txBody>
       </p:sp>

</xml_diff>

<commit_message>
Added fmt.Printx() returned values
</commit_message>
<xml_diff>
--- a/documentations/learning-go.pptx
+++ b/documentations/learning-go.pptx
@@ -11666,9 +11666,27 @@
                   <a:schemeClr val="tx1"/>
                 </a:solidFill>
               </a:rPr>
-              <a:t> affiche vers la console, sans caractère fin de ligne et accepte une chaine de format</a:t>
-            </a:r>
-            <a:endParaRPr lang="fr-FR" b="1" i="1" dirty="0" smtClean="0">
+              <a:t> affiche vers la console, sans caractère fin de ligne et accepte une chaine de </a:t>
+            </a:r>
+            <a:r>
+              <a:rPr lang="fr-FR" dirty="0" smtClean="0">
+                <a:solidFill>
+                  <a:schemeClr val="tx1"/>
+                </a:solidFill>
+              </a:rPr>
+              <a:t>format</a:t>
+            </a:r>
+          </a:p>
+          <a:p>
+            <a:r>
+              <a:rPr lang="fr-FR" dirty="0" smtClean="0">
+                <a:solidFill>
+                  <a:schemeClr val="tx1"/>
+                </a:solidFill>
+              </a:rPr>
+              <a:t>Ces fonctions retournent le nombre d'octets écrits et un code d'erreur</a:t>
+            </a:r>
+            <a:endParaRPr lang="fr-FR" dirty="0" smtClean="0">
               <a:solidFill>
                 <a:schemeClr val="accent6"/>
               </a:solidFill>
@@ -11692,7 +11710,7 @@
       </p:sp>
       <p:pic>
         <p:nvPicPr>
-          <p:cNvPr id="4" name="Image 3"/>
+          <p:cNvPr id="5" name="Image 4"/>
           <p:cNvPicPr>
             <a:picLocks noChangeAspect="1"/>
           </p:cNvPicPr>
@@ -11706,8 +11724,8 @@
         </p:blipFill>
         <p:spPr>
           <a:xfrm>
-            <a:off x="6364854" y="1577588"/>
-            <a:ext cx="5600700" cy="5086350"/>
+            <a:off x="6264257" y="1516296"/>
+            <a:ext cx="5620209" cy="4493278"/>
           </a:xfrm>
           <a:prstGeom prst="rect">
             <a:avLst/>

</xml_diff>

<commit_message>
Added maps of maps
</commit_message>
<xml_diff>
--- a/documentations/learning-go.pptx
+++ b/documentations/learning-go.pptx
@@ -5,7 +5,7 @@
     <p:sldMasterId id="2147483665" r:id="rId1"/>
   </p:sldMasterIdLst>
   <p:notesMasterIdLst>
-    <p:notesMasterId r:id="rId49"/>
+    <p:notesMasterId r:id="rId50"/>
   </p:notesMasterIdLst>
   <p:sldIdLst>
     <p:sldId id="256" r:id="rId2"/>
@@ -54,7 +54,8 @@
     <p:sldId id="300" r:id="rId45"/>
     <p:sldId id="301" r:id="rId46"/>
     <p:sldId id="302" r:id="rId47"/>
-    <p:sldId id="267" r:id="rId48"/>
+    <p:sldId id="303" r:id="rId48"/>
+    <p:sldId id="267" r:id="rId49"/>
   </p:sldIdLst>
   <p:sldSz cx="12192000" cy="6858000"/>
   <p:notesSz cx="6858000" cy="9144000"/>
@@ -16798,6 +16799,119 @@
           <a:p>
             <a:r>
               <a:rPr lang="fr-FR" dirty="0" smtClean="0"/>
+              <a:t>Maps of maps</a:t>
+            </a:r>
+            <a:endParaRPr lang="fr-FR" dirty="0"/>
+          </a:p>
+        </p:txBody>
+      </p:sp>
+      <p:pic>
+        <p:nvPicPr>
+          <p:cNvPr id="7" name="Image 6"/>
+          <p:cNvPicPr>
+            <a:picLocks noChangeAspect="1"/>
+          </p:cNvPicPr>
+          <p:nvPr/>
+        </p:nvPicPr>
+        <p:blipFill>
+          <a:blip r:embed="rId2"/>
+          <a:stretch>
+            <a:fillRect/>
+          </a:stretch>
+        </p:blipFill>
+        <p:spPr>
+          <a:xfrm>
+            <a:off x="1844703" y="1354579"/>
+            <a:ext cx="6063282" cy="4962732"/>
+          </a:xfrm>
+          <a:prstGeom prst="rect">
+            <a:avLst/>
+          </a:prstGeom>
+        </p:spPr>
+      </p:pic>
+      <p:pic>
+        <p:nvPicPr>
+          <p:cNvPr id="8" name="Image 7"/>
+          <p:cNvPicPr>
+            <a:picLocks noChangeAspect="1"/>
+          </p:cNvPicPr>
+          <p:nvPr/>
+        </p:nvPicPr>
+        <p:blipFill>
+          <a:blip r:embed="rId3"/>
+          <a:stretch>
+            <a:fillRect/>
+          </a:stretch>
+        </p:blipFill>
+        <p:spPr>
+          <a:xfrm>
+            <a:off x="8018600" y="3621985"/>
+            <a:ext cx="3629025" cy="647700"/>
+          </a:xfrm>
+          <a:prstGeom prst="rect">
+            <a:avLst/>
+          </a:prstGeom>
+        </p:spPr>
+      </p:pic>
+    </p:spTree>
+    <p:extLst>
+      <p:ext uri="{BB962C8B-B14F-4D97-AF65-F5344CB8AC3E}">
+        <p14:creationId xmlns:p14="http://schemas.microsoft.com/office/powerpoint/2010/main" val="299311231"/>
+      </p:ext>
+    </p:extLst>
+  </p:cSld>
+  <p:clrMapOvr>
+    <a:masterClrMapping/>
+  </p:clrMapOvr>
+  <p:timing>
+    <p:tnLst>
+      <p:par>
+        <p:cTn id="1" dur="indefinite" restart="never" nodeType="tmRoot"/>
+      </p:par>
+    </p:tnLst>
+  </p:timing>
+</p:sld>
+</file>
+
+<file path=ppt/slides/slide48.xml><?xml version="1.0" encoding="utf-8"?>
+<p:sld xmlns:a="http://schemas.openxmlformats.org/drawingml/2006/main" xmlns:r="http://schemas.openxmlformats.org/officeDocument/2006/relationships" xmlns:p="http://schemas.openxmlformats.org/presentationml/2006/main">
+  <p:cSld>
+    <p:spTree>
+      <p:nvGrpSpPr>
+        <p:cNvPr id="1" name=""/>
+        <p:cNvGrpSpPr/>
+        <p:nvPr/>
+      </p:nvGrpSpPr>
+      <p:grpSpPr>
+        <a:xfrm>
+          <a:off x="0" y="0"/>
+          <a:ext cx="0" cy="0"/>
+          <a:chOff x="0" y="0"/>
+          <a:chExt cx="0" cy="0"/>
+        </a:xfrm>
+      </p:grpSpPr>
+      <p:sp>
+        <p:nvSpPr>
+          <p:cNvPr id="2" name="Titre 1"/>
+          <p:cNvSpPr>
+            <a:spLocks noGrp="1"/>
+          </p:cNvSpPr>
+          <p:nvPr>
+            <p:ph type="title"/>
+          </p:nvPr>
+        </p:nvSpPr>
+        <p:spPr>
+          <a:xfrm>
+            <a:off x="2592925" y="624110"/>
+            <a:ext cx="8911687" cy="1280890"/>
+          </a:xfrm>
+        </p:spPr>
+        <p:txBody>
+          <a:bodyPr/>
+          <a:lstStyle/>
+          <a:p>
+            <a:r>
+              <a:rPr lang="fr-FR" dirty="0" smtClean="0"/>
               <a:t>Références</a:t>
             </a:r>
             <a:endParaRPr lang="fr-FR" dirty="0"/>

</xml_diff>

<commit_message>
Updated recursive functions (Syracuse)
</commit_message>
<xml_diff>
--- a/documentations/learning-go.pptx
+++ b/documentations/learning-go.pptx
@@ -5,7 +5,7 @@
     <p:sldMasterId id="2147483665" r:id="rId1"/>
   </p:sldMasterIdLst>
   <p:notesMasterIdLst>
-    <p:notesMasterId r:id="rId60"/>
+    <p:notesMasterId r:id="rId61"/>
   </p:notesMasterIdLst>
   <p:sldIdLst>
     <p:sldId id="256" r:id="rId2"/>
@@ -65,7 +65,8 @@
     <p:sldId id="311" r:id="rId56"/>
     <p:sldId id="312" r:id="rId57"/>
     <p:sldId id="313" r:id="rId58"/>
-    <p:sldId id="267" r:id="rId59"/>
+    <p:sldId id="314" r:id="rId59"/>
+    <p:sldId id="267" r:id="rId60"/>
   </p:sldIdLst>
   <p:sldSz cx="12192000" cy="6858000"/>
   <p:notesSz cx="6858000" cy="9144000"/>
@@ -21004,6 +21005,118 @@
       </p:grpSpPr>
       <p:sp>
         <p:nvSpPr>
+          <p:cNvPr id="3" name="Titre 2"/>
+          <p:cNvSpPr>
+            <a:spLocks noGrp="1"/>
+          </p:cNvSpPr>
+          <p:nvPr>
+            <p:ph type="title"/>
+          </p:nvPr>
+        </p:nvSpPr>
+        <p:spPr/>
+        <p:txBody>
+          <a:bodyPr/>
+          <a:lstStyle/>
+          <a:p>
+            <a:r>
+              <a:rPr lang="fr-FR" dirty="0" smtClean="0"/>
+              <a:t>Récursivité </a:t>
+            </a:r>
+            <a:r>
+              <a:rPr lang="fr-FR" dirty="0" smtClean="0"/>
+              <a:t>(Suite de Syracuse)</a:t>
+            </a:r>
+            <a:endParaRPr lang="fr-FR" dirty="0"/>
+          </a:p>
+        </p:txBody>
+      </p:sp>
+      <p:pic>
+        <p:nvPicPr>
+          <p:cNvPr id="2" name="Image 1"/>
+          <p:cNvPicPr>
+            <a:picLocks noChangeAspect="1"/>
+          </p:cNvPicPr>
+          <p:nvPr/>
+        </p:nvPicPr>
+        <p:blipFill>
+          <a:blip r:embed="rId2"/>
+          <a:stretch>
+            <a:fillRect/>
+          </a:stretch>
+        </p:blipFill>
+        <p:spPr>
+          <a:xfrm>
+            <a:off x="4773825" y="2059388"/>
+            <a:ext cx="4549884" cy="2734585"/>
+          </a:xfrm>
+          <a:prstGeom prst="rect">
+            <a:avLst/>
+          </a:prstGeom>
+        </p:spPr>
+      </p:pic>
+      <p:pic>
+        <p:nvPicPr>
+          <p:cNvPr id="4" name="Image 3"/>
+          <p:cNvPicPr>
+            <a:picLocks noChangeAspect="1"/>
+          </p:cNvPicPr>
+          <p:nvPr/>
+        </p:nvPicPr>
+        <p:blipFill>
+          <a:blip r:embed="rId3"/>
+          <a:stretch>
+            <a:fillRect/>
+          </a:stretch>
+        </p:blipFill>
+        <p:spPr>
+          <a:xfrm>
+            <a:off x="3838842" y="5526778"/>
+            <a:ext cx="6419850" cy="257175"/>
+          </a:xfrm>
+          <a:prstGeom prst="rect">
+            <a:avLst/>
+          </a:prstGeom>
+        </p:spPr>
+      </p:pic>
+    </p:spTree>
+    <p:extLst>
+      <p:ext uri="{BB962C8B-B14F-4D97-AF65-F5344CB8AC3E}">
+        <p14:creationId xmlns:p14="http://schemas.microsoft.com/office/powerpoint/2010/main" val="4188158472"/>
+      </p:ext>
+    </p:extLst>
+  </p:cSld>
+  <p:clrMapOvr>
+    <a:masterClrMapping/>
+  </p:clrMapOvr>
+  <p:timing>
+    <p:tnLst>
+      <p:par>
+        <p:cTn id="1" dur="indefinite" restart="never" nodeType="tmRoot"/>
+      </p:par>
+    </p:tnLst>
+  </p:timing>
+</p:sld>
+</file>
+
+<file path=ppt/slides/slide59.xml><?xml version="1.0" encoding="utf-8"?>
+<p:sld xmlns:a="http://schemas.openxmlformats.org/drawingml/2006/main" xmlns:r="http://schemas.openxmlformats.org/officeDocument/2006/relationships" xmlns:p="http://schemas.openxmlformats.org/presentationml/2006/main">
+  <p:cSld>
+    <p:spTree>
+      <p:nvGrpSpPr>
+        <p:cNvPr id="1" name=""/>
+        <p:cNvGrpSpPr/>
+        <p:nvPr/>
+      </p:nvGrpSpPr>
+      <p:grpSpPr>
+        <a:xfrm>
+          <a:off x="0" y="0"/>
+          <a:ext cx="0" cy="0"/>
+          <a:chOff x="0" y="0"/>
+          <a:chExt cx="0" cy="0"/>
+        </a:xfrm>
+      </p:grpSpPr>
+      <p:sp>
+        <p:nvSpPr>
           <p:cNvPr id="2" name="Titre 1"/>
           <p:cNvSpPr>
             <a:spLocks noGrp="1"/>

</xml_diff>

<commit_message>
Added internal folder to the project structure Moved pkg.math to internal/math
</commit_message>
<xml_diff>
--- a/documentations/learning-go.pptx
+++ b/documentations/learning-go.pptx
@@ -2107,6 +2107,195 @@
         </a:p>
       </dgm:t>
     </dgm:pt>
+    <dgm:pt modelId="{760883ED-A9BB-405E-8F20-AFD9CCB96229}">
+      <dgm:prSet custT="1"/>
+      <dgm:spPr/>
+      <dgm:t>
+        <a:bodyPr/>
+        <a:lstStyle/>
+        <a:p>
+          <a:r>
+            <a:rPr lang="fr-FR" sz="1000" dirty="0" err="1" smtClean="0"/>
+            <a:t>internal</a:t>
+          </a:r>
+          <a:r>
+            <a:rPr lang="fr-FR" sz="1000" dirty="0" smtClean="0"/>
+            <a:t> &lt;dir&gt;</a:t>
+          </a:r>
+          <a:endParaRPr lang="fr-FR" sz="1000" dirty="0"/>
+        </a:p>
+      </dgm:t>
+    </dgm:pt>
+    <dgm:pt modelId="{0FBFC397-7581-450D-9E09-11221034CB1F}" type="parTrans" cxnId="{29DB230F-6B91-4402-A027-6BCE177E020B}">
+      <dgm:prSet/>
+      <dgm:spPr/>
+      <dgm:t>
+        <a:bodyPr/>
+        <a:lstStyle/>
+        <a:p>
+          <a:endParaRPr lang="fr-FR"/>
+        </a:p>
+      </dgm:t>
+    </dgm:pt>
+    <dgm:pt modelId="{491C78DF-55D3-4DFF-A2B3-D13610BF38C8}" type="sibTrans" cxnId="{29DB230F-6B91-4402-A027-6BCE177E020B}">
+      <dgm:prSet/>
+      <dgm:spPr/>
+      <dgm:t>
+        <a:bodyPr/>
+        <a:lstStyle/>
+        <a:p>
+          <a:endParaRPr lang="fr-FR"/>
+        </a:p>
+      </dgm:t>
+    </dgm:pt>
+    <dgm:pt modelId="{D6A6EF0D-3890-4564-B47F-BA7E2FFC336B}">
+      <dgm:prSet custT="1"/>
+      <dgm:spPr/>
+      <dgm:t>
+        <a:bodyPr/>
+        <a:lstStyle/>
+        <a:p>
+          <a:r>
+            <a:rPr lang="fr-FR" sz="1000" dirty="0" smtClean="0"/>
+            <a:t>packname&lt;dir&gt;</a:t>
+          </a:r>
+          <a:endParaRPr lang="fr-FR" sz="1000" dirty="0"/>
+        </a:p>
+      </dgm:t>
+    </dgm:pt>
+    <dgm:pt modelId="{BF2ECC47-8959-4178-94DF-C185E2DEE5DE}" type="parTrans" cxnId="{1512EAA9-05D3-4B46-92EE-0556A01DE870}">
+      <dgm:prSet/>
+      <dgm:spPr/>
+      <dgm:t>
+        <a:bodyPr/>
+        <a:lstStyle/>
+        <a:p>
+          <a:endParaRPr lang="fr-FR"/>
+        </a:p>
+      </dgm:t>
+    </dgm:pt>
+    <dgm:pt modelId="{E955CF51-D20A-4EAE-9C1A-064DCE94EDD5}" type="sibTrans" cxnId="{1512EAA9-05D3-4B46-92EE-0556A01DE870}">
+      <dgm:prSet/>
+      <dgm:spPr/>
+      <dgm:t>
+        <a:bodyPr/>
+        <a:lstStyle/>
+        <a:p>
+          <a:endParaRPr lang="fr-FR"/>
+        </a:p>
+      </dgm:t>
+    </dgm:pt>
+    <dgm:pt modelId="{D81D785B-9DE7-4820-AFB6-E6C98C246EFC}">
+      <dgm:prSet custT="1"/>
+      <dgm:spPr/>
+      <dgm:t>
+        <a:bodyPr/>
+        <a:lstStyle/>
+        <a:p>
+          <a:r>
+            <a:rPr lang="fr-FR" sz="1000" dirty="0" smtClean="0"/>
+            <a:t>…</a:t>
+          </a:r>
+          <a:endParaRPr lang="fr-FR" sz="1000" dirty="0"/>
+        </a:p>
+      </dgm:t>
+    </dgm:pt>
+    <dgm:pt modelId="{4E2FF37E-EF9E-4E13-A343-A28FDBF48B26}" type="parTrans" cxnId="{A9D5B926-42E6-4193-AE27-EE8D84ABA3B7}">
+      <dgm:prSet/>
+      <dgm:spPr/>
+      <dgm:t>
+        <a:bodyPr/>
+        <a:lstStyle/>
+        <a:p>
+          <a:endParaRPr lang="fr-FR"/>
+        </a:p>
+      </dgm:t>
+    </dgm:pt>
+    <dgm:pt modelId="{89B4AE6E-7A37-4304-A076-D03A56D9A3D5}" type="sibTrans" cxnId="{A9D5B926-42E6-4193-AE27-EE8D84ABA3B7}">
+      <dgm:prSet/>
+      <dgm:spPr/>
+      <dgm:t>
+        <a:bodyPr/>
+        <a:lstStyle/>
+        <a:p>
+          <a:endParaRPr lang="fr-FR"/>
+        </a:p>
+      </dgm:t>
+    </dgm:pt>
+    <dgm:pt modelId="{C971CB4A-ACE5-46F8-AE5B-3AFE92D0959D}">
+      <dgm:prSet custT="1"/>
+      <dgm:spPr/>
+      <dgm:t>
+        <a:bodyPr/>
+        <a:lstStyle/>
+        <a:p>
+          <a:r>
+            <a:rPr lang="fr-FR" sz="1000" dirty="0" smtClean="0"/>
+            <a:t>.go</a:t>
+          </a:r>
+          <a:endParaRPr lang="fr-FR" sz="1000" dirty="0"/>
+        </a:p>
+      </dgm:t>
+    </dgm:pt>
+    <dgm:pt modelId="{DB9EFE37-A36C-430A-8B47-88C287516F23}" type="parTrans" cxnId="{6CA32B3D-2E12-4AB3-A420-EDC30F748704}">
+      <dgm:prSet/>
+      <dgm:spPr/>
+      <dgm:t>
+        <a:bodyPr/>
+        <a:lstStyle/>
+        <a:p>
+          <a:endParaRPr lang="fr-FR"/>
+        </a:p>
+      </dgm:t>
+    </dgm:pt>
+    <dgm:pt modelId="{5690AA9A-114B-4FAC-8D60-A56F159BD628}" type="sibTrans" cxnId="{6CA32B3D-2E12-4AB3-A420-EDC30F748704}">
+      <dgm:prSet/>
+      <dgm:spPr/>
+      <dgm:t>
+        <a:bodyPr/>
+        <a:lstStyle/>
+        <a:p>
+          <a:endParaRPr lang="fr-FR"/>
+        </a:p>
+      </dgm:t>
+    </dgm:pt>
+    <dgm:pt modelId="{322F58AD-DE9A-4B44-9BA0-D689707D8FD4}">
+      <dgm:prSet custT="1"/>
+      <dgm:spPr/>
+      <dgm:t>
+        <a:bodyPr/>
+        <a:lstStyle/>
+        <a:p>
+          <a:r>
+            <a:rPr lang="fr-FR" sz="1000" dirty="0" smtClean="0"/>
+            <a:t>…</a:t>
+          </a:r>
+          <a:endParaRPr lang="fr-FR" sz="1000" dirty="0"/>
+        </a:p>
+      </dgm:t>
+    </dgm:pt>
+    <dgm:pt modelId="{34FEF89F-3256-4364-AB80-02C4079D03DE}" type="parTrans" cxnId="{18178193-528B-483B-8C56-EC85A91D43B0}">
+      <dgm:prSet/>
+      <dgm:spPr/>
+      <dgm:t>
+        <a:bodyPr/>
+        <a:lstStyle/>
+        <a:p>
+          <a:endParaRPr lang="fr-FR"/>
+        </a:p>
+      </dgm:t>
+    </dgm:pt>
+    <dgm:pt modelId="{F418BD0F-7D67-4ABD-A1AE-C465AAE64CE7}" type="sibTrans" cxnId="{18178193-528B-483B-8C56-EC85A91D43B0}">
+      <dgm:prSet/>
+      <dgm:spPr/>
+      <dgm:t>
+        <a:bodyPr/>
+        <a:lstStyle/>
+        <a:p>
+          <a:endParaRPr lang="fr-FR"/>
+        </a:p>
+      </dgm:t>
+    </dgm:pt>
     <dgm:pt modelId="{9F3D299C-912D-48E4-AE76-DBF8471D0058}" type="pres">
       <dgm:prSet presAssocID="{DF616C12-DFC6-40E5-BC46-E77E630699CC}" presName="Name0" presStyleCnt="0">
         <dgm:presLayoutVars>
@@ -2504,7 +2693,7 @@
       <dgm:spPr/>
     </dgm:pt>
     <dgm:pt modelId="{9D957ECC-C536-4171-9E3F-ADA463C520DE}" type="pres">
-      <dgm:prSet presAssocID="{62B13B07-F327-4E52-AE5C-A801CC6497E5}" presName="conn2-1" presStyleLbl="parChTrans1D4" presStyleIdx="0" presStyleCnt="20"/>
+      <dgm:prSet presAssocID="{62B13B07-F327-4E52-AE5C-A801CC6497E5}" presName="conn2-1" presStyleLbl="parChTrans1D4" presStyleIdx="0" presStyleCnt="25"/>
       <dgm:spPr/>
       <dgm:t>
         <a:bodyPr/>
@@ -2515,7 +2704,7 @@
       </dgm:t>
     </dgm:pt>
     <dgm:pt modelId="{5538A203-67B7-43B0-B95B-E0940F75E978}" type="pres">
-      <dgm:prSet presAssocID="{62B13B07-F327-4E52-AE5C-A801CC6497E5}" presName="connTx" presStyleLbl="parChTrans1D4" presStyleIdx="0" presStyleCnt="20"/>
+      <dgm:prSet presAssocID="{62B13B07-F327-4E52-AE5C-A801CC6497E5}" presName="connTx" presStyleLbl="parChTrans1D4" presStyleIdx="0" presStyleCnt="25"/>
       <dgm:spPr/>
       <dgm:t>
         <a:bodyPr/>
@@ -2530,7 +2719,7 @@
       <dgm:spPr/>
     </dgm:pt>
     <dgm:pt modelId="{D13E8E78-0981-47B7-B509-860D838BA781}" type="pres">
-      <dgm:prSet presAssocID="{8DC7735B-9A6C-431C-92AA-042288E1B6AF}" presName="LevelTwoTextNode" presStyleLbl="node4" presStyleIdx="0" presStyleCnt="20">
+      <dgm:prSet presAssocID="{8DC7735B-9A6C-431C-92AA-042288E1B6AF}" presName="LevelTwoTextNode" presStyleLbl="node4" presStyleIdx="0" presStyleCnt="25">
         <dgm:presLayoutVars>
           <dgm:chPref val="3"/>
         </dgm:presLayoutVars>
@@ -2549,7 +2738,7 @@
       <dgm:spPr/>
     </dgm:pt>
     <dgm:pt modelId="{E6122314-4232-42C9-987E-46FE0FA3495B}" type="pres">
-      <dgm:prSet presAssocID="{DEA1A0C5-BE8D-4B82-B1D8-B4B9DCF4CE1A}" presName="conn2-1" presStyleLbl="parChTrans1D4" presStyleIdx="1" presStyleCnt="20"/>
+      <dgm:prSet presAssocID="{DEA1A0C5-BE8D-4B82-B1D8-B4B9DCF4CE1A}" presName="conn2-1" presStyleLbl="parChTrans1D4" presStyleIdx="1" presStyleCnt="25"/>
       <dgm:spPr/>
       <dgm:t>
         <a:bodyPr/>
@@ -2560,7 +2749,7 @@
       </dgm:t>
     </dgm:pt>
     <dgm:pt modelId="{48AB6F3C-59DC-47D0-9C0E-C348A271EF25}" type="pres">
-      <dgm:prSet presAssocID="{DEA1A0C5-BE8D-4B82-B1D8-B4B9DCF4CE1A}" presName="connTx" presStyleLbl="parChTrans1D4" presStyleIdx="1" presStyleCnt="20"/>
+      <dgm:prSet presAssocID="{DEA1A0C5-BE8D-4B82-B1D8-B4B9DCF4CE1A}" presName="connTx" presStyleLbl="parChTrans1D4" presStyleIdx="1" presStyleCnt="25"/>
       <dgm:spPr/>
       <dgm:t>
         <a:bodyPr/>
@@ -2575,7 +2764,7 @@
       <dgm:spPr/>
     </dgm:pt>
     <dgm:pt modelId="{2293E997-8A42-4DE4-AFF5-CE2F2C46F300}" type="pres">
-      <dgm:prSet presAssocID="{DE9229B0-83CB-4AFE-B09E-2D25B676FB5D}" presName="LevelTwoTextNode" presStyleLbl="node4" presStyleIdx="1" presStyleCnt="20">
+      <dgm:prSet presAssocID="{DE9229B0-83CB-4AFE-B09E-2D25B676FB5D}" presName="LevelTwoTextNode" presStyleLbl="node4" presStyleIdx="1" presStyleCnt="25">
         <dgm:presLayoutVars>
           <dgm:chPref val="3"/>
         </dgm:presLayoutVars>
@@ -2594,7 +2783,7 @@
       <dgm:spPr/>
     </dgm:pt>
     <dgm:pt modelId="{F61ED2EA-3DCB-4BDF-974A-6D38D5B018AB}" type="pres">
-      <dgm:prSet presAssocID="{30687554-7B6A-4E42-B0D8-856A3E451C97}" presName="conn2-1" presStyleLbl="parChTrans1D4" presStyleIdx="2" presStyleCnt="20"/>
+      <dgm:prSet presAssocID="{30687554-7B6A-4E42-B0D8-856A3E451C97}" presName="conn2-1" presStyleLbl="parChTrans1D4" presStyleIdx="2" presStyleCnt="25"/>
       <dgm:spPr/>
       <dgm:t>
         <a:bodyPr/>
@@ -2605,7 +2794,7 @@
       </dgm:t>
     </dgm:pt>
     <dgm:pt modelId="{B46CE3C4-D8FC-4818-B7F0-507EA6A00C10}" type="pres">
-      <dgm:prSet presAssocID="{30687554-7B6A-4E42-B0D8-856A3E451C97}" presName="connTx" presStyleLbl="parChTrans1D4" presStyleIdx="2" presStyleCnt="20"/>
+      <dgm:prSet presAssocID="{30687554-7B6A-4E42-B0D8-856A3E451C97}" presName="connTx" presStyleLbl="parChTrans1D4" presStyleIdx="2" presStyleCnt="25"/>
       <dgm:spPr/>
       <dgm:t>
         <a:bodyPr/>
@@ -2620,7 +2809,7 @@
       <dgm:spPr/>
     </dgm:pt>
     <dgm:pt modelId="{44701C57-D211-4D71-857F-299A0D735E28}" type="pres">
-      <dgm:prSet presAssocID="{9DF11BE9-0A90-4730-8388-20A441D98114}" presName="LevelTwoTextNode" presStyleLbl="node4" presStyleIdx="2" presStyleCnt="20">
+      <dgm:prSet presAssocID="{9DF11BE9-0A90-4730-8388-20A441D98114}" presName="LevelTwoTextNode" presStyleLbl="node4" presStyleIdx="2" presStyleCnt="25">
         <dgm:presLayoutVars>
           <dgm:chPref val="3"/>
         </dgm:presLayoutVars>
@@ -2639,7 +2828,7 @@
       <dgm:spPr/>
     </dgm:pt>
     <dgm:pt modelId="{EF1303F6-08C0-48FA-B58F-D294B3FD0956}" type="pres">
-      <dgm:prSet presAssocID="{B585FA61-ABCC-4C00-904E-F590963CA53E}" presName="conn2-1" presStyleLbl="parChTrans1D4" presStyleIdx="3" presStyleCnt="20"/>
+      <dgm:prSet presAssocID="{B585FA61-ABCC-4C00-904E-F590963CA53E}" presName="conn2-1" presStyleLbl="parChTrans1D4" presStyleIdx="3" presStyleCnt="25"/>
       <dgm:spPr/>
       <dgm:t>
         <a:bodyPr/>
@@ -2650,7 +2839,7 @@
       </dgm:t>
     </dgm:pt>
     <dgm:pt modelId="{1E06D912-FF04-489C-8B3E-C635F21EF1DC}" type="pres">
-      <dgm:prSet presAssocID="{B585FA61-ABCC-4C00-904E-F590963CA53E}" presName="connTx" presStyleLbl="parChTrans1D4" presStyleIdx="3" presStyleCnt="20"/>
+      <dgm:prSet presAssocID="{B585FA61-ABCC-4C00-904E-F590963CA53E}" presName="connTx" presStyleLbl="parChTrans1D4" presStyleIdx="3" presStyleCnt="25"/>
       <dgm:spPr/>
       <dgm:t>
         <a:bodyPr/>
@@ -2665,7 +2854,7 @@
       <dgm:spPr/>
     </dgm:pt>
     <dgm:pt modelId="{1297A119-EB00-45FB-9E4C-7081D9FC3578}" type="pres">
-      <dgm:prSet presAssocID="{2CFC024F-40D5-4978-B0D2-5F1E40D4091C}" presName="LevelTwoTextNode" presStyleLbl="node4" presStyleIdx="3" presStyleCnt="20">
+      <dgm:prSet presAssocID="{2CFC024F-40D5-4978-B0D2-5F1E40D4091C}" presName="LevelTwoTextNode" presStyleLbl="node4" presStyleIdx="3" presStyleCnt="25">
         <dgm:presLayoutVars>
           <dgm:chPref val="3"/>
         </dgm:presLayoutVars>
@@ -2684,7 +2873,7 @@
       <dgm:spPr/>
     </dgm:pt>
     <dgm:pt modelId="{11A95FA8-BC12-4F2B-93AC-994CC23CB247}" type="pres">
-      <dgm:prSet presAssocID="{997BBB56-0F09-47A1-9EDD-84E73DDCE053}" presName="conn2-1" presStyleLbl="parChTrans1D4" presStyleIdx="4" presStyleCnt="20"/>
+      <dgm:prSet presAssocID="{997BBB56-0F09-47A1-9EDD-84E73DDCE053}" presName="conn2-1" presStyleLbl="parChTrans1D4" presStyleIdx="4" presStyleCnt="25"/>
       <dgm:spPr/>
       <dgm:t>
         <a:bodyPr/>
@@ -2695,7 +2884,7 @@
       </dgm:t>
     </dgm:pt>
     <dgm:pt modelId="{416BF9B8-9B9E-4EDB-8EEE-AD34B69DF4A3}" type="pres">
-      <dgm:prSet presAssocID="{997BBB56-0F09-47A1-9EDD-84E73DDCE053}" presName="connTx" presStyleLbl="parChTrans1D4" presStyleIdx="4" presStyleCnt="20"/>
+      <dgm:prSet presAssocID="{997BBB56-0F09-47A1-9EDD-84E73DDCE053}" presName="connTx" presStyleLbl="parChTrans1D4" presStyleIdx="4" presStyleCnt="25"/>
       <dgm:spPr/>
       <dgm:t>
         <a:bodyPr/>
@@ -2710,7 +2899,7 @@
       <dgm:spPr/>
     </dgm:pt>
     <dgm:pt modelId="{EFF0FDCC-9734-4C94-840C-8D241B8150A8}" type="pres">
-      <dgm:prSet presAssocID="{75A5C761-B220-40FF-A8F1-BDF368427E79}" presName="LevelTwoTextNode" presStyleLbl="node4" presStyleIdx="4" presStyleCnt="20">
+      <dgm:prSet presAssocID="{75A5C761-B220-40FF-A8F1-BDF368427E79}" presName="LevelTwoTextNode" presStyleLbl="node4" presStyleIdx="4" presStyleCnt="25">
         <dgm:presLayoutVars>
           <dgm:chPref val="3"/>
         </dgm:presLayoutVars>
@@ -2892,7 +3081,7 @@
       </dgm:t>
     </dgm:pt>
     <dgm:pt modelId="{E0BC23FD-A123-4F6F-B29F-B1B1A8DCFCAA}" type="pres">
-      <dgm:prSet presAssocID="{49D92B24-F087-4E31-A4F6-E7772D5AF36E}" presName="conn2-1" presStyleLbl="parChTrans1D4" presStyleIdx="5" presStyleCnt="20"/>
+      <dgm:prSet presAssocID="{49D92B24-F087-4E31-A4F6-E7772D5AF36E}" presName="conn2-1" presStyleLbl="parChTrans1D4" presStyleIdx="5" presStyleCnt="25"/>
       <dgm:spPr/>
       <dgm:t>
         <a:bodyPr/>
@@ -2903,7 +3092,7 @@
       </dgm:t>
     </dgm:pt>
     <dgm:pt modelId="{2D6B1399-BFF2-49EA-9491-3E6335B75829}" type="pres">
-      <dgm:prSet presAssocID="{49D92B24-F087-4E31-A4F6-E7772D5AF36E}" presName="connTx" presStyleLbl="parChTrans1D4" presStyleIdx="5" presStyleCnt="20"/>
+      <dgm:prSet presAssocID="{49D92B24-F087-4E31-A4F6-E7772D5AF36E}" presName="connTx" presStyleLbl="parChTrans1D4" presStyleIdx="5" presStyleCnt="25"/>
       <dgm:spPr/>
       <dgm:t>
         <a:bodyPr/>
@@ -2925,7 +3114,7 @@
       </dgm:t>
     </dgm:pt>
     <dgm:pt modelId="{71B02E8A-448E-4584-80E9-059B52DDB850}" type="pres">
-      <dgm:prSet presAssocID="{B9FBD615-B794-4D86-840E-D8BA2BA2AF71}" presName="LevelTwoTextNode" presStyleLbl="node4" presStyleIdx="5" presStyleCnt="20">
+      <dgm:prSet presAssocID="{B9FBD615-B794-4D86-840E-D8BA2BA2AF71}" presName="LevelTwoTextNode" presStyleLbl="node4" presStyleIdx="5" presStyleCnt="25">
         <dgm:presLayoutVars>
           <dgm:chPref val="3"/>
         </dgm:presLayoutVars>
@@ -2951,7 +3140,7 @@
       </dgm:t>
     </dgm:pt>
     <dgm:pt modelId="{6FB29898-0152-4460-9FA2-C023B30AA889}" type="pres">
-      <dgm:prSet presAssocID="{D03DBC73-9966-47D9-8ACA-08F2AE277311}" presName="conn2-1" presStyleLbl="parChTrans1D4" presStyleIdx="6" presStyleCnt="20"/>
+      <dgm:prSet presAssocID="{D03DBC73-9966-47D9-8ACA-08F2AE277311}" presName="conn2-1" presStyleLbl="parChTrans1D4" presStyleIdx="6" presStyleCnt="25"/>
       <dgm:spPr/>
       <dgm:t>
         <a:bodyPr/>
@@ -2962,7 +3151,7 @@
       </dgm:t>
     </dgm:pt>
     <dgm:pt modelId="{3C88D30A-236C-421C-8732-EB921582DAAC}" type="pres">
-      <dgm:prSet presAssocID="{D03DBC73-9966-47D9-8ACA-08F2AE277311}" presName="connTx" presStyleLbl="parChTrans1D4" presStyleIdx="6" presStyleCnt="20"/>
+      <dgm:prSet presAssocID="{D03DBC73-9966-47D9-8ACA-08F2AE277311}" presName="connTx" presStyleLbl="parChTrans1D4" presStyleIdx="6" presStyleCnt="25"/>
       <dgm:spPr/>
       <dgm:t>
         <a:bodyPr/>
@@ -2984,7 +3173,7 @@
       </dgm:t>
     </dgm:pt>
     <dgm:pt modelId="{1A4238F2-78DE-41D2-AD7D-244E70141D53}" type="pres">
-      <dgm:prSet presAssocID="{1B24B018-AD53-4723-9DBC-CD780D3AF7E6}" presName="LevelTwoTextNode" presStyleLbl="node4" presStyleIdx="6" presStyleCnt="20">
+      <dgm:prSet presAssocID="{1B24B018-AD53-4723-9DBC-CD780D3AF7E6}" presName="LevelTwoTextNode" presStyleLbl="node4" presStyleIdx="6" presStyleCnt="25">
         <dgm:presLayoutVars>
           <dgm:chPref val="3"/>
         </dgm:presLayoutVars>
@@ -3010,7 +3199,7 @@
       </dgm:t>
     </dgm:pt>
     <dgm:pt modelId="{7137EB5A-E346-4115-9F66-B74C3542748E}" type="pres">
-      <dgm:prSet presAssocID="{F40FF744-1F56-479B-AA89-A0EF61A8890A}" presName="conn2-1" presStyleLbl="parChTrans1D4" presStyleIdx="7" presStyleCnt="20"/>
+      <dgm:prSet presAssocID="{F40FF744-1F56-479B-AA89-A0EF61A8890A}" presName="conn2-1" presStyleLbl="parChTrans1D4" presStyleIdx="7" presStyleCnt="25"/>
       <dgm:spPr/>
       <dgm:t>
         <a:bodyPr/>
@@ -3021,7 +3210,7 @@
       </dgm:t>
     </dgm:pt>
     <dgm:pt modelId="{BEF9F8C4-0E1E-499B-85B7-D8C2527B7D6A}" type="pres">
-      <dgm:prSet presAssocID="{F40FF744-1F56-479B-AA89-A0EF61A8890A}" presName="connTx" presStyleLbl="parChTrans1D4" presStyleIdx="7" presStyleCnt="20"/>
+      <dgm:prSet presAssocID="{F40FF744-1F56-479B-AA89-A0EF61A8890A}" presName="connTx" presStyleLbl="parChTrans1D4" presStyleIdx="7" presStyleCnt="25"/>
       <dgm:spPr/>
       <dgm:t>
         <a:bodyPr/>
@@ -3043,7 +3232,7 @@
       </dgm:t>
     </dgm:pt>
     <dgm:pt modelId="{7A687C9C-1CE1-4FCD-8F95-CDF2CE96AF7A}" type="pres">
-      <dgm:prSet presAssocID="{C1B80BE7-4DEE-497B-98D2-5A6920F4FB8E}" presName="LevelTwoTextNode" presStyleLbl="node4" presStyleIdx="7" presStyleCnt="20">
+      <dgm:prSet presAssocID="{C1B80BE7-4DEE-497B-98D2-5A6920F4FB8E}" presName="LevelTwoTextNode" presStyleLbl="node4" presStyleIdx="7" presStyleCnt="25" custScaleX="102492">
         <dgm:presLayoutVars>
           <dgm:chPref val="3"/>
         </dgm:presLayoutVars>
@@ -3069,7 +3258,7 @@
       </dgm:t>
     </dgm:pt>
     <dgm:pt modelId="{BCF6B846-BCE0-4A36-AB58-F37D855BACB3}" type="pres">
-      <dgm:prSet presAssocID="{FEB48055-1C34-422E-8C99-E4A7B59A7524}" presName="conn2-1" presStyleLbl="parChTrans1D4" presStyleIdx="8" presStyleCnt="20"/>
+      <dgm:prSet presAssocID="{FEB48055-1C34-422E-8C99-E4A7B59A7524}" presName="conn2-1" presStyleLbl="parChTrans1D4" presStyleIdx="8" presStyleCnt="25"/>
       <dgm:spPr/>
       <dgm:t>
         <a:bodyPr/>
@@ -3080,7 +3269,7 @@
       </dgm:t>
     </dgm:pt>
     <dgm:pt modelId="{6F3D5773-510D-44D2-9A00-874B9AD6C990}" type="pres">
-      <dgm:prSet presAssocID="{FEB48055-1C34-422E-8C99-E4A7B59A7524}" presName="connTx" presStyleLbl="parChTrans1D4" presStyleIdx="8" presStyleCnt="20"/>
+      <dgm:prSet presAssocID="{FEB48055-1C34-422E-8C99-E4A7B59A7524}" presName="connTx" presStyleLbl="parChTrans1D4" presStyleIdx="8" presStyleCnt="25"/>
       <dgm:spPr/>
       <dgm:t>
         <a:bodyPr/>
@@ -3102,7 +3291,7 @@
       </dgm:t>
     </dgm:pt>
     <dgm:pt modelId="{2F691A7C-9BCD-4E4F-A41F-920122DDC012}" type="pres">
-      <dgm:prSet presAssocID="{641F7873-2D89-4584-89E6-13C8B89C0D32}" presName="LevelTwoTextNode" presStyleLbl="node4" presStyleIdx="8" presStyleCnt="20">
+      <dgm:prSet presAssocID="{641F7873-2D89-4584-89E6-13C8B89C0D32}" presName="LevelTwoTextNode" presStyleLbl="node4" presStyleIdx="8" presStyleCnt="25" custLinFactNeighborX="24437" custLinFactNeighborY="-5839">
         <dgm:presLayoutVars>
           <dgm:chPref val="3"/>
         </dgm:presLayoutVars>
@@ -3128,7 +3317,7 @@
       </dgm:t>
     </dgm:pt>
     <dgm:pt modelId="{A3E99873-9A6B-448D-882B-6A1290124BE0}" type="pres">
-      <dgm:prSet presAssocID="{9CE6119C-2BD8-4D82-857F-27695498162C}" presName="conn2-1" presStyleLbl="parChTrans1D4" presStyleIdx="9" presStyleCnt="20"/>
+      <dgm:prSet presAssocID="{9CE6119C-2BD8-4D82-857F-27695498162C}" presName="conn2-1" presStyleLbl="parChTrans1D4" presStyleIdx="9" presStyleCnt="25"/>
       <dgm:spPr/>
       <dgm:t>
         <a:bodyPr/>
@@ -3139,7 +3328,7 @@
       </dgm:t>
     </dgm:pt>
     <dgm:pt modelId="{713A720F-F6BF-407E-86B7-8CE4A23E47B5}" type="pres">
-      <dgm:prSet presAssocID="{9CE6119C-2BD8-4D82-857F-27695498162C}" presName="connTx" presStyleLbl="parChTrans1D4" presStyleIdx="9" presStyleCnt="20"/>
+      <dgm:prSet presAssocID="{9CE6119C-2BD8-4D82-857F-27695498162C}" presName="connTx" presStyleLbl="parChTrans1D4" presStyleIdx="9" presStyleCnt="25"/>
       <dgm:spPr/>
       <dgm:t>
         <a:bodyPr/>
@@ -3161,7 +3350,7 @@
       </dgm:t>
     </dgm:pt>
     <dgm:pt modelId="{BFA8CB9D-9F1D-4CD9-9D73-5A458DABA331}" type="pres">
-      <dgm:prSet presAssocID="{2D0898D9-1379-4C8B-848A-4DE9262983B4}" presName="LevelTwoTextNode" presStyleLbl="node4" presStyleIdx="9" presStyleCnt="20">
+      <dgm:prSet presAssocID="{2D0898D9-1379-4C8B-848A-4DE9262983B4}" presName="LevelTwoTextNode" presStyleLbl="node4" presStyleIdx="9" presStyleCnt="25" custLinFactNeighborX="24437" custLinFactNeighborY="-5839">
         <dgm:presLayoutVars>
           <dgm:chPref val="3"/>
         </dgm:presLayoutVars>
@@ -3187,7 +3376,7 @@
       </dgm:t>
     </dgm:pt>
     <dgm:pt modelId="{0F4448C4-16D0-412B-B97C-B3EE8C574400}" type="pres">
-      <dgm:prSet presAssocID="{051E6169-5FA5-4711-8079-FA56C87AB900}" presName="conn2-1" presStyleLbl="parChTrans1D4" presStyleIdx="10" presStyleCnt="20"/>
+      <dgm:prSet presAssocID="{051E6169-5FA5-4711-8079-FA56C87AB900}" presName="conn2-1" presStyleLbl="parChTrans1D4" presStyleIdx="10" presStyleCnt="25"/>
       <dgm:spPr/>
       <dgm:t>
         <a:bodyPr/>
@@ -3198,7 +3387,7 @@
       </dgm:t>
     </dgm:pt>
     <dgm:pt modelId="{26A1B052-FF5B-4D0A-80E9-1DA688CD3D7D}" type="pres">
-      <dgm:prSet presAssocID="{051E6169-5FA5-4711-8079-FA56C87AB900}" presName="connTx" presStyleLbl="parChTrans1D4" presStyleIdx="10" presStyleCnt="20"/>
+      <dgm:prSet presAssocID="{051E6169-5FA5-4711-8079-FA56C87AB900}" presName="connTx" presStyleLbl="parChTrans1D4" presStyleIdx="10" presStyleCnt="25"/>
       <dgm:spPr/>
       <dgm:t>
         <a:bodyPr/>
@@ -3220,7 +3409,7 @@
       </dgm:t>
     </dgm:pt>
     <dgm:pt modelId="{C75D1124-C505-4361-BD55-C3934A33A542}" type="pres">
-      <dgm:prSet presAssocID="{537D9D52-BB4C-4295-A6FC-1F3EE30F7C8A}" presName="LevelTwoTextNode" presStyleLbl="node4" presStyleIdx="10" presStyleCnt="20">
+      <dgm:prSet presAssocID="{537D9D52-BB4C-4295-A6FC-1F3EE30F7C8A}" presName="LevelTwoTextNode" presStyleLbl="node4" presStyleIdx="10" presStyleCnt="25" custLinFactNeighborX="24437" custLinFactNeighborY="-5839">
         <dgm:presLayoutVars>
           <dgm:chPref val="3"/>
         </dgm:presLayoutVars>
@@ -3246,7 +3435,7 @@
       </dgm:t>
     </dgm:pt>
     <dgm:pt modelId="{E7DB1CDA-3D4C-4818-A88C-6D185D722EC6}" type="pres">
-      <dgm:prSet presAssocID="{9A871F26-74E8-4736-985B-EF3BB73DFE34}" presName="conn2-1" presStyleLbl="parChTrans1D4" presStyleIdx="11" presStyleCnt="20"/>
+      <dgm:prSet presAssocID="{9A871F26-74E8-4736-985B-EF3BB73DFE34}" presName="conn2-1" presStyleLbl="parChTrans1D4" presStyleIdx="11" presStyleCnt="25"/>
       <dgm:spPr/>
       <dgm:t>
         <a:bodyPr/>
@@ -3257,7 +3446,7 @@
       </dgm:t>
     </dgm:pt>
     <dgm:pt modelId="{15AE2F48-9DB0-4B24-ADB3-E3970E729EE5}" type="pres">
-      <dgm:prSet presAssocID="{9A871F26-74E8-4736-985B-EF3BB73DFE34}" presName="connTx" presStyleLbl="parChTrans1D4" presStyleIdx="11" presStyleCnt="20"/>
+      <dgm:prSet presAssocID="{9A871F26-74E8-4736-985B-EF3BB73DFE34}" presName="connTx" presStyleLbl="parChTrans1D4" presStyleIdx="11" presStyleCnt="25"/>
       <dgm:spPr/>
       <dgm:t>
         <a:bodyPr/>
@@ -3279,7 +3468,7 @@
       </dgm:t>
     </dgm:pt>
     <dgm:pt modelId="{A8FC37A2-9B31-4489-B0A8-9E802EBAF3A0}" type="pres">
-      <dgm:prSet presAssocID="{88164397-DBD8-4D72-B38B-DE4BF4031B5D}" presName="LevelTwoTextNode" presStyleLbl="node4" presStyleIdx="11" presStyleCnt="20">
+      <dgm:prSet presAssocID="{88164397-DBD8-4D72-B38B-DE4BF4031B5D}" presName="LevelTwoTextNode" presStyleLbl="node4" presStyleIdx="11" presStyleCnt="25">
         <dgm:presLayoutVars>
           <dgm:chPref val="3"/>
         </dgm:presLayoutVars>
@@ -3305,7 +3494,7 @@
       </dgm:t>
     </dgm:pt>
     <dgm:pt modelId="{54971FDB-F67F-4F3B-92B6-E77D3DFFDC8A}" type="pres">
-      <dgm:prSet presAssocID="{59511E4B-8EFD-40C1-8769-41EC8A3006F1}" presName="conn2-1" presStyleLbl="parChTrans1D4" presStyleIdx="12" presStyleCnt="20"/>
+      <dgm:prSet presAssocID="{59511E4B-8EFD-40C1-8769-41EC8A3006F1}" presName="conn2-1" presStyleLbl="parChTrans1D4" presStyleIdx="12" presStyleCnt="25"/>
       <dgm:spPr/>
       <dgm:t>
         <a:bodyPr/>
@@ -3316,7 +3505,7 @@
       </dgm:t>
     </dgm:pt>
     <dgm:pt modelId="{9B99E809-B197-4823-8F4F-A9A5674BCDDC}" type="pres">
-      <dgm:prSet presAssocID="{59511E4B-8EFD-40C1-8769-41EC8A3006F1}" presName="connTx" presStyleLbl="parChTrans1D4" presStyleIdx="12" presStyleCnt="20"/>
+      <dgm:prSet presAssocID="{59511E4B-8EFD-40C1-8769-41EC8A3006F1}" presName="connTx" presStyleLbl="parChTrans1D4" presStyleIdx="12" presStyleCnt="25"/>
       <dgm:spPr/>
       <dgm:t>
         <a:bodyPr/>
@@ -3338,7 +3527,7 @@
       </dgm:t>
     </dgm:pt>
     <dgm:pt modelId="{9DE0F9C2-8935-4BB2-9E9C-937F7C914306}" type="pres">
-      <dgm:prSet presAssocID="{2BA398DC-44B5-4B11-A724-B73E05D7E9DF}" presName="LevelTwoTextNode" presStyleLbl="node4" presStyleIdx="12" presStyleCnt="20">
+      <dgm:prSet presAssocID="{2BA398DC-44B5-4B11-A724-B73E05D7E9DF}" presName="LevelTwoTextNode" presStyleLbl="node4" presStyleIdx="12" presStyleCnt="25">
         <dgm:presLayoutVars>
           <dgm:chPref val="3"/>
         </dgm:presLayoutVars>
@@ -3364,7 +3553,7 @@
       </dgm:t>
     </dgm:pt>
     <dgm:pt modelId="{E8B9E04F-8911-439D-A990-57E0C8BD86F4}" type="pres">
-      <dgm:prSet presAssocID="{26479144-D9B7-4B50-8D7C-51FE0917EA76}" presName="conn2-1" presStyleLbl="parChTrans1D4" presStyleIdx="13" presStyleCnt="20"/>
+      <dgm:prSet presAssocID="{26479144-D9B7-4B50-8D7C-51FE0917EA76}" presName="conn2-1" presStyleLbl="parChTrans1D4" presStyleIdx="13" presStyleCnt="25"/>
       <dgm:spPr/>
       <dgm:t>
         <a:bodyPr/>
@@ -3375,7 +3564,7 @@
       </dgm:t>
     </dgm:pt>
     <dgm:pt modelId="{EAA5B856-0115-455E-A97E-BB584CD51E7D}" type="pres">
-      <dgm:prSet presAssocID="{26479144-D9B7-4B50-8D7C-51FE0917EA76}" presName="connTx" presStyleLbl="parChTrans1D4" presStyleIdx="13" presStyleCnt="20"/>
+      <dgm:prSet presAssocID="{26479144-D9B7-4B50-8D7C-51FE0917EA76}" presName="connTx" presStyleLbl="parChTrans1D4" presStyleIdx="13" presStyleCnt="25"/>
       <dgm:spPr/>
       <dgm:t>
         <a:bodyPr/>
@@ -3397,7 +3586,7 @@
       </dgm:t>
     </dgm:pt>
     <dgm:pt modelId="{35ACB2AC-382A-4C97-A906-4B1EC627FF3B}" type="pres">
-      <dgm:prSet presAssocID="{5E4A91D4-2366-4C60-BB3D-496C11657DC0}" presName="LevelTwoTextNode" presStyleLbl="node4" presStyleIdx="13" presStyleCnt="20">
+      <dgm:prSet presAssocID="{5E4A91D4-2366-4C60-BB3D-496C11657DC0}" presName="LevelTwoTextNode" presStyleLbl="node4" presStyleIdx="13" presStyleCnt="25" custScaleX="108737">
         <dgm:presLayoutVars>
           <dgm:chPref val="3"/>
         </dgm:presLayoutVars>
@@ -3423,7 +3612,7 @@
       </dgm:t>
     </dgm:pt>
     <dgm:pt modelId="{6C6D8E9D-7873-4EE3-A7C8-467DB1B38886}" type="pres">
-      <dgm:prSet presAssocID="{28B1DEF3-FA5E-434F-985A-593161F70089}" presName="conn2-1" presStyleLbl="parChTrans1D4" presStyleIdx="14" presStyleCnt="20"/>
+      <dgm:prSet presAssocID="{28B1DEF3-FA5E-434F-985A-593161F70089}" presName="conn2-1" presStyleLbl="parChTrans1D4" presStyleIdx="14" presStyleCnt="25"/>
       <dgm:spPr/>
       <dgm:t>
         <a:bodyPr/>
@@ -3434,7 +3623,7 @@
       </dgm:t>
     </dgm:pt>
     <dgm:pt modelId="{B10566F1-6764-4207-91A3-FAD8D64F1C28}" type="pres">
-      <dgm:prSet presAssocID="{28B1DEF3-FA5E-434F-985A-593161F70089}" presName="connTx" presStyleLbl="parChTrans1D4" presStyleIdx="14" presStyleCnt="20"/>
+      <dgm:prSet presAssocID="{28B1DEF3-FA5E-434F-985A-593161F70089}" presName="connTx" presStyleLbl="parChTrans1D4" presStyleIdx="14" presStyleCnt="25"/>
       <dgm:spPr/>
       <dgm:t>
         <a:bodyPr/>
@@ -3456,7 +3645,7 @@
       </dgm:t>
     </dgm:pt>
     <dgm:pt modelId="{F477F308-696E-4EBB-A389-B7BC50374169}" type="pres">
-      <dgm:prSet presAssocID="{3AD458C6-8419-4D84-9762-23D8C70DAE66}" presName="LevelTwoTextNode" presStyleLbl="node4" presStyleIdx="14" presStyleCnt="20">
+      <dgm:prSet presAssocID="{3AD458C6-8419-4D84-9762-23D8C70DAE66}" presName="LevelTwoTextNode" presStyleLbl="node4" presStyleIdx="14" presStyleCnt="25" custLinFactNeighborX="19986">
         <dgm:presLayoutVars>
           <dgm:chPref val="3"/>
         </dgm:presLayoutVars>
@@ -3482,7 +3671,7 @@
       </dgm:t>
     </dgm:pt>
     <dgm:pt modelId="{51ABB488-7F6B-4F15-BF1E-13957DECDEA0}" type="pres">
-      <dgm:prSet presAssocID="{9A485257-A8D6-4397-BEDE-96D5D67A5BD8}" presName="conn2-1" presStyleLbl="parChTrans1D4" presStyleIdx="15" presStyleCnt="20"/>
+      <dgm:prSet presAssocID="{9A485257-A8D6-4397-BEDE-96D5D67A5BD8}" presName="conn2-1" presStyleLbl="parChTrans1D4" presStyleIdx="15" presStyleCnt="25"/>
       <dgm:spPr/>
       <dgm:t>
         <a:bodyPr/>
@@ -3493,7 +3682,7 @@
       </dgm:t>
     </dgm:pt>
     <dgm:pt modelId="{564E8B54-811C-4F63-8549-390678EFB2EA}" type="pres">
-      <dgm:prSet presAssocID="{9A485257-A8D6-4397-BEDE-96D5D67A5BD8}" presName="connTx" presStyleLbl="parChTrans1D4" presStyleIdx="15" presStyleCnt="20"/>
+      <dgm:prSet presAssocID="{9A485257-A8D6-4397-BEDE-96D5D67A5BD8}" presName="connTx" presStyleLbl="parChTrans1D4" presStyleIdx="15" presStyleCnt="25"/>
       <dgm:spPr/>
       <dgm:t>
         <a:bodyPr/>
@@ -3515,7 +3704,7 @@
       </dgm:t>
     </dgm:pt>
     <dgm:pt modelId="{057661AD-CB3F-4EFF-A165-3CB41187F5B8}" type="pres">
-      <dgm:prSet presAssocID="{1C1944A6-354A-4452-AC1A-3CB32B31AB4A}" presName="LevelTwoTextNode" presStyleLbl="node4" presStyleIdx="15" presStyleCnt="20">
+      <dgm:prSet presAssocID="{1C1944A6-354A-4452-AC1A-3CB32B31AB4A}" presName="LevelTwoTextNode" presStyleLbl="node4" presStyleIdx="15" presStyleCnt="25" custLinFactNeighborX="19986">
         <dgm:presLayoutVars>
           <dgm:chPref val="3"/>
         </dgm:presLayoutVars>
@@ -3541,7 +3730,7 @@
       </dgm:t>
     </dgm:pt>
     <dgm:pt modelId="{59AE2245-54FD-442F-826F-E34D3A5503D3}" type="pres">
-      <dgm:prSet presAssocID="{A26C579B-D9A2-440D-B584-E528FA053B0A}" presName="conn2-1" presStyleLbl="parChTrans1D4" presStyleIdx="16" presStyleCnt="20"/>
+      <dgm:prSet presAssocID="{A26C579B-D9A2-440D-B584-E528FA053B0A}" presName="conn2-1" presStyleLbl="parChTrans1D4" presStyleIdx="16" presStyleCnt="25"/>
       <dgm:spPr/>
       <dgm:t>
         <a:bodyPr/>
@@ -3552,7 +3741,7 @@
       </dgm:t>
     </dgm:pt>
     <dgm:pt modelId="{70AD1357-89BE-4B28-B9F5-7D58CDC1F51E}" type="pres">
-      <dgm:prSet presAssocID="{A26C579B-D9A2-440D-B584-E528FA053B0A}" presName="connTx" presStyleLbl="parChTrans1D4" presStyleIdx="16" presStyleCnt="20"/>
+      <dgm:prSet presAssocID="{A26C579B-D9A2-440D-B584-E528FA053B0A}" presName="connTx" presStyleLbl="parChTrans1D4" presStyleIdx="16" presStyleCnt="25"/>
       <dgm:spPr/>
       <dgm:t>
         <a:bodyPr/>
@@ -3574,7 +3763,7 @@
       </dgm:t>
     </dgm:pt>
     <dgm:pt modelId="{5F45AA15-FBB3-4B44-8E68-EED9491C0D70}" type="pres">
-      <dgm:prSet presAssocID="{9EEBD96E-C508-492D-AC9A-9F1A3119B996}" presName="LevelTwoTextNode" presStyleLbl="node4" presStyleIdx="16" presStyleCnt="20">
+      <dgm:prSet presAssocID="{9EEBD96E-C508-492D-AC9A-9F1A3119B996}" presName="LevelTwoTextNode" presStyleLbl="node4" presStyleIdx="16" presStyleCnt="25" custLinFactNeighborX="19986">
         <dgm:presLayoutVars>
           <dgm:chPref val="3"/>
         </dgm:presLayoutVars>
@@ -3600,7 +3789,7 @@
       </dgm:t>
     </dgm:pt>
     <dgm:pt modelId="{67D635C0-48F2-4C8E-A3A2-F35C9A9E45DC}" type="pres">
-      <dgm:prSet presAssocID="{FD783284-7709-4153-940E-9DD9E029E02A}" presName="conn2-1" presStyleLbl="parChTrans1D4" presStyleIdx="17" presStyleCnt="20"/>
+      <dgm:prSet presAssocID="{FD783284-7709-4153-940E-9DD9E029E02A}" presName="conn2-1" presStyleLbl="parChTrans1D4" presStyleIdx="17" presStyleCnt="25"/>
       <dgm:spPr/>
       <dgm:t>
         <a:bodyPr/>
@@ -3611,7 +3800,7 @@
       </dgm:t>
     </dgm:pt>
     <dgm:pt modelId="{426AC0E4-BEF7-4521-B5BF-B55008593BD6}" type="pres">
-      <dgm:prSet presAssocID="{FD783284-7709-4153-940E-9DD9E029E02A}" presName="connTx" presStyleLbl="parChTrans1D4" presStyleIdx="17" presStyleCnt="20"/>
+      <dgm:prSet presAssocID="{FD783284-7709-4153-940E-9DD9E029E02A}" presName="connTx" presStyleLbl="parChTrans1D4" presStyleIdx="17" presStyleCnt="25"/>
       <dgm:spPr/>
       <dgm:t>
         <a:bodyPr/>
@@ -3633,7 +3822,7 @@
       </dgm:t>
     </dgm:pt>
     <dgm:pt modelId="{3EE425C3-9686-4BDF-A704-1B7FE956B70F}" type="pres">
-      <dgm:prSet presAssocID="{B744A046-4A74-4240-94C0-E4572C4E9202}" presName="LevelTwoTextNode" presStyleLbl="node4" presStyleIdx="17" presStyleCnt="20">
+      <dgm:prSet presAssocID="{B744A046-4A74-4240-94C0-E4572C4E9202}" presName="LevelTwoTextNode" presStyleLbl="node4" presStyleIdx="17" presStyleCnt="25" custScaleX="102450">
         <dgm:presLayoutVars>
           <dgm:chPref val="3"/>
         </dgm:presLayoutVars>
@@ -3658,8 +3847,142 @@
         </a:p>
       </dgm:t>
     </dgm:pt>
+    <dgm:pt modelId="{3277378E-1025-4B91-B646-B39624C63CFC}" type="pres">
+      <dgm:prSet presAssocID="{0FBFC397-7581-450D-9E09-11221034CB1F}" presName="conn2-1" presStyleLbl="parChTrans1D4" presStyleIdx="18" presStyleCnt="25"/>
+      <dgm:spPr/>
+    </dgm:pt>
+    <dgm:pt modelId="{ED27862D-C3E6-427A-885B-0E48DC7843BB}" type="pres">
+      <dgm:prSet presAssocID="{0FBFC397-7581-450D-9E09-11221034CB1F}" presName="connTx" presStyleLbl="parChTrans1D4" presStyleIdx="18" presStyleCnt="25"/>
+      <dgm:spPr/>
+    </dgm:pt>
+    <dgm:pt modelId="{694CBA10-92D2-4197-90E3-DF07EA10EEB8}" type="pres">
+      <dgm:prSet presAssocID="{760883ED-A9BB-405E-8F20-AFD9CCB96229}" presName="root2" presStyleCnt="0"/>
+      <dgm:spPr/>
+    </dgm:pt>
+    <dgm:pt modelId="{3CE5715A-B463-4312-A59B-740DC19BA68B}" type="pres">
+      <dgm:prSet presAssocID="{760883ED-A9BB-405E-8F20-AFD9CCB96229}" presName="LevelTwoTextNode" presStyleLbl="node4" presStyleIdx="18" presStyleCnt="25">
+        <dgm:presLayoutVars>
+          <dgm:chPref val="3"/>
+        </dgm:presLayoutVars>
+      </dgm:prSet>
+      <dgm:spPr/>
+      <dgm:t>
+        <a:bodyPr/>
+        <a:lstStyle/>
+        <a:p>
+          <a:endParaRPr lang="fr-FR"/>
+        </a:p>
+      </dgm:t>
+    </dgm:pt>
+    <dgm:pt modelId="{63E2F988-CB6C-4238-BA57-4F2847669F56}" type="pres">
+      <dgm:prSet presAssocID="{760883ED-A9BB-405E-8F20-AFD9CCB96229}" presName="level3hierChild" presStyleCnt="0"/>
+      <dgm:spPr/>
+    </dgm:pt>
+    <dgm:pt modelId="{B1B95A7D-A80C-4A8C-B5CC-608F51433E24}" type="pres">
+      <dgm:prSet presAssocID="{BF2ECC47-8959-4178-94DF-C185E2DEE5DE}" presName="conn2-1" presStyleLbl="parChTrans1D4" presStyleIdx="19" presStyleCnt="25"/>
+      <dgm:spPr/>
+    </dgm:pt>
+    <dgm:pt modelId="{D089DFB8-6D68-45D6-93AE-4D04E31DEDBD}" type="pres">
+      <dgm:prSet presAssocID="{BF2ECC47-8959-4178-94DF-C185E2DEE5DE}" presName="connTx" presStyleLbl="parChTrans1D4" presStyleIdx="19" presStyleCnt="25"/>
+      <dgm:spPr/>
+    </dgm:pt>
+    <dgm:pt modelId="{9BAEEE4D-1794-4993-ABA7-35B5444E3185}" type="pres">
+      <dgm:prSet presAssocID="{D6A6EF0D-3890-4564-B47F-BA7E2FFC336B}" presName="root2" presStyleCnt="0"/>
+      <dgm:spPr/>
+    </dgm:pt>
+    <dgm:pt modelId="{BADDFD11-6D6A-4F6A-8B2E-2F492D67B8FF}" type="pres">
+      <dgm:prSet presAssocID="{D6A6EF0D-3890-4564-B47F-BA7E2FFC336B}" presName="LevelTwoTextNode" presStyleLbl="node4" presStyleIdx="19" presStyleCnt="25" custScaleX="108608">
+        <dgm:presLayoutVars>
+          <dgm:chPref val="3"/>
+        </dgm:presLayoutVars>
+      </dgm:prSet>
+      <dgm:spPr/>
+      <dgm:t>
+        <a:bodyPr/>
+        <a:lstStyle/>
+        <a:p>
+          <a:endParaRPr lang="fr-FR"/>
+        </a:p>
+      </dgm:t>
+    </dgm:pt>
+    <dgm:pt modelId="{674512A4-DC34-49D8-96AF-E0B4E8875587}" type="pres">
+      <dgm:prSet presAssocID="{D6A6EF0D-3890-4564-B47F-BA7E2FFC336B}" presName="level3hierChild" presStyleCnt="0"/>
+      <dgm:spPr/>
+    </dgm:pt>
+    <dgm:pt modelId="{1C218697-7FEC-442C-BEAC-861EDBA1EE26}" type="pres">
+      <dgm:prSet presAssocID="{DB9EFE37-A36C-430A-8B47-88C287516F23}" presName="conn2-1" presStyleLbl="parChTrans1D4" presStyleIdx="20" presStyleCnt="25"/>
+      <dgm:spPr/>
+    </dgm:pt>
+    <dgm:pt modelId="{81ADFB7C-14D3-491D-A8C3-619A082EA693}" type="pres">
+      <dgm:prSet presAssocID="{DB9EFE37-A36C-430A-8B47-88C287516F23}" presName="connTx" presStyleLbl="parChTrans1D4" presStyleIdx="20" presStyleCnt="25"/>
+      <dgm:spPr/>
+    </dgm:pt>
+    <dgm:pt modelId="{1E3A8E4F-0756-4205-874E-8A8A7E5A4645}" type="pres">
+      <dgm:prSet presAssocID="{C971CB4A-ACE5-46F8-AE5B-3AFE92D0959D}" presName="root2" presStyleCnt="0"/>
+      <dgm:spPr/>
+    </dgm:pt>
+    <dgm:pt modelId="{A53E1177-1715-4EBC-8FFF-D2B6BE4DA7DF}" type="pres">
+      <dgm:prSet presAssocID="{C971CB4A-ACE5-46F8-AE5B-3AFE92D0959D}" presName="LevelTwoTextNode" presStyleLbl="node4" presStyleIdx="20" presStyleCnt="25" custLinFactNeighborX="18692">
+        <dgm:presLayoutVars>
+          <dgm:chPref val="3"/>
+        </dgm:presLayoutVars>
+      </dgm:prSet>
+      <dgm:spPr/>
+    </dgm:pt>
+    <dgm:pt modelId="{96D657BE-01FB-41A5-A61B-3B35503AC2B6}" type="pres">
+      <dgm:prSet presAssocID="{C971CB4A-ACE5-46F8-AE5B-3AFE92D0959D}" presName="level3hierChild" presStyleCnt="0"/>
+      <dgm:spPr/>
+    </dgm:pt>
+    <dgm:pt modelId="{17D366BE-804F-4EB3-932C-7E922AA72C97}" type="pres">
+      <dgm:prSet presAssocID="{34FEF89F-3256-4364-AB80-02C4079D03DE}" presName="conn2-1" presStyleLbl="parChTrans1D4" presStyleIdx="21" presStyleCnt="25"/>
+      <dgm:spPr/>
+    </dgm:pt>
+    <dgm:pt modelId="{E6F6B072-371D-4957-ABC0-3B2C22D27DBF}" type="pres">
+      <dgm:prSet presAssocID="{34FEF89F-3256-4364-AB80-02C4079D03DE}" presName="connTx" presStyleLbl="parChTrans1D4" presStyleIdx="21" presStyleCnt="25"/>
+      <dgm:spPr/>
+    </dgm:pt>
+    <dgm:pt modelId="{570E30F0-C1ED-4CD5-BCCD-D977F598EAF8}" type="pres">
+      <dgm:prSet presAssocID="{322F58AD-DE9A-4B44-9BA0-D689707D8FD4}" presName="root2" presStyleCnt="0"/>
+      <dgm:spPr/>
+    </dgm:pt>
+    <dgm:pt modelId="{9C97ECFE-35CB-4952-AA99-AABD5BBDF8F7}" type="pres">
+      <dgm:prSet presAssocID="{322F58AD-DE9A-4B44-9BA0-D689707D8FD4}" presName="LevelTwoTextNode" presStyleLbl="node4" presStyleIdx="21" presStyleCnt="25" custLinFactNeighborX="18692">
+        <dgm:presLayoutVars>
+          <dgm:chPref val="3"/>
+        </dgm:presLayoutVars>
+      </dgm:prSet>
+      <dgm:spPr/>
+    </dgm:pt>
+    <dgm:pt modelId="{F4A1B485-8D55-4B83-ADC5-922BB2DE367E}" type="pres">
+      <dgm:prSet presAssocID="{322F58AD-DE9A-4B44-9BA0-D689707D8FD4}" presName="level3hierChild" presStyleCnt="0"/>
+      <dgm:spPr/>
+    </dgm:pt>
+    <dgm:pt modelId="{F5B1B54B-C837-4500-B1F9-6B55EC063495}" type="pres">
+      <dgm:prSet presAssocID="{4E2FF37E-EF9E-4E13-A343-A28FDBF48B26}" presName="conn2-1" presStyleLbl="parChTrans1D4" presStyleIdx="22" presStyleCnt="25"/>
+      <dgm:spPr/>
+    </dgm:pt>
+    <dgm:pt modelId="{D842F95B-B05B-4DE0-B764-8E26B5379FF0}" type="pres">
+      <dgm:prSet presAssocID="{4E2FF37E-EF9E-4E13-A343-A28FDBF48B26}" presName="connTx" presStyleLbl="parChTrans1D4" presStyleIdx="22" presStyleCnt="25"/>
+      <dgm:spPr/>
+    </dgm:pt>
+    <dgm:pt modelId="{4E596BD4-DA7C-4D4A-8CF7-CADC167A2029}" type="pres">
+      <dgm:prSet presAssocID="{D81D785B-9DE7-4820-AFB6-E6C98C246EFC}" presName="root2" presStyleCnt="0"/>
+      <dgm:spPr/>
+    </dgm:pt>
+    <dgm:pt modelId="{D95C901E-1098-4296-B1C0-A32F05673786}" type="pres">
+      <dgm:prSet presAssocID="{D81D785B-9DE7-4820-AFB6-E6C98C246EFC}" presName="LevelTwoTextNode" presStyleLbl="node4" presStyleIdx="22" presStyleCnt="25" custScaleX="106969">
+        <dgm:presLayoutVars>
+          <dgm:chPref val="3"/>
+        </dgm:presLayoutVars>
+      </dgm:prSet>
+      <dgm:spPr/>
+    </dgm:pt>
+    <dgm:pt modelId="{4EAB2BC0-F83A-4A62-B7D8-59143933720A}" type="pres">
+      <dgm:prSet presAssocID="{D81D785B-9DE7-4820-AFB6-E6C98C246EFC}" presName="level3hierChild" presStyleCnt="0"/>
+      <dgm:spPr/>
+    </dgm:pt>
     <dgm:pt modelId="{C4C9488E-7BE6-4FC9-9B22-FCEA0EF43662}" type="pres">
-      <dgm:prSet presAssocID="{CADCD632-196A-4857-843B-D027D5E1C826}" presName="conn2-1" presStyleLbl="parChTrans1D4" presStyleIdx="18" presStyleCnt="20"/>
+      <dgm:prSet presAssocID="{CADCD632-196A-4857-843B-D027D5E1C826}" presName="conn2-1" presStyleLbl="parChTrans1D4" presStyleIdx="23" presStyleCnt="25"/>
       <dgm:spPr/>
       <dgm:t>
         <a:bodyPr/>
@@ -3670,7 +3993,7 @@
       </dgm:t>
     </dgm:pt>
     <dgm:pt modelId="{8326D004-29DB-4CCB-873E-728791BF390D}" type="pres">
-      <dgm:prSet presAssocID="{CADCD632-196A-4857-843B-D027D5E1C826}" presName="connTx" presStyleLbl="parChTrans1D4" presStyleIdx="18" presStyleCnt="20"/>
+      <dgm:prSet presAssocID="{CADCD632-196A-4857-843B-D027D5E1C826}" presName="connTx" presStyleLbl="parChTrans1D4" presStyleIdx="23" presStyleCnt="25"/>
       <dgm:spPr/>
       <dgm:t>
         <a:bodyPr/>
@@ -3692,7 +4015,7 @@
       </dgm:t>
     </dgm:pt>
     <dgm:pt modelId="{536E7EEE-AE26-4F15-B7DF-40567D90432E}" type="pres">
-      <dgm:prSet presAssocID="{25AB21D2-ED78-4C5E-B945-4D2D0E9CFB55}" presName="LevelTwoTextNode" presStyleLbl="node4" presStyleIdx="18" presStyleCnt="20">
+      <dgm:prSet presAssocID="{25AB21D2-ED78-4C5E-B945-4D2D0E9CFB55}" presName="LevelTwoTextNode" presStyleLbl="node4" presStyleIdx="23" presStyleCnt="25">
         <dgm:presLayoutVars>
           <dgm:chPref val="3"/>
         </dgm:presLayoutVars>
@@ -3718,7 +4041,7 @@
       </dgm:t>
     </dgm:pt>
     <dgm:pt modelId="{FDF87123-BEAA-4C8C-BE86-B5F423001575}" type="pres">
-      <dgm:prSet presAssocID="{2C5D07FC-2E11-4C25-B11B-D468629BAEA7}" presName="conn2-1" presStyleLbl="parChTrans1D4" presStyleIdx="19" presStyleCnt="20"/>
+      <dgm:prSet presAssocID="{2C5D07FC-2E11-4C25-B11B-D468629BAEA7}" presName="conn2-1" presStyleLbl="parChTrans1D4" presStyleIdx="24" presStyleCnt="25"/>
       <dgm:spPr/>
       <dgm:t>
         <a:bodyPr/>
@@ -3729,7 +4052,7 @@
       </dgm:t>
     </dgm:pt>
     <dgm:pt modelId="{D2297108-BBF1-4A06-A0FE-E40031175864}" type="pres">
-      <dgm:prSet presAssocID="{2C5D07FC-2E11-4C25-B11B-D468629BAEA7}" presName="connTx" presStyleLbl="parChTrans1D4" presStyleIdx="19" presStyleCnt="20"/>
+      <dgm:prSet presAssocID="{2C5D07FC-2E11-4C25-B11B-D468629BAEA7}" presName="connTx" presStyleLbl="parChTrans1D4" presStyleIdx="24" presStyleCnt="25"/>
       <dgm:spPr/>
       <dgm:t>
         <a:bodyPr/>
@@ -3751,7 +4074,7 @@
       </dgm:t>
     </dgm:pt>
     <dgm:pt modelId="{ADC4EBE8-08E2-4FE3-8945-6660CEF6994F}" type="pres">
-      <dgm:prSet presAssocID="{24A460EE-1CA7-428D-8C6C-3007FD1B450B}" presName="LevelTwoTextNode" presStyleLbl="node4" presStyleIdx="19" presStyleCnt="20">
+      <dgm:prSet presAssocID="{24A460EE-1CA7-428D-8C6C-3007FD1B450B}" presName="LevelTwoTextNode" presStyleLbl="node4" presStyleIdx="24" presStyleCnt="25">
         <dgm:presLayoutVars>
           <dgm:chPref val="3"/>
         </dgm:presLayoutVars>
@@ -3778,125 +4101,145 @@
     </dgm:pt>
   </dgm:ptLst>
   <dgm:cxnLst>
+    <dgm:cxn modelId="{1178D50F-366F-4EE7-A7CE-B9E360FA6C9F}" type="presOf" srcId="{DEA1A0C5-BE8D-4B82-B1D8-B4B9DCF4CE1A}" destId="{48AB6F3C-59DC-47D0-9C0E-C348A271EF25}" srcOrd="1" destOrd="0" presId="urn:microsoft.com/office/officeart/2008/layout/HorizontalMultiLevelHierarchy"/>
+    <dgm:cxn modelId="{526A87B8-F805-4B7F-A775-8A23A54430AE}" type="presOf" srcId="{051E6169-5FA5-4711-8079-FA56C87AB900}" destId="{26A1B052-FF5B-4D0A-80E9-1DA688CD3D7D}" srcOrd="1" destOrd="0" presId="urn:microsoft.com/office/officeart/2008/layout/HorizontalMultiLevelHierarchy"/>
+    <dgm:cxn modelId="{530A820A-DE70-431E-A20B-7969DD8DB6DC}" type="presOf" srcId="{30687554-7B6A-4E42-B0D8-856A3E451C97}" destId="{F61ED2EA-3DCB-4BDF-974A-6D38D5B018AB}" srcOrd="0" destOrd="0" presId="urn:microsoft.com/office/officeart/2008/layout/HorizontalMultiLevelHierarchy"/>
+    <dgm:cxn modelId="{CDE04894-FA14-456A-9C2E-A165AF55133B}" type="presOf" srcId="{DB9EFE37-A36C-430A-8B47-88C287516F23}" destId="{81ADFB7C-14D3-491D-A8C3-619A082EA693}" srcOrd="1" destOrd="0" presId="urn:microsoft.com/office/officeart/2008/layout/HorizontalMultiLevelHierarchy"/>
+    <dgm:cxn modelId="{490CFF5B-BAB5-4C69-927D-552C39D31FC1}" type="presOf" srcId="{C1B80BE7-4DEE-497B-98D2-5A6920F4FB8E}" destId="{7A687C9C-1CE1-4FCD-8F95-CDF2CE96AF7A}" srcOrd="0" destOrd="0" presId="urn:microsoft.com/office/officeart/2008/layout/HorizontalMultiLevelHierarchy"/>
+    <dgm:cxn modelId="{84F7ABB7-B9EE-413A-85B7-72E4F7CBAFE2}" type="presOf" srcId="{34FEF89F-3256-4364-AB80-02C4079D03DE}" destId="{17D366BE-804F-4EB3-932C-7E922AA72C97}" srcOrd="0" destOrd="0" presId="urn:microsoft.com/office/officeart/2008/layout/HorizontalMultiLevelHierarchy"/>
+    <dgm:cxn modelId="{6F9468CD-6492-408D-9163-16E80F613DD4}" srcId="{D8F92CDA-A645-45E2-B5DE-6A3BACB6C859}" destId="{9A727AB6-4DAD-40D1-AFE1-8312D97F8394}" srcOrd="2" destOrd="0" parTransId="{03A1827D-0486-453D-8D6D-022439E5BEB5}" sibTransId="{5844ED66-CD55-407C-94D2-DAB670402374}"/>
+    <dgm:cxn modelId="{0EED5EAD-78F8-45FD-81BD-8E983C727040}" type="presOf" srcId="{26479144-D9B7-4B50-8D7C-51FE0917EA76}" destId="{E8B9E04F-8911-439D-A990-57E0C8BD86F4}" srcOrd="0" destOrd="0" presId="urn:microsoft.com/office/officeart/2008/layout/HorizontalMultiLevelHierarchy"/>
+    <dgm:cxn modelId="{5012F5CF-617A-4B7C-9750-407CE29B9699}" type="presOf" srcId="{CADCD632-196A-4857-843B-D027D5E1C826}" destId="{C4C9488E-7BE6-4FC9-9B22-FCEA0EF43662}" srcOrd="0" destOrd="0" presId="urn:microsoft.com/office/officeart/2008/layout/HorizontalMultiLevelHierarchy"/>
+    <dgm:cxn modelId="{4A84C0BD-AA51-483C-91BE-6B9C1567A259}" srcId="{406A186A-33BC-4105-8835-7C5D35980A40}" destId="{8DC7735B-9A6C-431C-92AA-042288E1B6AF}" srcOrd="0" destOrd="0" parTransId="{62B13B07-F327-4E52-AE5C-A801CC6497E5}" sibTransId="{D54DEC93-19CD-4835-857E-9EABBFDAD2C8}"/>
+    <dgm:cxn modelId="{C5533B9D-7ADC-4314-82C1-C4841A3B2538}" type="presOf" srcId="{03A1827D-0486-453D-8D6D-022439E5BEB5}" destId="{3F497CFA-6478-4309-8C27-A4BBA02D3D1D}" srcOrd="0" destOrd="0" presId="urn:microsoft.com/office/officeart/2008/layout/HorizontalMultiLevelHierarchy"/>
+    <dgm:cxn modelId="{1157782D-72F3-4195-AD17-A5E78211D43F}" srcId="{5E4A91D4-2366-4C60-BB3D-496C11657DC0}" destId="{9EEBD96E-C508-492D-AC9A-9F1A3119B996}" srcOrd="2" destOrd="0" parTransId="{A26C579B-D9A2-440D-B584-E528FA053B0A}" sibTransId="{0ACEC970-6B1A-4116-B74C-21C45883D78D}"/>
+    <dgm:cxn modelId="{023D50EC-9B26-4D30-9607-1DC34E9B762C}" srcId="{C1B80BE7-4DEE-497B-98D2-5A6920F4FB8E}" destId="{537D9D52-BB4C-4295-A6FC-1F3EE30F7C8A}" srcOrd="2" destOrd="0" parTransId="{051E6169-5FA5-4711-8079-FA56C87AB900}" sibTransId="{F0E984BC-DC53-47EA-8DC0-9C6E7F46139F}"/>
+    <dgm:cxn modelId="{CDA67E71-DC84-468A-9445-016A1BB1DE0B}" type="presOf" srcId="{4380BD8A-95E9-4652-8A89-911FA9702253}" destId="{CD836FDF-C536-42DD-9BC4-B637DEB11ABF}" srcOrd="1" destOrd="0" presId="urn:microsoft.com/office/officeart/2008/layout/HorizontalMultiLevelHierarchy"/>
+    <dgm:cxn modelId="{68D12645-EC3F-4459-918E-5085FBF8BE5F}" type="presOf" srcId="{34586700-4346-4804-BF1C-747D3EC8A904}" destId="{2B938EF2-BE37-4FC8-BFD3-6256540813BC}" srcOrd="0" destOrd="0" presId="urn:microsoft.com/office/officeart/2008/layout/HorizontalMultiLevelHierarchy"/>
+    <dgm:cxn modelId="{66A27823-B98C-444C-83B7-BCEF6D394B58}" srcId="{DF616C12-DFC6-40E5-BC46-E77E630699CC}" destId="{D8F92CDA-A645-45E2-B5DE-6A3BACB6C859}" srcOrd="0" destOrd="0" parTransId="{06A209AF-5EAF-4020-86BC-5E53C0A8567F}" sibTransId="{CAE32902-6313-4DE9-8D9B-B0BC18644EB0}"/>
+    <dgm:cxn modelId="{0D3D2457-E634-41C0-AE20-C5FAFC283B3B}" type="presOf" srcId="{DE9229B0-83CB-4AFE-B09E-2D25B676FB5D}" destId="{2293E997-8A42-4DE4-AFF5-CE2F2C46F300}" srcOrd="0" destOrd="0" presId="urn:microsoft.com/office/officeart/2008/layout/HorizontalMultiLevelHierarchy"/>
+    <dgm:cxn modelId="{8D509E34-F004-4A2F-8ABB-7C054D2FA32F}" type="presOf" srcId="{DC5215DC-63FE-4AB9-A5CA-19C1598E79BB}" destId="{C766337D-55E3-4319-A86A-D68705C17A30}" srcOrd="1" destOrd="0" presId="urn:microsoft.com/office/officeart/2008/layout/HorizontalMultiLevelHierarchy"/>
+    <dgm:cxn modelId="{F38319B7-1EF9-4C34-AC48-2A3F7D507909}" type="presOf" srcId="{34FEF89F-3256-4364-AB80-02C4079D03DE}" destId="{E6F6B072-371D-4957-ABC0-3B2C22D27DBF}" srcOrd="1" destOrd="0" presId="urn:microsoft.com/office/officeart/2008/layout/HorizontalMultiLevelHierarchy"/>
+    <dgm:cxn modelId="{861347DE-8DA3-447A-B870-2475671C6DA5}" srcId="{8DC7735B-9A6C-431C-92AA-042288E1B6AF}" destId="{9DF11BE9-0A90-4730-8388-20A441D98114}" srcOrd="1" destOrd="0" parTransId="{30687554-7B6A-4E42-B0D8-856A3E451C97}" sibTransId="{1142F7F2-C909-43CF-9BAF-0A9A0B91749C}"/>
+    <dgm:cxn modelId="{974BDEA0-3B95-48CE-9DCD-A280B7CD9533}" type="presOf" srcId="{03A1827D-0486-453D-8D6D-022439E5BEB5}" destId="{CBA4048E-18F5-45D0-B12C-301AA641B044}" srcOrd="1" destOrd="0" presId="urn:microsoft.com/office/officeart/2008/layout/HorizontalMultiLevelHierarchy"/>
+    <dgm:cxn modelId="{6FA7A831-01D9-4D43-959E-0EFE42468E38}" type="presOf" srcId="{FEB48055-1C34-422E-8C99-E4A7B59A7524}" destId="{BCF6B846-BCE0-4A36-AB58-F37D855BACB3}" srcOrd="0" destOrd="0" presId="urn:microsoft.com/office/officeart/2008/layout/HorizontalMultiLevelHierarchy"/>
+    <dgm:cxn modelId="{A7A1A0FA-1DE5-46FF-82D3-6B555E4B56AF}" type="presOf" srcId="{4E2FF37E-EF9E-4E13-A343-A28FDBF48B26}" destId="{F5B1B54B-C837-4500-B1F9-6B55EC063495}" srcOrd="0" destOrd="0" presId="urn:microsoft.com/office/officeart/2008/layout/HorizontalMultiLevelHierarchy"/>
+    <dgm:cxn modelId="{D5342207-BB6B-4D26-A140-7DB4DA7936DA}" type="presOf" srcId="{49D92B24-F087-4E31-A4F6-E7772D5AF36E}" destId="{E0BC23FD-A123-4F6F-B29F-B1B1A8DCFCAA}" srcOrd="0" destOrd="0" presId="urn:microsoft.com/office/officeart/2008/layout/HorizontalMultiLevelHierarchy"/>
     <dgm:cxn modelId="{E6CBB6B7-198A-498A-B69E-9521D473AA03}" type="presOf" srcId="{406A186A-33BC-4105-8835-7C5D35980A40}" destId="{7DD80175-2396-4084-9B4F-06D9AFA69696}" srcOrd="0" destOrd="0" presId="urn:microsoft.com/office/officeart/2008/layout/HorizontalMultiLevelHierarchy"/>
+    <dgm:cxn modelId="{806AAB25-7D31-422C-9950-4C135CED6002}" type="presOf" srcId="{CADCD632-196A-4857-843B-D027D5E1C826}" destId="{8326D004-29DB-4CCB-873E-728791BF390D}" srcOrd="1" destOrd="0" presId="urn:microsoft.com/office/officeart/2008/layout/HorizontalMultiLevelHierarchy"/>
+    <dgm:cxn modelId="{8E3CCA70-54B5-4D78-9A0F-E19E92F93E1B}" type="presOf" srcId="{30687554-7B6A-4E42-B0D8-856A3E451C97}" destId="{B46CE3C4-D8FC-4818-B7F0-507EA6A00C10}" srcOrd="1" destOrd="0" presId="urn:microsoft.com/office/officeart/2008/layout/HorizontalMultiLevelHierarchy"/>
+    <dgm:cxn modelId="{2299056C-FD09-4A24-90CE-E73DA03C00F7}" type="presOf" srcId="{FEB48055-1C34-422E-8C99-E4A7B59A7524}" destId="{6F3D5773-510D-44D2-9A00-874B9AD6C990}" srcOrd="1" destOrd="0" presId="urn:microsoft.com/office/officeart/2008/layout/HorizontalMultiLevelHierarchy"/>
+    <dgm:cxn modelId="{53404176-D94B-4222-9B06-05B20F95C1C7}" type="presOf" srcId="{88164397-DBD8-4D72-B38B-DE4BF4031B5D}" destId="{A8FC37A2-9B31-4489-B0A8-9E802EBAF3A0}" srcOrd="0" destOrd="0" presId="urn:microsoft.com/office/officeart/2008/layout/HorizontalMultiLevelHierarchy"/>
+    <dgm:cxn modelId="{438395A3-1BBC-41BE-8DF4-FA798EC10617}" srcId="{406A186A-33BC-4105-8835-7C5D35980A40}" destId="{75A5C761-B220-40FF-A8F1-BDF368427E79}" srcOrd="1" destOrd="0" parTransId="{997BBB56-0F09-47A1-9EDD-84E73DDCE053}" sibTransId="{17539A32-5ED5-47FE-9297-91D5384600FE}"/>
+    <dgm:cxn modelId="{CE4C7B90-573C-4ED1-9F8C-B613EC48112D}" type="presOf" srcId="{9ACA9546-4CA0-4D0D-A122-ADEA92156DDA}" destId="{843E92B2-B1C5-4679-9F13-92AE67F50E4B}" srcOrd="0" destOrd="0" presId="urn:microsoft.com/office/officeart/2008/layout/HorizontalMultiLevelHierarchy"/>
+    <dgm:cxn modelId="{BF324ABA-3FCD-41A9-BB43-53D6623CB4DC}" type="presOf" srcId="{75A5C761-B220-40FF-A8F1-BDF368427E79}" destId="{EFF0FDCC-9734-4C94-840C-8D241B8150A8}" srcOrd="0" destOrd="0" presId="urn:microsoft.com/office/officeart/2008/layout/HorizontalMultiLevelHierarchy"/>
+    <dgm:cxn modelId="{AA80B6A2-2F14-41E8-A0D8-A927BF2C96C3}" type="presOf" srcId="{BF2ECC47-8959-4178-94DF-C185E2DEE5DE}" destId="{B1B95A7D-A80C-4A8C-B5CC-608F51433E24}" srcOrd="0" destOrd="0" presId="urn:microsoft.com/office/officeart/2008/layout/HorizontalMultiLevelHierarchy"/>
+    <dgm:cxn modelId="{4556C305-87F7-4794-952A-321EE7D7C618}" type="presOf" srcId="{28B1DEF3-FA5E-434F-985A-593161F70089}" destId="{6C6D8E9D-7873-4EE3-A7C8-467DB1B38886}" srcOrd="0" destOrd="0" presId="urn:microsoft.com/office/officeart/2008/layout/HorizontalMultiLevelHierarchy"/>
+    <dgm:cxn modelId="{D4AF9259-4EBF-43D7-A890-0AB4B524BFA6}" type="presOf" srcId="{997BBB56-0F09-47A1-9EDD-84E73DDCE053}" destId="{416BF9B8-9B9E-4EDB-8EEE-AD34B69DF4A3}" srcOrd="1" destOrd="0" presId="urn:microsoft.com/office/officeart/2008/layout/HorizontalMultiLevelHierarchy"/>
+    <dgm:cxn modelId="{B212622B-E89A-410E-8DF2-21E1F16489BB}" srcId="{2BA398DC-44B5-4B11-A724-B73E05D7E9DF}" destId="{B744A046-4A74-4240-94C0-E4572C4E9202}" srcOrd="1" destOrd="0" parTransId="{FD783284-7709-4153-940E-9DD9E029E02A}" sibTransId="{988DCDD5-55C3-4C36-A62E-F8E1AF47FEF8}"/>
+    <dgm:cxn modelId="{312BB93A-87FC-4048-9E42-1B35BB662708}" type="presOf" srcId="{9A485257-A8D6-4397-BEDE-96D5D67A5BD8}" destId="{564E8B54-811C-4F63-8549-390678EFB2EA}" srcOrd="1" destOrd="0" presId="urn:microsoft.com/office/officeart/2008/layout/HorizontalMultiLevelHierarchy"/>
+    <dgm:cxn modelId="{E309E34A-2541-4093-AE96-D08C67BBA9F2}" type="presOf" srcId="{49D92B24-F087-4E31-A4F6-E7772D5AF36E}" destId="{2D6B1399-BFF2-49EA-9491-3E6335B75829}" srcOrd="1" destOrd="0" presId="urn:microsoft.com/office/officeart/2008/layout/HorizontalMultiLevelHierarchy"/>
+    <dgm:cxn modelId="{598D3D67-BC1B-443E-9833-8ACCA111D016}" type="presOf" srcId="{BD7D0AF9-68FE-4C26-A056-56C45A6F6BF0}" destId="{F3F472E3-5157-4A9E-B0CD-16FF248F6E0E}" srcOrd="0" destOrd="0" presId="urn:microsoft.com/office/officeart/2008/layout/HorizontalMultiLevelHierarchy"/>
+    <dgm:cxn modelId="{A2688F4C-A1C7-4151-B150-F8CDFD3DE9B6}" type="presOf" srcId="{760883ED-A9BB-405E-8F20-AFD9CCB96229}" destId="{3CE5715A-B463-4312-A59B-740DC19BA68B}" srcOrd="0" destOrd="0" presId="urn:microsoft.com/office/officeart/2008/layout/HorizontalMultiLevelHierarchy"/>
+    <dgm:cxn modelId="{E81FAA6C-D968-4DA0-984D-000F8B6D8402}" type="presOf" srcId="{24A460EE-1CA7-428D-8C6C-3007FD1B450B}" destId="{ADC4EBE8-08E2-4FE3-8945-6660CEF6994F}" srcOrd="0" destOrd="0" presId="urn:microsoft.com/office/officeart/2008/layout/HorizontalMultiLevelHierarchy"/>
+    <dgm:cxn modelId="{22040BE2-9A41-4EF8-BBE6-0F3D3582F3C1}" type="presOf" srcId="{DB9EFE37-A36C-430A-8B47-88C287516F23}" destId="{1C218697-7FEC-442C-BEAC-861EDBA1EE26}" srcOrd="0" destOrd="0" presId="urn:microsoft.com/office/officeart/2008/layout/HorizontalMultiLevelHierarchy"/>
+    <dgm:cxn modelId="{680F2C41-4AC9-43F5-A200-1525B08A5C20}" type="presOf" srcId="{2CFC024F-40D5-4978-B0D2-5F1E40D4091C}" destId="{1297A119-EB00-45FB-9E4C-7081D9FC3578}" srcOrd="0" destOrd="0" presId="urn:microsoft.com/office/officeart/2008/layout/HorizontalMultiLevelHierarchy"/>
+    <dgm:cxn modelId="{5C6F1EB7-FC88-40C1-93A7-33335865B239}" srcId="{09A61BE4-FBF2-4678-871E-03F8CFC0E905}" destId="{BD7D0AF9-68FE-4C26-A056-56C45A6F6BF0}" srcOrd="1" destOrd="0" parTransId="{A09624DF-DDC3-4005-AE6C-949C55F3D201}" sibTransId="{BA0B6355-B7B9-4035-B438-19C3E653E713}"/>
+    <dgm:cxn modelId="{9411AB8C-A928-4131-B0CC-5476637200AD}" srcId="{D8F92CDA-A645-45E2-B5DE-6A3BACB6C859}" destId="{2B18F95E-9338-43E9-A54D-7EB8F97F82C3}" srcOrd="1" destOrd="0" parTransId="{4380BD8A-95E9-4652-8A89-911FA9702253}" sibTransId="{2F9720C6-D07B-48D4-9DBA-4DC4417D4471}"/>
+    <dgm:cxn modelId="{F8360B02-CBE4-46B8-B678-61781A65F5FF}" type="presOf" srcId="{0B9BCD10-1EF6-4B84-A607-3FE578E09CF8}" destId="{A20128AE-AD89-4CEA-9148-E73F5681A2EE}" srcOrd="0" destOrd="0" presId="urn:microsoft.com/office/officeart/2008/layout/HorizontalMultiLevelHierarchy"/>
+    <dgm:cxn modelId="{E151C243-1DC3-4E19-9B74-B6879CFBBE57}" srcId="{2B18F95E-9338-43E9-A54D-7EB8F97F82C3}" destId="{8541E672-E0DC-4CA9-8C48-07F04E1AC87D}" srcOrd="1" destOrd="0" parTransId="{8CF6DB56-390F-448F-B8AD-AD66A9D9BF25}" sibTransId="{F472336C-F528-446B-BC65-FFF55677C318}"/>
+    <dgm:cxn modelId="{1E8C2C99-6FE9-4910-BF70-446748759C8D}" srcId="{8DC7735B-9A6C-431C-92AA-042288E1B6AF}" destId="{DE9229B0-83CB-4AFE-B09E-2D25B676FB5D}" srcOrd="0" destOrd="0" parTransId="{DEA1A0C5-BE8D-4B82-B1D8-B4B9DCF4CE1A}" sibTransId="{2F5473A1-4FE3-4875-907C-12B17C85165B}"/>
+    <dgm:cxn modelId="{237AC8DC-2CD1-4575-B3A9-2C5D42DAEF1A}" type="presOf" srcId="{9A485257-A8D6-4397-BEDE-96D5D67A5BD8}" destId="{51ABB488-7F6B-4F15-BF1E-13957DECDEA0}" srcOrd="0" destOrd="0" presId="urn:microsoft.com/office/officeart/2008/layout/HorizontalMultiLevelHierarchy"/>
+    <dgm:cxn modelId="{F342924C-89D7-4CE0-B55E-1988852B0259}" type="presOf" srcId="{62B13B07-F327-4E52-AE5C-A801CC6497E5}" destId="{5538A203-67B7-43B0-B95B-E0940F75E978}" srcOrd="1" destOrd="0" presId="urn:microsoft.com/office/officeart/2008/layout/HorizontalMultiLevelHierarchy"/>
+    <dgm:cxn modelId="{D489B8BF-B8CA-4BB6-A416-E6DD54D36BC7}" type="presOf" srcId="{B585FA61-ABCC-4C00-904E-F590963CA53E}" destId="{1E06D912-FF04-489C-8B3E-C635F21EF1DC}" srcOrd="1" destOrd="0" presId="urn:microsoft.com/office/officeart/2008/layout/HorizontalMultiLevelHierarchy"/>
+    <dgm:cxn modelId="{08516F75-D767-448D-8BE2-626EAD79AE1A}" srcId="{B9FBD615-B794-4D86-840E-D8BA2BA2AF71}" destId="{2BA398DC-44B5-4B11-A724-B73E05D7E9DF}" srcOrd="1" destOrd="0" parTransId="{59511E4B-8EFD-40C1-8769-41EC8A3006F1}" sibTransId="{DEAC2088-FA27-458D-B266-ECB1AFB7A26A}"/>
+    <dgm:cxn modelId="{C442590F-3BD0-46D2-BCEC-84DD05E75446}" type="presOf" srcId="{F40FF744-1F56-479B-AA89-A0EF61A8890A}" destId="{BEF9F8C4-0E1E-499B-85B7-D8C2527B7D6A}" srcOrd="1" destOrd="0" presId="urn:microsoft.com/office/officeart/2008/layout/HorizontalMultiLevelHierarchy"/>
+    <dgm:cxn modelId="{FC830A7B-C3B9-41A0-8361-BEC45EF72205}" type="presOf" srcId="{DC5215DC-63FE-4AB9-A5CA-19C1598E79BB}" destId="{6E28F844-322A-4B11-9FD3-C3F3F369B4BB}" srcOrd="0" destOrd="0" presId="urn:microsoft.com/office/officeart/2008/layout/HorizontalMultiLevelHierarchy"/>
+    <dgm:cxn modelId="{72D747E2-7A24-4507-90CE-D56B28D36106}" type="presOf" srcId="{62B13B07-F327-4E52-AE5C-A801CC6497E5}" destId="{9D957ECC-C536-4171-9E3F-ADA463C520DE}" srcOrd="0" destOrd="0" presId="urn:microsoft.com/office/officeart/2008/layout/HorizontalMultiLevelHierarchy"/>
+    <dgm:cxn modelId="{8C669E8E-F3A6-46C2-9FEA-5A6D35E93BBB}" type="presOf" srcId="{B376DC1C-1A4D-4446-88F6-4DFB0AAC6190}" destId="{EEA2D9E6-5C3F-47D0-A681-0364417D24E2}" srcOrd="0" destOrd="0" presId="urn:microsoft.com/office/officeart/2008/layout/HorizontalMultiLevelHierarchy"/>
+    <dgm:cxn modelId="{66959252-2C68-4B96-B3F0-E71A2075B1F2}" type="presOf" srcId="{051E6169-5FA5-4711-8079-FA56C87AB900}" destId="{0F4448C4-16D0-412B-B97C-B3EE8C574400}" srcOrd="0" destOrd="0" presId="urn:microsoft.com/office/officeart/2008/layout/HorizontalMultiLevelHierarchy"/>
+    <dgm:cxn modelId="{4A327383-9EF4-4480-9723-6CAC144F5A6D}" srcId="{1B24B018-AD53-4723-9DBC-CD780D3AF7E6}" destId="{88164397-DBD8-4D72-B38B-DE4BF4031B5D}" srcOrd="1" destOrd="0" parTransId="{9A871F26-74E8-4736-985B-EF3BB73DFE34}" sibTransId="{5F96EB68-5BC5-44B9-AAB1-96E5B35432F1}"/>
     <dgm:cxn modelId="{A1BDC95B-12A9-4905-9501-78D18A4F3124}" type="presOf" srcId="{0A69AB74-1AD1-4AE0-92DB-B767AF2EA9BB}" destId="{F5AEC9DD-8EC1-4C4F-AF6D-C8CF1FEBEDBD}" srcOrd="1" destOrd="0" presId="urn:microsoft.com/office/officeart/2008/layout/HorizontalMultiLevelHierarchy"/>
-    <dgm:cxn modelId="{526A87B8-F805-4B7F-A775-8A23A54430AE}" type="presOf" srcId="{051E6169-5FA5-4711-8079-FA56C87AB900}" destId="{26A1B052-FF5B-4D0A-80E9-1DA688CD3D7D}" srcOrd="1" destOrd="0" presId="urn:microsoft.com/office/officeart/2008/layout/HorizontalMultiLevelHierarchy"/>
+    <dgm:cxn modelId="{7EDA0548-677A-4CD0-8D99-6495D41E8385}" type="presOf" srcId="{34586700-4346-4804-BF1C-747D3EC8A904}" destId="{FCBB2CBA-CAD5-4A99-91DC-CC9D1C91FDCC}" srcOrd="1" destOrd="0" presId="urn:microsoft.com/office/officeart/2008/layout/HorizontalMultiLevelHierarchy"/>
+    <dgm:cxn modelId="{4C1E32DE-6B41-4949-ABB2-3067568C366A}" srcId="{5E4A91D4-2366-4C60-BB3D-496C11657DC0}" destId="{3AD458C6-8419-4D84-9762-23D8C70DAE66}" srcOrd="0" destOrd="0" parTransId="{28B1DEF3-FA5E-434F-985A-593161F70089}" sibTransId="{A88E28B4-7BB8-4343-8CB3-F71BAF5EB0BF}"/>
+    <dgm:cxn modelId="{AAF8CD24-7028-490D-B031-DDA1A1D8FB46}" type="presOf" srcId="{F40FF744-1F56-479B-AA89-A0EF61A8890A}" destId="{7137EB5A-E346-4115-9F66-B74C3542748E}" srcOrd="0" destOrd="0" presId="urn:microsoft.com/office/officeart/2008/layout/HorizontalMultiLevelHierarchy"/>
     <dgm:cxn modelId="{E276D944-319D-4490-B8A6-6AAAAC46A42F}" type="presOf" srcId="{9CE6119C-2BD8-4D82-857F-27695498162C}" destId="{713A720F-F6BF-407E-86B7-8CE4A23E47B5}" srcOrd="1" destOrd="0" presId="urn:microsoft.com/office/officeart/2008/layout/HorizontalMultiLevelHierarchy"/>
-    <dgm:cxn modelId="{237AC8DC-2CD1-4575-B3A9-2C5D42DAEF1A}" type="presOf" srcId="{9A485257-A8D6-4397-BEDE-96D5D67A5BD8}" destId="{51ABB488-7F6B-4F15-BF1E-13957DECDEA0}" srcOrd="0" destOrd="0" presId="urn:microsoft.com/office/officeart/2008/layout/HorizontalMultiLevelHierarchy"/>
-    <dgm:cxn modelId="{D4AF9259-4EBF-43D7-A890-0AB4B524BFA6}" type="presOf" srcId="{997BBB56-0F09-47A1-9EDD-84E73DDCE053}" destId="{416BF9B8-9B9E-4EDB-8EEE-AD34B69DF4A3}" srcOrd="1" destOrd="0" presId="urn:microsoft.com/office/officeart/2008/layout/HorizontalMultiLevelHierarchy"/>
+    <dgm:cxn modelId="{A360A27B-7A4F-4F5A-A8D8-10426122DD2A}" srcId="{9A727AB6-4DAD-40D1-AFE1-8312D97F8394}" destId="{0B9BCD10-1EF6-4B84-A607-3FE578E09CF8}" srcOrd="0" destOrd="0" parTransId="{9B1A2F7C-2450-441A-8E98-5590A0216C0F}" sibTransId="{89CD8B21-1F04-4F2E-8276-B6F6A8FDD728}"/>
+    <dgm:cxn modelId="{E0DF3A59-E14E-4C7A-830F-2F076F529C32}" type="presOf" srcId="{09A61BE4-FBF2-4678-871E-03F8CFC0E905}" destId="{14B6996B-15A7-4C3C-95B1-F4570CC1C169}" srcOrd="0" destOrd="0" presId="urn:microsoft.com/office/officeart/2008/layout/HorizontalMultiLevelHierarchy"/>
+    <dgm:cxn modelId="{E47B5DB3-DD92-4F5C-A4CD-438D32EFCF14}" srcId="{5E4A91D4-2366-4C60-BB3D-496C11657DC0}" destId="{1C1944A6-354A-4452-AC1A-3CB32B31AB4A}" srcOrd="1" destOrd="0" parTransId="{9A485257-A8D6-4397-BEDE-96D5D67A5BD8}" sibTransId="{741B0DB4-536A-4FA5-9A70-32EA3328B6E9}"/>
+    <dgm:cxn modelId="{7B045C63-B0BE-40DA-AB96-E730CCA09FC4}" srcId="{C1B80BE7-4DEE-497B-98D2-5A6920F4FB8E}" destId="{641F7873-2D89-4584-89E6-13C8B89C0D32}" srcOrd="0" destOrd="0" parTransId="{FEB48055-1C34-422E-8C99-E4A7B59A7524}" sibTransId="{96A2E5C7-2CF0-423F-BFE0-93FA06ED6F48}"/>
+    <dgm:cxn modelId="{3A1E4BCD-10FF-4F2E-A4C8-E8E4C32B521F}" type="presOf" srcId="{D03DBC73-9966-47D9-8ACA-08F2AE277311}" destId="{3C88D30A-236C-421C-8732-EB921582DAAC}" srcOrd="1" destOrd="0" presId="urn:microsoft.com/office/officeart/2008/layout/HorizontalMultiLevelHierarchy"/>
+    <dgm:cxn modelId="{32F6D06B-1387-40A9-98EB-275DC7610273}" type="presOf" srcId="{1C1944A6-354A-4452-AC1A-3CB32B31AB4A}" destId="{057661AD-CB3F-4EFF-A165-3CB41187F5B8}" srcOrd="0" destOrd="0" presId="urn:microsoft.com/office/officeart/2008/layout/HorizontalMultiLevelHierarchy"/>
+    <dgm:cxn modelId="{3BFFA573-B543-49A1-BB06-F45E87F54B2C}" type="presOf" srcId="{9A727AB6-4DAD-40D1-AFE1-8312D97F8394}" destId="{65D4BBB4-1790-4173-81B6-560190FD91AB}" srcOrd="0" destOrd="0" presId="urn:microsoft.com/office/officeart/2008/layout/HorizontalMultiLevelHierarchy"/>
+    <dgm:cxn modelId="{8FCFBD36-F133-40B3-AFF9-3C0FE09F7959}" srcId="{8DC7735B-9A6C-431C-92AA-042288E1B6AF}" destId="{2CFC024F-40D5-4978-B0D2-5F1E40D4091C}" srcOrd="2" destOrd="0" parTransId="{B585FA61-ABCC-4C00-904E-F590963CA53E}" sibTransId="{0F4A212E-DFC1-47F1-9D57-F1300933BA27}"/>
+    <dgm:cxn modelId="{33685DCB-1271-4436-B83A-651236C7B5A2}" type="presOf" srcId="{2D0898D9-1379-4C8B-848A-4DE9262983B4}" destId="{BFA8CB9D-9F1D-4CD9-9D73-5A458DABA331}" srcOrd="0" destOrd="0" presId="urn:microsoft.com/office/officeart/2008/layout/HorizontalMultiLevelHierarchy"/>
+    <dgm:cxn modelId="{3C6DBA84-9CDB-41B6-A6DB-26E1527305A5}" type="presOf" srcId="{9B1A2F7C-2450-441A-8E98-5590A0216C0F}" destId="{0EEB810B-6E8E-42CE-8965-1DA2530F1893}" srcOrd="1" destOrd="0" presId="urn:microsoft.com/office/officeart/2008/layout/HorizontalMultiLevelHierarchy"/>
+    <dgm:cxn modelId="{18178193-528B-483B-8C56-EC85A91D43B0}" srcId="{D6A6EF0D-3890-4564-B47F-BA7E2FFC336B}" destId="{322F58AD-DE9A-4B44-9BA0-D689707D8FD4}" srcOrd="1" destOrd="0" parTransId="{34FEF89F-3256-4364-AB80-02C4079D03DE}" sibTransId="{F418BD0F-7D67-4ABD-A1AE-C465AAE64CE7}"/>
+    <dgm:cxn modelId="{B055FE51-A5ED-44E7-B1D1-E6ED1C9605DC}" type="presOf" srcId="{5E4A91D4-2366-4C60-BB3D-496C11657DC0}" destId="{35ACB2AC-382A-4C97-A906-4B1EC627FF3B}" srcOrd="0" destOrd="0" presId="urn:microsoft.com/office/officeart/2008/layout/HorizontalMultiLevelHierarchy"/>
+    <dgm:cxn modelId="{B9DA3036-D7DD-49E9-9AD4-515E1CC3D168}" type="presOf" srcId="{92CA22EE-41F8-4C23-BA80-310383AE6AFD}" destId="{C8A74607-627B-4791-8B31-4BA4E02B4D7C}" srcOrd="0" destOrd="0" presId="urn:microsoft.com/office/officeart/2008/layout/HorizontalMultiLevelHierarchy"/>
+    <dgm:cxn modelId="{9EBBF0F9-BDED-4531-A1FA-CA878D37D00E}" type="presOf" srcId="{9EEBD96E-C508-492D-AC9A-9F1A3119B996}" destId="{5F45AA15-FBB3-4B44-8E68-EED9491C0D70}" srcOrd="0" destOrd="0" presId="urn:microsoft.com/office/officeart/2008/layout/HorizontalMultiLevelHierarchy"/>
+    <dgm:cxn modelId="{ACCDA6C4-902D-4C2D-8E77-21EB010A1276}" type="presOf" srcId="{537D9D52-BB4C-4295-A6FC-1F3EE30F7C8A}" destId="{C75D1124-C505-4361-BD55-C3934A33A542}" srcOrd="0" destOrd="0" presId="urn:microsoft.com/office/officeart/2008/layout/HorizontalMultiLevelHierarchy"/>
+    <dgm:cxn modelId="{6186CF23-8F98-46DB-98A7-F1A80F6273EE}" type="presOf" srcId="{1B24B018-AD53-4723-9DBC-CD780D3AF7E6}" destId="{1A4238F2-78DE-41D2-AD7D-244E70141D53}" srcOrd="0" destOrd="0" presId="urn:microsoft.com/office/officeart/2008/layout/HorizontalMultiLevelHierarchy"/>
+    <dgm:cxn modelId="{C0AD8CD7-D8F4-4B38-8A51-D889AD14A718}" type="presOf" srcId="{9DF11BE9-0A90-4730-8388-20A441D98114}" destId="{44701C57-D211-4D71-857F-299A0D735E28}" srcOrd="0" destOrd="0" presId="urn:microsoft.com/office/officeart/2008/layout/HorizontalMultiLevelHierarchy"/>
+    <dgm:cxn modelId="{3A37C727-8DD4-436B-8133-66237D514867}" type="presOf" srcId="{2BA398DC-44B5-4B11-A724-B73E05D7E9DF}" destId="{9DE0F9C2-8935-4BB2-9E9C-937F7C914306}" srcOrd="0" destOrd="0" presId="urn:microsoft.com/office/officeart/2008/layout/HorizontalMultiLevelHierarchy"/>
+    <dgm:cxn modelId="{4467E879-3E61-4991-8A6A-C5A1A63B49F4}" type="presOf" srcId="{3AD458C6-8419-4D84-9762-23D8C70DAE66}" destId="{F477F308-696E-4EBB-A389-B7BC50374169}" srcOrd="0" destOrd="0" presId="urn:microsoft.com/office/officeart/2008/layout/HorizontalMultiLevelHierarchy"/>
+    <dgm:cxn modelId="{5EE60A42-D6D6-41EE-9A84-AB1D0B1E8C4B}" type="presOf" srcId="{4E2FF37E-EF9E-4E13-A343-A28FDBF48B26}" destId="{D842F95B-B05B-4DE0-B764-8E26B5379FF0}" srcOrd="1" destOrd="0" presId="urn:microsoft.com/office/officeart/2008/layout/HorizontalMultiLevelHierarchy"/>
+    <dgm:cxn modelId="{CCFE51A7-D92E-4107-827A-C589150E9601}" type="presOf" srcId="{8DC7735B-9A6C-431C-92AA-042288E1B6AF}" destId="{D13E8E78-0981-47B7-B509-860D838BA781}" srcOrd="0" destOrd="0" presId="urn:microsoft.com/office/officeart/2008/layout/HorizontalMultiLevelHierarchy"/>
+    <dgm:cxn modelId="{2C415728-5E2E-461D-93B5-C65A85E264C7}" type="presOf" srcId="{A26C579B-D9A2-440D-B584-E528FA053B0A}" destId="{59AE2245-54FD-442F-826F-E34D3A5503D3}" srcOrd="0" destOrd="0" presId="urn:microsoft.com/office/officeart/2008/layout/HorizontalMultiLevelHierarchy"/>
+    <dgm:cxn modelId="{39410F08-B859-4A15-BE8D-9A9E537EC5E9}" type="presOf" srcId="{2B18F95E-9338-43E9-A54D-7EB8F97F82C3}" destId="{2FE9D669-7948-4A54-92D5-EFA1A86CD105}" srcOrd="0" destOrd="0" presId="urn:microsoft.com/office/officeart/2008/layout/HorizontalMultiLevelHierarchy"/>
+    <dgm:cxn modelId="{24938C9D-C44A-4D1C-9481-B6139A09BF54}" type="presOf" srcId="{322F58AD-DE9A-4B44-9BA0-D689707D8FD4}" destId="{9C97ECFE-35CB-4952-AA99-AABD5BBDF8F7}" srcOrd="0" destOrd="0" presId="urn:microsoft.com/office/officeart/2008/layout/HorizontalMultiLevelHierarchy"/>
+    <dgm:cxn modelId="{3AD09F63-CDA7-49A8-BDBC-BFDCDE193064}" type="presOf" srcId="{C971CB4A-ACE5-46F8-AE5B-3AFE92D0959D}" destId="{A53E1177-1715-4EBC-8FFF-D2B6BE4DA7DF}" srcOrd="0" destOrd="0" presId="urn:microsoft.com/office/officeart/2008/layout/HorizontalMultiLevelHierarchy"/>
+    <dgm:cxn modelId="{1CF98111-217C-433D-9ADE-F8163B5A11E3}" type="presOf" srcId="{BF2ECC47-8959-4178-94DF-C185E2DEE5DE}" destId="{D089DFB8-6D68-45D6-93AE-4D04E31DEDBD}" srcOrd="1" destOrd="0" presId="urn:microsoft.com/office/officeart/2008/layout/HorizontalMultiLevelHierarchy"/>
+    <dgm:cxn modelId="{B928830C-76B0-4413-A554-50384C624BF3}" srcId="{09A61BE4-FBF2-4678-871E-03F8CFC0E905}" destId="{9ACA9546-4CA0-4D0D-A122-ADEA92156DDA}" srcOrd="0" destOrd="0" parTransId="{B376DC1C-1A4D-4446-88F6-4DFB0AAC6190}" sibTransId="{6060A363-DEB2-4884-8F47-7BE2C926C8F8}"/>
+    <dgm:cxn modelId="{83A475B5-B300-4862-A56D-9C6BD455BC49}" type="presOf" srcId="{D81D785B-9DE7-4820-AFB6-E6C98C246EFC}" destId="{D95C901E-1098-4296-B1C0-A32F05673786}" srcOrd="0" destOrd="0" presId="urn:microsoft.com/office/officeart/2008/layout/HorizontalMultiLevelHierarchy"/>
     <dgm:cxn modelId="{03D82455-46C9-4A36-946C-50373B7E3126}" type="presOf" srcId="{A09624DF-DDC3-4005-AE6C-949C55F3D201}" destId="{F1112124-658A-4BB6-8E6A-682CC333D5E0}" srcOrd="1" destOrd="0" presId="urn:microsoft.com/office/officeart/2008/layout/HorizontalMultiLevelHierarchy"/>
-    <dgm:cxn modelId="{9411AB8C-A928-4131-B0CC-5476637200AD}" srcId="{D8F92CDA-A645-45E2-B5DE-6A3BACB6C859}" destId="{2B18F95E-9338-43E9-A54D-7EB8F97F82C3}" srcOrd="1" destOrd="0" parTransId="{4380BD8A-95E9-4652-8A89-911FA9702253}" sibTransId="{2F9720C6-D07B-48D4-9DBA-4DC4417D4471}"/>
-    <dgm:cxn modelId="{8C669E8E-F3A6-46C2-9FEA-5A6D35E93BBB}" type="presOf" srcId="{B376DC1C-1A4D-4446-88F6-4DFB0AAC6190}" destId="{EEA2D9E6-5C3F-47D0-A681-0364417D24E2}" srcOrd="0" destOrd="0" presId="urn:microsoft.com/office/officeart/2008/layout/HorizontalMultiLevelHierarchy"/>
+    <dgm:cxn modelId="{F6F53734-EA2A-43D5-B234-2DCAED7A8E5D}" type="presOf" srcId="{D8F92CDA-A645-45E2-B5DE-6A3BACB6C859}" destId="{67239EAB-1659-405F-9D37-5E8449D29F93}" srcOrd="0" destOrd="0" presId="urn:microsoft.com/office/officeart/2008/layout/HorizontalMultiLevelHierarchy"/>
+    <dgm:cxn modelId="{33CF75AD-8066-46D1-B95A-36C88CEACE7D}" type="presOf" srcId="{28B1DEF3-FA5E-434F-985A-593161F70089}" destId="{B10566F1-6764-4207-91A3-FAD8D64F1C28}" srcOrd="1" destOrd="0" presId="urn:microsoft.com/office/officeart/2008/layout/HorizontalMultiLevelHierarchy"/>
+    <dgm:cxn modelId="{ACE703CE-B203-41A5-A5BA-25025AEF9285}" srcId="{0B9BCD10-1EF6-4B84-A607-3FE578E09CF8}" destId="{24A460EE-1CA7-428D-8C6C-3007FD1B450B}" srcOrd="2" destOrd="0" parTransId="{2C5D07FC-2E11-4C25-B11B-D468629BAEA7}" sibTransId="{4DC157B1-ED9F-496C-B37F-F986FB92159F}"/>
+    <dgm:cxn modelId="{F762D2E4-68EB-4B2A-ADA2-ABD87ADC2F3E}" type="presOf" srcId="{B9FBD615-B794-4D86-840E-D8BA2BA2AF71}" destId="{71B02E8A-448E-4584-80E9-059B52DDB850}" srcOrd="0" destOrd="0" presId="urn:microsoft.com/office/officeart/2008/layout/HorizontalMultiLevelHierarchy"/>
+    <dgm:cxn modelId="{05D65667-9A85-4391-9AF5-961881DEEE5A}" type="presOf" srcId="{9CE6119C-2BD8-4D82-857F-27695498162C}" destId="{A3E99873-9A6B-448D-882B-6A1290124BE0}" srcOrd="0" destOrd="0" presId="urn:microsoft.com/office/officeart/2008/layout/HorizontalMultiLevelHierarchy"/>
+    <dgm:cxn modelId="{24EBC399-A533-4DD9-99A5-B26A1EF21F3F}" type="presOf" srcId="{FD783284-7709-4153-940E-9DD9E029E02A}" destId="{426AC0E4-BEF7-4521-B5BF-B55008593BD6}" srcOrd="1" destOrd="0" presId="urn:microsoft.com/office/officeart/2008/layout/HorizontalMultiLevelHierarchy"/>
+    <dgm:cxn modelId="{756D8C65-2479-46B8-A072-D2D3FAB7D43A}" type="presOf" srcId="{59511E4B-8EFD-40C1-8769-41EC8A3006F1}" destId="{54971FDB-F67F-4F3B-92B6-E77D3DFFDC8A}" srcOrd="0" destOrd="0" presId="urn:microsoft.com/office/officeart/2008/layout/HorizontalMultiLevelHierarchy"/>
+    <dgm:cxn modelId="{A9D5B926-42E6-4193-AE27-EE8D84ABA3B7}" srcId="{760883ED-A9BB-405E-8F20-AFD9CCB96229}" destId="{D81D785B-9DE7-4820-AFB6-E6C98C246EFC}" srcOrd="1" destOrd="0" parTransId="{4E2FF37E-EF9E-4E13-A343-A28FDBF48B26}" sibTransId="{89B4AE6E-7A37-4304-A076-D03A56D9A3D5}"/>
+    <dgm:cxn modelId="{2902542B-334F-4E04-A930-E271580E6ED4}" type="presOf" srcId="{8CF6DB56-390F-448F-B8AD-AD66A9D9BF25}" destId="{BCB0C310-6712-457C-83F4-AD90D18B30F1}" srcOrd="0" destOrd="0" presId="urn:microsoft.com/office/officeart/2008/layout/HorizontalMultiLevelHierarchy"/>
+    <dgm:cxn modelId="{57B8D45F-04CF-457A-A4ED-88E0106D1772}" type="presOf" srcId="{D03DBC73-9966-47D9-8ACA-08F2AE277311}" destId="{6FB29898-0152-4460-9FA2-C023B30AA889}" srcOrd="0" destOrd="0" presId="urn:microsoft.com/office/officeart/2008/layout/HorizontalMultiLevelHierarchy"/>
+    <dgm:cxn modelId="{9655C251-82EC-4546-B5C3-E7820580E64E}" type="presOf" srcId="{DF616C12-DFC6-40E5-BC46-E77E630699CC}" destId="{9F3D299C-912D-48E4-AE76-DBF8471D0058}" srcOrd="0" destOrd="0" presId="urn:microsoft.com/office/officeart/2008/layout/HorizontalMultiLevelHierarchy"/>
+    <dgm:cxn modelId="{9EB3195B-FD55-456B-860D-B59B230328CD}" type="presOf" srcId="{4380BD8A-95E9-4652-8A89-911FA9702253}" destId="{11CBC200-06F7-4DD2-9C34-18F45043F91F}" srcOrd="0" destOrd="0" presId="urn:microsoft.com/office/officeart/2008/layout/HorizontalMultiLevelHierarchy"/>
+    <dgm:cxn modelId="{BA98743E-B70A-430A-ABC8-50FF2FBFDE26}" type="presOf" srcId="{25AB21D2-ED78-4C5E-B945-4D2D0E9CFB55}" destId="{536E7EEE-AE26-4F15-B7DF-40567D90432E}" srcOrd="0" destOrd="0" presId="urn:microsoft.com/office/officeart/2008/layout/HorizontalMultiLevelHierarchy"/>
+    <dgm:cxn modelId="{C8128AF9-826D-4BA6-8EA1-07D8850B53E2}" srcId="{C1B80BE7-4DEE-497B-98D2-5A6920F4FB8E}" destId="{2D0898D9-1379-4C8B-848A-4DE9262983B4}" srcOrd="1" destOrd="0" parTransId="{9CE6119C-2BD8-4D82-857F-27695498162C}" sibTransId="{D4711AB0-E9D9-47E2-A8EB-1A377D29D6AB}"/>
+    <dgm:cxn modelId="{0170356D-0E79-4771-AEF4-5F2BB26DB428}" srcId="{1B24B018-AD53-4723-9DBC-CD780D3AF7E6}" destId="{C1B80BE7-4DEE-497B-98D2-5A6920F4FB8E}" srcOrd="0" destOrd="0" parTransId="{F40FF744-1F56-479B-AA89-A0EF61A8890A}" sibTransId="{B25B9810-DE16-4F8F-B2B2-7C0B2E9FCF23}"/>
+    <dgm:cxn modelId="{558A6E26-99F4-4842-A47F-BB8606B49EDB}" type="presOf" srcId="{B585FA61-ABCC-4C00-904E-F590963CA53E}" destId="{EF1303F6-08C0-48FA-B58F-D294B3FD0956}" srcOrd="0" destOrd="0" presId="urn:microsoft.com/office/officeart/2008/layout/HorizontalMultiLevelHierarchy"/>
+    <dgm:cxn modelId="{9F3D4254-B3A4-480B-B764-CD0DE6909E39}" type="presOf" srcId="{641F7873-2D89-4584-89E6-13C8B89C0D32}" destId="{2F691A7C-9BCD-4E4F-A41F-920122DDC012}" srcOrd="0" destOrd="0" presId="urn:microsoft.com/office/officeart/2008/layout/HorizontalMultiLevelHierarchy"/>
+    <dgm:cxn modelId="{6CA32B3D-2E12-4AB3-A420-EDC30F748704}" srcId="{D6A6EF0D-3890-4564-B47F-BA7E2FFC336B}" destId="{C971CB4A-ACE5-46F8-AE5B-3AFE92D0959D}" srcOrd="0" destOrd="0" parTransId="{DB9EFE37-A36C-430A-8B47-88C287516F23}" sibTransId="{5690AA9A-114B-4FAC-8D60-A56F159BD628}"/>
+    <dgm:cxn modelId="{EDFFE7DD-3DD6-4505-A66C-AFE6E440F812}" type="presOf" srcId="{2C5D07FC-2E11-4C25-B11B-D468629BAEA7}" destId="{D2297108-BBF1-4A06-A0FE-E40031175864}" srcOrd="1" destOrd="0" presId="urn:microsoft.com/office/officeart/2008/layout/HorizontalMultiLevelHierarchy"/>
+    <dgm:cxn modelId="{E9F0CC81-E15D-4EC0-A978-E263E8990868}" srcId="{0B9BCD10-1EF6-4B84-A607-3FE578E09CF8}" destId="{25AB21D2-ED78-4C5E-B945-4D2D0E9CFB55}" srcOrd="1" destOrd="0" parTransId="{CADCD632-196A-4857-843B-D027D5E1C826}" sibTransId="{68DFEF4E-9ED3-4348-82A8-E2207D27558D}"/>
+    <dgm:cxn modelId="{48ED6C7A-2B20-4509-861C-E2B650C9C62F}" type="presOf" srcId="{D6A6EF0D-3890-4564-B47F-BA7E2FFC336B}" destId="{BADDFD11-6D6A-4F6A-8B2E-2F492D67B8FF}" srcOrd="0" destOrd="0" presId="urn:microsoft.com/office/officeart/2008/layout/HorizontalMultiLevelHierarchy"/>
+    <dgm:cxn modelId="{F93F5359-0861-4984-865C-CAC5788245EC}" type="presOf" srcId="{0FBFC397-7581-450D-9E09-11221034CB1F}" destId="{3277378E-1025-4B91-B646-B39624C63CFC}" srcOrd="0" destOrd="0" presId="urn:microsoft.com/office/officeart/2008/layout/HorizontalMultiLevelHierarchy"/>
+    <dgm:cxn modelId="{C7CC8891-6ECF-4CCD-A223-BC1A15825A1A}" type="presOf" srcId="{8541E672-E0DC-4CA9-8C48-07F04E1AC87D}" destId="{8539FE12-B94A-4DB5-9363-D625963A994D}" srcOrd="0" destOrd="0" presId="urn:microsoft.com/office/officeart/2008/layout/HorizontalMultiLevelHierarchy"/>
+    <dgm:cxn modelId="{F6BD47B1-E4C9-469C-90D3-3873B0FD882C}" type="presOf" srcId="{997BBB56-0F09-47A1-9EDD-84E73DDCE053}" destId="{11A95FA8-BC12-4F2B-93AC-994CC23CB247}" srcOrd="0" destOrd="0" presId="urn:microsoft.com/office/officeart/2008/layout/HorizontalMultiLevelHierarchy"/>
+    <dgm:cxn modelId="{C204746F-9360-4D9D-A941-80CE7D7C2729}" srcId="{2B18F95E-9338-43E9-A54D-7EB8F97F82C3}" destId="{406A186A-33BC-4105-8835-7C5D35980A40}" srcOrd="0" destOrd="0" parTransId="{DC5215DC-63FE-4AB9-A5CA-19C1598E79BB}" sibTransId="{0016C189-12DE-41B5-BFFB-F01413D9BAF6}"/>
+    <dgm:cxn modelId="{4DD222DF-C542-40B3-BE5D-9E836477DD2B}" type="presOf" srcId="{2C5D07FC-2E11-4C25-B11B-D468629BAEA7}" destId="{FDF87123-BEAA-4C8C-BE86-B5F423001575}" srcOrd="0" destOrd="0" presId="urn:microsoft.com/office/officeart/2008/layout/HorizontalMultiLevelHierarchy"/>
+    <dgm:cxn modelId="{E4B2C7CA-0AEB-4F4C-AFE0-E7D062A9E714}" srcId="{0B9BCD10-1EF6-4B84-A607-3FE578E09CF8}" destId="{B9FBD615-B794-4D86-840E-D8BA2BA2AF71}" srcOrd="0" destOrd="0" parTransId="{49D92B24-F087-4E31-A4F6-E7772D5AF36E}" sibTransId="{FC3E2AA8-67C2-46F0-8E41-56E3D801110F}"/>
+    <dgm:cxn modelId="{447A3D2D-D238-46C1-99F3-95BB3A0A1063}" type="presOf" srcId="{DEA1A0C5-BE8D-4B82-B1D8-B4B9DCF4CE1A}" destId="{E6122314-4232-42C9-987E-46FE0FA3495B}" srcOrd="0" destOrd="0" presId="urn:microsoft.com/office/officeart/2008/layout/HorizontalMultiLevelHierarchy"/>
+    <dgm:cxn modelId="{1DAC132B-AAC1-4A00-8D5A-06E5590D6271}" type="presOf" srcId="{9A871F26-74E8-4736-985B-EF3BB73DFE34}" destId="{15AE2F48-9DB0-4B24-ADB3-E3970E729EE5}" srcOrd="1" destOrd="0" presId="urn:microsoft.com/office/officeart/2008/layout/HorizontalMultiLevelHierarchy"/>
+    <dgm:cxn modelId="{9D443CF1-5C82-48F8-9FEB-E565EBC3801B}" srcId="{09A61BE4-FBF2-4678-871E-03F8CFC0E905}" destId="{92CA22EE-41F8-4C23-BA80-310383AE6AFD}" srcOrd="2" destOrd="0" parTransId="{34586700-4346-4804-BF1C-747D3EC8A904}" sibTransId="{4FCB76E3-A272-4DCC-A200-4963C5F7C588}"/>
+    <dgm:cxn modelId="{818C5901-157D-4E0D-8721-D7923B55F53C}" srcId="{2BA398DC-44B5-4B11-A724-B73E05D7E9DF}" destId="{5E4A91D4-2366-4C60-BB3D-496C11657DC0}" srcOrd="0" destOrd="0" parTransId="{26479144-D9B7-4B50-8D7C-51FE0917EA76}" sibTransId="{423EFA55-F537-444B-A59D-5885F36136D9}"/>
+    <dgm:cxn modelId="{F111ADB6-1BB9-4C5E-964E-B65800CB0793}" type="presOf" srcId="{26479144-D9B7-4B50-8D7C-51FE0917EA76}" destId="{EAA5B856-0115-455E-A97E-BB584CD51E7D}" srcOrd="1" destOrd="0" presId="urn:microsoft.com/office/officeart/2008/layout/HorizontalMultiLevelHierarchy"/>
+    <dgm:cxn modelId="{9FCF1EEF-9288-4A35-9300-258913D8F95E}" type="presOf" srcId="{8CF6DB56-390F-448F-B8AD-AD66A9D9BF25}" destId="{5ECC096B-424B-4AE3-9CAF-347D26D92FBF}" srcOrd="1" destOrd="0" presId="urn:microsoft.com/office/officeart/2008/layout/HorizontalMultiLevelHierarchy"/>
+    <dgm:cxn modelId="{4D1868B3-148F-4F71-A708-469F6DEC5B07}" type="presOf" srcId="{A26C579B-D9A2-440D-B584-E528FA053B0A}" destId="{70AD1357-89BE-4B28-B9F5-7D58CDC1F51E}" srcOrd="1" destOrd="0" presId="urn:microsoft.com/office/officeart/2008/layout/HorizontalMultiLevelHierarchy"/>
+    <dgm:cxn modelId="{76DC0312-C289-4FD4-80B0-19BB822935B9}" srcId="{B9FBD615-B794-4D86-840E-D8BA2BA2AF71}" destId="{1B24B018-AD53-4723-9DBC-CD780D3AF7E6}" srcOrd="0" destOrd="0" parTransId="{D03DBC73-9966-47D9-8ACA-08F2AE277311}" sibTransId="{91254DB3-D8AE-41DC-8D06-472B928DA01A}"/>
+    <dgm:cxn modelId="{1512EAA9-05D3-4B46-92EE-0556A01DE870}" srcId="{760883ED-A9BB-405E-8F20-AFD9CCB96229}" destId="{D6A6EF0D-3890-4564-B47F-BA7E2FFC336B}" srcOrd="0" destOrd="0" parTransId="{BF2ECC47-8959-4178-94DF-C185E2DEE5DE}" sibTransId="{E955CF51-D20A-4EAE-9C1A-064DCE94EDD5}"/>
+    <dgm:cxn modelId="{29DB230F-6B91-4402-A027-6BCE177E020B}" srcId="{B9FBD615-B794-4D86-840E-D8BA2BA2AF71}" destId="{760883ED-A9BB-405E-8F20-AFD9CCB96229}" srcOrd="2" destOrd="0" parTransId="{0FBFC397-7581-450D-9E09-11221034CB1F}" sibTransId="{491C78DF-55D3-4DFF-A2B3-D13610BF38C8}"/>
+    <dgm:cxn modelId="{F405EE8B-6AB6-4CE7-95F1-9CDB233D747D}" type="presOf" srcId="{A09624DF-DDC3-4005-AE6C-949C55F3D201}" destId="{646E88BD-40D7-4786-AAB6-CFE3405707CA}" srcOrd="0" destOrd="0" presId="urn:microsoft.com/office/officeart/2008/layout/HorizontalMultiLevelHierarchy"/>
+    <dgm:cxn modelId="{DA371626-71DC-435A-AB46-3EB51E1D73BE}" type="presOf" srcId="{9B1A2F7C-2450-441A-8E98-5590A0216C0F}" destId="{4DD7F22F-5100-4F0E-840A-57F6C2B4824E}" srcOrd="0" destOrd="0" presId="urn:microsoft.com/office/officeart/2008/layout/HorizontalMultiLevelHierarchy"/>
+    <dgm:cxn modelId="{2288930F-53E6-4EE6-ADDE-2436FA49AA32}" type="presOf" srcId="{B376DC1C-1A4D-4446-88F6-4DFB0AAC6190}" destId="{ACF0F1AD-F143-4BEB-B9B0-4355CC987FF0}" srcOrd="1" destOrd="0" presId="urn:microsoft.com/office/officeart/2008/layout/HorizontalMultiLevelHierarchy"/>
     <dgm:cxn modelId="{DA7F3B17-79EF-449E-9CF3-CD54F59F54CF}" srcId="{D8F92CDA-A645-45E2-B5DE-6A3BACB6C859}" destId="{09A61BE4-FBF2-4678-871E-03F8CFC0E905}" srcOrd="0" destOrd="0" parTransId="{0A69AB74-1AD1-4AE0-92DB-B767AF2EA9BB}" sibTransId="{924BAC8B-B9E5-4258-BED5-43D9C539A109}"/>
-    <dgm:cxn modelId="{76DC0312-C289-4FD4-80B0-19BB822935B9}" srcId="{B9FBD615-B794-4D86-840E-D8BA2BA2AF71}" destId="{1B24B018-AD53-4723-9DBC-CD780D3AF7E6}" srcOrd="0" destOrd="0" parTransId="{D03DBC73-9966-47D9-8ACA-08F2AE277311}" sibTransId="{91254DB3-D8AE-41DC-8D06-472B928DA01A}"/>
-    <dgm:cxn modelId="{7B045C63-B0BE-40DA-AB96-E730CCA09FC4}" srcId="{C1B80BE7-4DEE-497B-98D2-5A6920F4FB8E}" destId="{641F7873-2D89-4584-89E6-13C8B89C0D32}" srcOrd="0" destOrd="0" parTransId="{FEB48055-1C34-422E-8C99-E4A7B59A7524}" sibTransId="{96A2E5C7-2CF0-423F-BFE0-93FA06ED6F48}"/>
-    <dgm:cxn modelId="{023D50EC-9B26-4D30-9607-1DC34E9B762C}" srcId="{C1B80BE7-4DEE-497B-98D2-5A6920F4FB8E}" destId="{537D9D52-BB4C-4295-A6FC-1F3EE30F7C8A}" srcOrd="2" destOrd="0" parTransId="{051E6169-5FA5-4711-8079-FA56C87AB900}" sibTransId="{F0E984BC-DC53-47EA-8DC0-9C6E7F46139F}"/>
-    <dgm:cxn modelId="{F6F53734-EA2A-43D5-B234-2DCAED7A8E5D}" type="presOf" srcId="{D8F92CDA-A645-45E2-B5DE-6A3BACB6C859}" destId="{67239EAB-1659-405F-9D37-5E8449D29F93}" srcOrd="0" destOrd="0" presId="urn:microsoft.com/office/officeart/2008/layout/HorizontalMultiLevelHierarchy"/>
-    <dgm:cxn modelId="{CCFE51A7-D92E-4107-827A-C589150E9601}" type="presOf" srcId="{8DC7735B-9A6C-431C-92AA-042288E1B6AF}" destId="{D13E8E78-0981-47B7-B509-860D838BA781}" srcOrd="0" destOrd="0" presId="urn:microsoft.com/office/officeart/2008/layout/HorizontalMultiLevelHierarchy"/>
-    <dgm:cxn modelId="{D489B8BF-B8CA-4BB6-A416-E6DD54D36BC7}" type="presOf" srcId="{B585FA61-ABCC-4C00-904E-F590963CA53E}" destId="{1E06D912-FF04-489C-8B3E-C635F21EF1DC}" srcOrd="1" destOrd="0" presId="urn:microsoft.com/office/officeart/2008/layout/HorizontalMultiLevelHierarchy"/>
-    <dgm:cxn modelId="{861347DE-8DA3-447A-B870-2475671C6DA5}" srcId="{8DC7735B-9A6C-431C-92AA-042288E1B6AF}" destId="{9DF11BE9-0A90-4730-8388-20A441D98114}" srcOrd="1" destOrd="0" parTransId="{30687554-7B6A-4E42-B0D8-856A3E451C97}" sibTransId="{1142F7F2-C909-43CF-9BAF-0A9A0B91749C}"/>
-    <dgm:cxn modelId="{9D443CF1-5C82-48F8-9FEB-E565EBC3801B}" srcId="{09A61BE4-FBF2-4678-871E-03F8CFC0E905}" destId="{92CA22EE-41F8-4C23-BA80-310383AE6AFD}" srcOrd="2" destOrd="0" parTransId="{34586700-4346-4804-BF1C-747D3EC8A904}" sibTransId="{4FCB76E3-A272-4DCC-A200-4963C5F7C588}"/>
-    <dgm:cxn modelId="{BF324ABA-3FCD-41A9-BB43-53D6623CB4DC}" type="presOf" srcId="{75A5C761-B220-40FF-A8F1-BDF368427E79}" destId="{EFF0FDCC-9734-4C94-840C-8D241B8150A8}" srcOrd="0" destOrd="0" presId="urn:microsoft.com/office/officeart/2008/layout/HorizontalMultiLevelHierarchy"/>
-    <dgm:cxn modelId="{9F3D4254-B3A4-480B-B764-CD0DE6909E39}" type="presOf" srcId="{641F7873-2D89-4584-89E6-13C8B89C0D32}" destId="{2F691A7C-9BCD-4E4F-A41F-920122DDC012}" srcOrd="0" destOrd="0" presId="urn:microsoft.com/office/officeart/2008/layout/HorizontalMultiLevelHierarchy"/>
-    <dgm:cxn modelId="{ACE703CE-B203-41A5-A5BA-25025AEF9285}" srcId="{0B9BCD10-1EF6-4B84-A607-3FE578E09CF8}" destId="{24A460EE-1CA7-428D-8C6C-3007FD1B450B}" srcOrd="2" destOrd="0" parTransId="{2C5D07FC-2E11-4C25-B11B-D468629BAEA7}" sibTransId="{4DC157B1-ED9F-496C-B37F-F986FB92159F}"/>
-    <dgm:cxn modelId="{4556C305-87F7-4794-952A-321EE7D7C618}" type="presOf" srcId="{28B1DEF3-FA5E-434F-985A-593161F70089}" destId="{6C6D8E9D-7873-4EE3-A7C8-467DB1B38886}" srcOrd="0" destOrd="0" presId="urn:microsoft.com/office/officeart/2008/layout/HorizontalMultiLevelHierarchy"/>
+    <dgm:cxn modelId="{758EC6AE-BD15-4628-B3F9-205BB2C431BC}" type="presOf" srcId="{0A69AB74-1AD1-4AE0-92DB-B767AF2EA9BB}" destId="{F3C8D12A-0632-4387-A3A7-62683536F1D8}" srcOrd="0" destOrd="0" presId="urn:microsoft.com/office/officeart/2008/layout/HorizontalMultiLevelHierarchy"/>
+    <dgm:cxn modelId="{03B47563-6297-4DD5-BF79-10133E41E5CD}" type="presOf" srcId="{FD783284-7709-4153-940E-9DD9E029E02A}" destId="{67D635C0-48F2-4C8E-A3A2-F35C9A9E45DC}" srcOrd="0" destOrd="0" presId="urn:microsoft.com/office/officeart/2008/layout/HorizontalMultiLevelHierarchy"/>
+    <dgm:cxn modelId="{E8C98B9E-69E4-4EF5-81A5-2180D64E6D44}" type="presOf" srcId="{59511E4B-8EFD-40C1-8769-41EC8A3006F1}" destId="{9B99E809-B197-4823-8F4F-A9A5674BCDDC}" srcOrd="1" destOrd="0" presId="urn:microsoft.com/office/officeart/2008/layout/HorizontalMultiLevelHierarchy"/>
+    <dgm:cxn modelId="{2AA6A6AE-5526-43E0-841C-591C6F3782D6}" type="presOf" srcId="{9A871F26-74E8-4736-985B-EF3BB73DFE34}" destId="{E7DB1CDA-3D4C-4818-A88C-6D185D722EC6}" srcOrd="0" destOrd="0" presId="urn:microsoft.com/office/officeart/2008/layout/HorizontalMultiLevelHierarchy"/>
+    <dgm:cxn modelId="{0AE8A402-39C5-45D0-8010-65B839616D86}" type="presOf" srcId="{0FBFC397-7581-450D-9E09-11221034CB1F}" destId="{ED27862D-C3E6-427A-885B-0E48DC7843BB}" srcOrd="1" destOrd="0" presId="urn:microsoft.com/office/officeart/2008/layout/HorizontalMultiLevelHierarchy"/>
     <dgm:cxn modelId="{7515D751-7881-464B-9CEA-B6E0EE4F8F9D}" type="presOf" srcId="{B744A046-4A74-4240-94C0-E4572C4E9202}" destId="{3EE425C3-9686-4BDF-A704-1B7FE956B70F}" srcOrd="0" destOrd="0" presId="urn:microsoft.com/office/officeart/2008/layout/HorizontalMultiLevelHierarchy"/>
-    <dgm:cxn modelId="{E47B5DB3-DD92-4F5C-A4CD-438D32EFCF14}" srcId="{5E4A91D4-2366-4C60-BB3D-496C11657DC0}" destId="{1C1944A6-354A-4452-AC1A-3CB32B31AB4A}" srcOrd="1" destOrd="0" parTransId="{9A485257-A8D6-4397-BEDE-96D5D67A5BD8}" sibTransId="{741B0DB4-536A-4FA5-9A70-32EA3328B6E9}"/>
-    <dgm:cxn modelId="{490CFF5B-BAB5-4C69-927D-552C39D31FC1}" type="presOf" srcId="{C1B80BE7-4DEE-497B-98D2-5A6920F4FB8E}" destId="{7A687C9C-1CE1-4FCD-8F95-CDF2CE96AF7A}" srcOrd="0" destOrd="0" presId="urn:microsoft.com/office/officeart/2008/layout/HorizontalMultiLevelHierarchy"/>
-    <dgm:cxn modelId="{C442590F-3BD0-46D2-BCEC-84DD05E75446}" type="presOf" srcId="{F40FF744-1F56-479B-AA89-A0EF61A8890A}" destId="{BEF9F8C4-0E1E-499B-85B7-D8C2527B7D6A}" srcOrd="1" destOrd="0" presId="urn:microsoft.com/office/officeart/2008/layout/HorizontalMultiLevelHierarchy"/>
-    <dgm:cxn modelId="{D5342207-BB6B-4D26-A140-7DB4DA7936DA}" type="presOf" srcId="{49D92B24-F087-4E31-A4F6-E7772D5AF36E}" destId="{E0BC23FD-A123-4F6F-B29F-B1B1A8DCFCAA}" srcOrd="0" destOrd="0" presId="urn:microsoft.com/office/officeart/2008/layout/HorizontalMultiLevelHierarchy"/>
-    <dgm:cxn modelId="{3BFFA573-B543-49A1-BB06-F45E87F54B2C}" type="presOf" srcId="{9A727AB6-4DAD-40D1-AFE1-8312D97F8394}" destId="{65D4BBB4-1790-4173-81B6-560190FD91AB}" srcOrd="0" destOrd="0" presId="urn:microsoft.com/office/officeart/2008/layout/HorizontalMultiLevelHierarchy"/>
-    <dgm:cxn modelId="{39410F08-B859-4A15-BE8D-9A9E537EC5E9}" type="presOf" srcId="{2B18F95E-9338-43E9-A54D-7EB8F97F82C3}" destId="{2FE9D669-7948-4A54-92D5-EFA1A86CD105}" srcOrd="0" destOrd="0" presId="urn:microsoft.com/office/officeart/2008/layout/HorizontalMultiLevelHierarchy"/>
-    <dgm:cxn modelId="{AAF8CD24-7028-490D-B031-DDA1A1D8FB46}" type="presOf" srcId="{F40FF744-1F56-479B-AA89-A0EF61A8890A}" destId="{7137EB5A-E346-4115-9F66-B74C3542748E}" srcOrd="0" destOrd="0" presId="urn:microsoft.com/office/officeart/2008/layout/HorizontalMultiLevelHierarchy"/>
-    <dgm:cxn modelId="{756D8C65-2479-46B8-A072-D2D3FAB7D43A}" type="presOf" srcId="{59511E4B-8EFD-40C1-8769-41EC8A3006F1}" destId="{54971FDB-F67F-4F3B-92B6-E77D3DFFDC8A}" srcOrd="0" destOrd="0" presId="urn:microsoft.com/office/officeart/2008/layout/HorizontalMultiLevelHierarchy"/>
-    <dgm:cxn modelId="{C0AD8CD7-D8F4-4B38-8A51-D889AD14A718}" type="presOf" srcId="{9DF11BE9-0A90-4730-8388-20A441D98114}" destId="{44701C57-D211-4D71-857F-299A0D735E28}" srcOrd="0" destOrd="0" presId="urn:microsoft.com/office/officeart/2008/layout/HorizontalMultiLevelHierarchy"/>
-    <dgm:cxn modelId="{DA371626-71DC-435A-AB46-3EB51E1D73BE}" type="presOf" srcId="{9B1A2F7C-2450-441A-8E98-5590A0216C0F}" destId="{4DD7F22F-5100-4F0E-840A-57F6C2B4824E}" srcOrd="0" destOrd="0" presId="urn:microsoft.com/office/officeart/2008/layout/HorizontalMultiLevelHierarchy"/>
-    <dgm:cxn modelId="{3A1E4BCD-10FF-4F2E-A4C8-E8E4C32B521F}" type="presOf" srcId="{D03DBC73-9966-47D9-8ACA-08F2AE277311}" destId="{3C88D30A-236C-421C-8732-EB921582DAAC}" srcOrd="1" destOrd="0" presId="urn:microsoft.com/office/officeart/2008/layout/HorizontalMultiLevelHierarchy"/>
-    <dgm:cxn modelId="{E0DF3A59-E14E-4C7A-830F-2F076F529C32}" type="presOf" srcId="{09A61BE4-FBF2-4678-871E-03F8CFC0E905}" destId="{14B6996B-15A7-4C3C-95B1-F4570CC1C169}" srcOrd="0" destOrd="0" presId="urn:microsoft.com/office/officeart/2008/layout/HorizontalMultiLevelHierarchy"/>
-    <dgm:cxn modelId="{7EDA0548-677A-4CD0-8D99-6495D41E8385}" type="presOf" srcId="{34586700-4346-4804-BF1C-747D3EC8A904}" destId="{FCBB2CBA-CAD5-4A99-91DC-CC9D1C91FDCC}" srcOrd="1" destOrd="0" presId="urn:microsoft.com/office/officeart/2008/layout/HorizontalMultiLevelHierarchy"/>
-    <dgm:cxn modelId="{8D509E34-F004-4A2F-8ABB-7C054D2FA32F}" type="presOf" srcId="{DC5215DC-63FE-4AB9-A5CA-19C1598E79BB}" destId="{C766337D-55E3-4319-A86A-D68705C17A30}" srcOrd="1" destOrd="0" presId="urn:microsoft.com/office/officeart/2008/layout/HorizontalMultiLevelHierarchy"/>
-    <dgm:cxn modelId="{57B8D45F-04CF-457A-A4ED-88E0106D1772}" type="presOf" srcId="{D03DBC73-9966-47D9-8ACA-08F2AE277311}" destId="{6FB29898-0152-4460-9FA2-C023B30AA889}" srcOrd="0" destOrd="0" presId="urn:microsoft.com/office/officeart/2008/layout/HorizontalMultiLevelHierarchy"/>
-    <dgm:cxn modelId="{E81FAA6C-D968-4DA0-984D-000F8B6D8402}" type="presOf" srcId="{24A460EE-1CA7-428D-8C6C-3007FD1B450B}" destId="{ADC4EBE8-08E2-4FE3-8945-6660CEF6994F}" srcOrd="0" destOrd="0" presId="urn:microsoft.com/office/officeart/2008/layout/HorizontalMultiLevelHierarchy"/>
-    <dgm:cxn modelId="{0170356D-0E79-4771-AEF4-5F2BB26DB428}" srcId="{1B24B018-AD53-4723-9DBC-CD780D3AF7E6}" destId="{C1B80BE7-4DEE-497B-98D2-5A6920F4FB8E}" srcOrd="0" destOrd="0" parTransId="{F40FF744-1F56-479B-AA89-A0EF61A8890A}" sibTransId="{B25B9810-DE16-4F8F-B2B2-7C0B2E9FCF23}"/>
-    <dgm:cxn modelId="{BA98743E-B70A-430A-ABC8-50FF2FBFDE26}" type="presOf" srcId="{25AB21D2-ED78-4C5E-B945-4D2D0E9CFB55}" destId="{536E7EEE-AE26-4F15-B7DF-40567D90432E}" srcOrd="0" destOrd="0" presId="urn:microsoft.com/office/officeart/2008/layout/HorizontalMultiLevelHierarchy"/>
-    <dgm:cxn modelId="{6FA7A831-01D9-4D43-959E-0EFE42468E38}" type="presOf" srcId="{FEB48055-1C34-422E-8C99-E4A7B59A7524}" destId="{BCF6B846-BCE0-4A36-AB58-F37D855BACB3}" srcOrd="0" destOrd="0" presId="urn:microsoft.com/office/officeart/2008/layout/HorizontalMultiLevelHierarchy"/>
-    <dgm:cxn modelId="{9EBBF0F9-BDED-4531-A1FA-CA878D37D00E}" type="presOf" srcId="{9EEBD96E-C508-492D-AC9A-9F1A3119B996}" destId="{5F45AA15-FBB3-4B44-8E68-EED9491C0D70}" srcOrd="0" destOrd="0" presId="urn:microsoft.com/office/officeart/2008/layout/HorizontalMultiLevelHierarchy"/>
-    <dgm:cxn modelId="{E9F0CC81-E15D-4EC0-A978-E263E8990868}" srcId="{0B9BCD10-1EF6-4B84-A607-3FE578E09CF8}" destId="{25AB21D2-ED78-4C5E-B945-4D2D0E9CFB55}" srcOrd="1" destOrd="0" parTransId="{CADCD632-196A-4857-843B-D027D5E1C826}" sibTransId="{68DFEF4E-9ED3-4348-82A8-E2207D27558D}"/>
-    <dgm:cxn modelId="{33CF75AD-8066-46D1-B95A-36C88CEACE7D}" type="presOf" srcId="{28B1DEF3-FA5E-434F-985A-593161F70089}" destId="{B10566F1-6764-4207-91A3-FAD8D64F1C28}" srcOrd="1" destOrd="0" presId="urn:microsoft.com/office/officeart/2008/layout/HorizontalMultiLevelHierarchy"/>
-    <dgm:cxn modelId="{F6BD47B1-E4C9-469C-90D3-3873B0FD882C}" type="presOf" srcId="{997BBB56-0F09-47A1-9EDD-84E73DDCE053}" destId="{11A95FA8-BC12-4F2B-93AC-994CC23CB247}" srcOrd="0" destOrd="0" presId="urn:microsoft.com/office/officeart/2008/layout/HorizontalMultiLevelHierarchy"/>
-    <dgm:cxn modelId="{66959252-2C68-4B96-B3F0-E71A2075B1F2}" type="presOf" srcId="{051E6169-5FA5-4711-8079-FA56C87AB900}" destId="{0F4448C4-16D0-412B-B97C-B3EE8C574400}" srcOrd="0" destOrd="0" presId="urn:microsoft.com/office/officeart/2008/layout/HorizontalMultiLevelHierarchy"/>
-    <dgm:cxn modelId="{F762D2E4-68EB-4B2A-ADA2-ABD87ADC2F3E}" type="presOf" srcId="{B9FBD615-B794-4D86-840E-D8BA2BA2AF71}" destId="{71B02E8A-448E-4584-80E9-059B52DDB850}" srcOrd="0" destOrd="0" presId="urn:microsoft.com/office/officeart/2008/layout/HorizontalMultiLevelHierarchy"/>
-    <dgm:cxn modelId="{4A327383-9EF4-4480-9723-6CAC144F5A6D}" srcId="{1B24B018-AD53-4723-9DBC-CD780D3AF7E6}" destId="{88164397-DBD8-4D72-B38B-DE4BF4031B5D}" srcOrd="1" destOrd="0" parTransId="{9A871F26-74E8-4736-985B-EF3BB73DFE34}" sibTransId="{5F96EB68-5BC5-44B9-AAB1-96E5B35432F1}"/>
-    <dgm:cxn modelId="{5012F5CF-617A-4B7C-9750-407CE29B9699}" type="presOf" srcId="{CADCD632-196A-4857-843B-D027D5E1C826}" destId="{C4C9488E-7BE6-4FC9-9B22-FCEA0EF43662}" srcOrd="0" destOrd="0" presId="urn:microsoft.com/office/officeart/2008/layout/HorizontalMultiLevelHierarchy"/>
-    <dgm:cxn modelId="{FC830A7B-C3B9-41A0-8361-BEC45EF72205}" type="presOf" srcId="{DC5215DC-63FE-4AB9-A5CA-19C1598E79BB}" destId="{6E28F844-322A-4B11-9FD3-C3F3F369B4BB}" srcOrd="0" destOrd="0" presId="urn:microsoft.com/office/officeart/2008/layout/HorizontalMultiLevelHierarchy"/>
-    <dgm:cxn modelId="{758EC6AE-BD15-4628-B3F9-205BB2C431BC}" type="presOf" srcId="{0A69AB74-1AD1-4AE0-92DB-B767AF2EA9BB}" destId="{F3C8D12A-0632-4387-A3A7-62683536F1D8}" srcOrd="0" destOrd="0" presId="urn:microsoft.com/office/officeart/2008/layout/HorizontalMultiLevelHierarchy"/>
-    <dgm:cxn modelId="{312BB93A-87FC-4048-9E42-1B35BB662708}" type="presOf" srcId="{9A485257-A8D6-4397-BEDE-96D5D67A5BD8}" destId="{564E8B54-811C-4F63-8549-390678EFB2EA}" srcOrd="1" destOrd="0" presId="urn:microsoft.com/office/officeart/2008/layout/HorizontalMultiLevelHierarchy"/>
-    <dgm:cxn modelId="{E151C243-1DC3-4E19-9B74-B6879CFBBE57}" srcId="{2B18F95E-9338-43E9-A54D-7EB8F97F82C3}" destId="{8541E672-E0DC-4CA9-8C48-07F04E1AC87D}" srcOrd="1" destOrd="0" parTransId="{8CF6DB56-390F-448F-B8AD-AD66A9D9BF25}" sibTransId="{F472336C-F528-446B-BC65-FFF55677C318}"/>
-    <dgm:cxn modelId="{72D747E2-7A24-4507-90CE-D56B28D36106}" type="presOf" srcId="{62B13B07-F327-4E52-AE5C-A801CC6497E5}" destId="{9D957ECC-C536-4171-9E3F-ADA463C520DE}" srcOrd="0" destOrd="0" presId="urn:microsoft.com/office/officeart/2008/layout/HorizontalMultiLevelHierarchy"/>
-    <dgm:cxn modelId="{68D12645-EC3F-4459-918E-5085FBF8BE5F}" type="presOf" srcId="{34586700-4346-4804-BF1C-747D3EC8A904}" destId="{2B938EF2-BE37-4FC8-BFD3-6256540813BC}" srcOrd="0" destOrd="0" presId="urn:microsoft.com/office/officeart/2008/layout/HorizontalMultiLevelHierarchy"/>
-    <dgm:cxn modelId="{6186CF23-8F98-46DB-98A7-F1A80F6273EE}" type="presOf" srcId="{1B24B018-AD53-4723-9DBC-CD780D3AF7E6}" destId="{1A4238F2-78DE-41D2-AD7D-244E70141D53}" srcOrd="0" destOrd="0" presId="urn:microsoft.com/office/officeart/2008/layout/HorizontalMultiLevelHierarchy"/>
-    <dgm:cxn modelId="{4DD222DF-C542-40B3-BE5D-9E836477DD2B}" type="presOf" srcId="{2C5D07FC-2E11-4C25-B11B-D468629BAEA7}" destId="{FDF87123-BEAA-4C8C-BE86-B5F423001575}" srcOrd="0" destOrd="0" presId="urn:microsoft.com/office/officeart/2008/layout/HorizontalMultiLevelHierarchy"/>
-    <dgm:cxn modelId="{A360A27B-7A4F-4F5A-A8D8-10426122DD2A}" srcId="{9A727AB6-4DAD-40D1-AFE1-8312D97F8394}" destId="{0B9BCD10-1EF6-4B84-A607-3FE578E09CF8}" srcOrd="0" destOrd="0" parTransId="{9B1A2F7C-2450-441A-8E98-5590A0216C0F}" sibTransId="{89CD8B21-1F04-4F2E-8276-B6F6A8FDD728}"/>
-    <dgm:cxn modelId="{08516F75-D767-448D-8BE2-626EAD79AE1A}" srcId="{B9FBD615-B794-4D86-840E-D8BA2BA2AF71}" destId="{2BA398DC-44B5-4B11-A724-B73E05D7E9DF}" srcOrd="1" destOrd="0" parTransId="{59511E4B-8EFD-40C1-8769-41EC8A3006F1}" sibTransId="{DEAC2088-FA27-458D-B266-ECB1AFB7A26A}"/>
-    <dgm:cxn modelId="{2C415728-5E2E-461D-93B5-C65A85E264C7}" type="presOf" srcId="{A26C579B-D9A2-440D-B584-E528FA053B0A}" destId="{59AE2245-54FD-442F-826F-E34D3A5503D3}" srcOrd="0" destOrd="0" presId="urn:microsoft.com/office/officeart/2008/layout/HorizontalMultiLevelHierarchy"/>
-    <dgm:cxn modelId="{53404176-D94B-4222-9B06-05B20F95C1C7}" type="presOf" srcId="{88164397-DBD8-4D72-B38B-DE4BF4031B5D}" destId="{A8FC37A2-9B31-4489-B0A8-9E802EBAF3A0}" srcOrd="0" destOrd="0" presId="urn:microsoft.com/office/officeart/2008/layout/HorizontalMultiLevelHierarchy"/>
-    <dgm:cxn modelId="{4467E879-3E61-4991-8A6A-C5A1A63B49F4}" type="presOf" srcId="{3AD458C6-8419-4D84-9762-23D8C70DAE66}" destId="{F477F308-696E-4EBB-A389-B7BC50374169}" srcOrd="0" destOrd="0" presId="urn:microsoft.com/office/officeart/2008/layout/HorizontalMultiLevelHierarchy"/>
-    <dgm:cxn modelId="{806AAB25-7D31-422C-9950-4C135CED6002}" type="presOf" srcId="{CADCD632-196A-4857-843B-D027D5E1C826}" destId="{8326D004-29DB-4CCB-873E-728791BF390D}" srcOrd="1" destOrd="0" presId="urn:microsoft.com/office/officeart/2008/layout/HorizontalMultiLevelHierarchy"/>
-    <dgm:cxn modelId="{2902542B-334F-4E04-A930-E271580E6ED4}" type="presOf" srcId="{8CF6DB56-390F-448F-B8AD-AD66A9D9BF25}" destId="{BCB0C310-6712-457C-83F4-AD90D18B30F1}" srcOrd="0" destOrd="0" presId="urn:microsoft.com/office/officeart/2008/layout/HorizontalMultiLevelHierarchy"/>
-    <dgm:cxn modelId="{6F9468CD-6492-408D-9163-16E80F613DD4}" srcId="{D8F92CDA-A645-45E2-B5DE-6A3BACB6C859}" destId="{9A727AB6-4DAD-40D1-AFE1-8312D97F8394}" srcOrd="2" destOrd="0" parTransId="{03A1827D-0486-453D-8D6D-022439E5BEB5}" sibTransId="{5844ED66-CD55-407C-94D2-DAB670402374}"/>
-    <dgm:cxn modelId="{558A6E26-99F4-4842-A47F-BB8606B49EDB}" type="presOf" srcId="{B585FA61-ABCC-4C00-904E-F590963CA53E}" destId="{EF1303F6-08C0-48FA-B58F-D294B3FD0956}" srcOrd="0" destOrd="0" presId="urn:microsoft.com/office/officeart/2008/layout/HorizontalMultiLevelHierarchy"/>
-    <dgm:cxn modelId="{4A84C0BD-AA51-483C-91BE-6B9C1567A259}" srcId="{406A186A-33BC-4105-8835-7C5D35980A40}" destId="{8DC7735B-9A6C-431C-92AA-042288E1B6AF}" srcOrd="0" destOrd="0" parTransId="{62B13B07-F327-4E52-AE5C-A801CC6497E5}" sibTransId="{D54DEC93-19CD-4835-857E-9EABBFDAD2C8}"/>
-    <dgm:cxn modelId="{9FCF1EEF-9288-4A35-9300-258913D8F95E}" type="presOf" srcId="{8CF6DB56-390F-448F-B8AD-AD66A9D9BF25}" destId="{5ECC096B-424B-4AE3-9CAF-347D26D92FBF}" srcOrd="1" destOrd="0" presId="urn:microsoft.com/office/officeart/2008/layout/HorizontalMultiLevelHierarchy"/>
-    <dgm:cxn modelId="{32F6D06B-1387-40A9-98EB-275DC7610273}" type="presOf" srcId="{1C1944A6-354A-4452-AC1A-3CB32B31AB4A}" destId="{057661AD-CB3F-4EFF-A165-3CB41187F5B8}" srcOrd="0" destOrd="0" presId="urn:microsoft.com/office/officeart/2008/layout/HorizontalMultiLevelHierarchy"/>
-    <dgm:cxn modelId="{C5533B9D-7ADC-4314-82C1-C4841A3B2538}" type="presOf" srcId="{03A1827D-0486-453D-8D6D-022439E5BEB5}" destId="{3F497CFA-6478-4309-8C27-A4BBA02D3D1D}" srcOrd="0" destOrd="0" presId="urn:microsoft.com/office/officeart/2008/layout/HorizontalMultiLevelHierarchy"/>
-    <dgm:cxn modelId="{E4B2C7CA-0AEB-4F4C-AFE0-E7D062A9E714}" srcId="{0B9BCD10-1EF6-4B84-A607-3FE578E09CF8}" destId="{B9FBD615-B794-4D86-840E-D8BA2BA2AF71}" srcOrd="0" destOrd="0" parTransId="{49D92B24-F087-4E31-A4F6-E7772D5AF36E}" sibTransId="{FC3E2AA8-67C2-46F0-8E41-56E3D801110F}"/>
-    <dgm:cxn modelId="{03B47563-6297-4DD5-BF79-10133E41E5CD}" type="presOf" srcId="{FD783284-7709-4153-940E-9DD9E029E02A}" destId="{67D635C0-48F2-4C8E-A3A2-F35C9A9E45DC}" srcOrd="0" destOrd="0" presId="urn:microsoft.com/office/officeart/2008/layout/HorizontalMultiLevelHierarchy"/>
-    <dgm:cxn modelId="{0EED5EAD-78F8-45FD-81BD-8E983C727040}" type="presOf" srcId="{26479144-D9B7-4B50-8D7C-51FE0917EA76}" destId="{E8B9E04F-8911-439D-A990-57E0C8BD86F4}" srcOrd="0" destOrd="0" presId="urn:microsoft.com/office/officeart/2008/layout/HorizontalMultiLevelHierarchy"/>
-    <dgm:cxn modelId="{447A3D2D-D238-46C1-99F3-95BB3A0A1063}" type="presOf" srcId="{DEA1A0C5-BE8D-4B82-B1D8-B4B9DCF4CE1A}" destId="{E6122314-4232-42C9-987E-46FE0FA3495B}" srcOrd="0" destOrd="0" presId="urn:microsoft.com/office/officeart/2008/layout/HorizontalMultiLevelHierarchy"/>
-    <dgm:cxn modelId="{8E3CCA70-54B5-4D78-9A0F-E19E92F93E1B}" type="presOf" srcId="{30687554-7B6A-4E42-B0D8-856A3E451C97}" destId="{B46CE3C4-D8FC-4818-B7F0-507EA6A00C10}" srcOrd="1" destOrd="0" presId="urn:microsoft.com/office/officeart/2008/layout/HorizontalMultiLevelHierarchy"/>
-    <dgm:cxn modelId="{1DAC132B-AAC1-4A00-8D5A-06E5590D6271}" type="presOf" srcId="{9A871F26-74E8-4736-985B-EF3BB73DFE34}" destId="{15AE2F48-9DB0-4B24-ADB3-E3970E729EE5}" srcOrd="1" destOrd="0" presId="urn:microsoft.com/office/officeart/2008/layout/HorizontalMultiLevelHierarchy"/>
-    <dgm:cxn modelId="{1E8C2C99-6FE9-4910-BF70-446748759C8D}" srcId="{8DC7735B-9A6C-431C-92AA-042288E1B6AF}" destId="{DE9229B0-83CB-4AFE-B09E-2D25B676FB5D}" srcOrd="0" destOrd="0" parTransId="{DEA1A0C5-BE8D-4B82-B1D8-B4B9DCF4CE1A}" sibTransId="{2F5473A1-4FE3-4875-907C-12B17C85165B}"/>
-    <dgm:cxn modelId="{05D65667-9A85-4391-9AF5-961881DEEE5A}" type="presOf" srcId="{9CE6119C-2BD8-4D82-857F-27695498162C}" destId="{A3E99873-9A6B-448D-882B-6A1290124BE0}" srcOrd="0" destOrd="0" presId="urn:microsoft.com/office/officeart/2008/layout/HorizontalMultiLevelHierarchy"/>
-    <dgm:cxn modelId="{F111ADB6-1BB9-4C5E-964E-B65800CB0793}" type="presOf" srcId="{26479144-D9B7-4B50-8D7C-51FE0917EA76}" destId="{EAA5B856-0115-455E-A97E-BB584CD51E7D}" srcOrd="1" destOrd="0" presId="urn:microsoft.com/office/officeart/2008/layout/HorizontalMultiLevelHierarchy"/>
-    <dgm:cxn modelId="{2AA6A6AE-5526-43E0-841C-591C6F3782D6}" type="presOf" srcId="{9A871F26-74E8-4736-985B-EF3BB73DFE34}" destId="{E7DB1CDA-3D4C-4818-A88C-6D185D722EC6}" srcOrd="0" destOrd="0" presId="urn:microsoft.com/office/officeart/2008/layout/HorizontalMultiLevelHierarchy"/>
-    <dgm:cxn modelId="{B212622B-E89A-410E-8DF2-21E1F16489BB}" srcId="{2BA398DC-44B5-4B11-A724-B73E05D7E9DF}" destId="{B744A046-4A74-4240-94C0-E4572C4E9202}" srcOrd="1" destOrd="0" parTransId="{FD783284-7709-4153-940E-9DD9E029E02A}" sibTransId="{988DCDD5-55C3-4C36-A62E-F8E1AF47FEF8}"/>
-    <dgm:cxn modelId="{66A27823-B98C-444C-83B7-BCEF6D394B58}" srcId="{DF616C12-DFC6-40E5-BC46-E77E630699CC}" destId="{D8F92CDA-A645-45E2-B5DE-6A3BACB6C859}" srcOrd="0" destOrd="0" parTransId="{06A209AF-5EAF-4020-86BC-5E53C0A8567F}" sibTransId="{CAE32902-6313-4DE9-8D9B-B0BC18644EB0}"/>
-    <dgm:cxn modelId="{C7CC8891-6ECF-4CCD-A223-BC1A15825A1A}" type="presOf" srcId="{8541E672-E0DC-4CA9-8C48-07F04E1AC87D}" destId="{8539FE12-B94A-4DB5-9363-D625963A994D}" srcOrd="0" destOrd="0" presId="urn:microsoft.com/office/officeart/2008/layout/HorizontalMultiLevelHierarchy"/>
-    <dgm:cxn modelId="{B055FE51-A5ED-44E7-B1D1-E6ED1C9605DC}" type="presOf" srcId="{5E4A91D4-2366-4C60-BB3D-496C11657DC0}" destId="{35ACB2AC-382A-4C97-A906-4B1EC627FF3B}" srcOrd="0" destOrd="0" presId="urn:microsoft.com/office/officeart/2008/layout/HorizontalMultiLevelHierarchy"/>
-    <dgm:cxn modelId="{3C6DBA84-9CDB-41B6-A6DB-26E1527305A5}" type="presOf" srcId="{9B1A2F7C-2450-441A-8E98-5590A0216C0F}" destId="{0EEB810B-6E8E-42CE-8965-1DA2530F1893}" srcOrd="1" destOrd="0" presId="urn:microsoft.com/office/officeart/2008/layout/HorizontalMultiLevelHierarchy"/>
-    <dgm:cxn modelId="{438395A3-1BBC-41BE-8DF4-FA798EC10617}" srcId="{406A186A-33BC-4105-8835-7C5D35980A40}" destId="{75A5C761-B220-40FF-A8F1-BDF368427E79}" srcOrd="1" destOrd="0" parTransId="{997BBB56-0F09-47A1-9EDD-84E73DDCE053}" sibTransId="{17539A32-5ED5-47FE-9297-91D5384600FE}"/>
-    <dgm:cxn modelId="{ACCDA6C4-902D-4C2D-8E77-21EB010A1276}" type="presOf" srcId="{537D9D52-BB4C-4295-A6FC-1F3EE30F7C8A}" destId="{C75D1124-C505-4361-BD55-C3934A33A542}" srcOrd="0" destOrd="0" presId="urn:microsoft.com/office/officeart/2008/layout/HorizontalMultiLevelHierarchy"/>
-    <dgm:cxn modelId="{974BDEA0-3B95-48CE-9DCD-A280B7CD9533}" type="presOf" srcId="{03A1827D-0486-453D-8D6D-022439E5BEB5}" destId="{CBA4048E-18F5-45D0-B12C-301AA641B044}" srcOrd="1" destOrd="0" presId="urn:microsoft.com/office/officeart/2008/layout/HorizontalMultiLevelHierarchy"/>
-    <dgm:cxn modelId="{9EB3195B-FD55-456B-860D-B59B230328CD}" type="presOf" srcId="{4380BD8A-95E9-4652-8A89-911FA9702253}" destId="{11CBC200-06F7-4DD2-9C34-18F45043F91F}" srcOrd="0" destOrd="0" presId="urn:microsoft.com/office/officeart/2008/layout/HorizontalMultiLevelHierarchy"/>
-    <dgm:cxn modelId="{F342924C-89D7-4CE0-B55E-1988852B0259}" type="presOf" srcId="{62B13B07-F327-4E52-AE5C-A801CC6497E5}" destId="{5538A203-67B7-43B0-B95B-E0940F75E978}" srcOrd="1" destOrd="0" presId="urn:microsoft.com/office/officeart/2008/layout/HorizontalMultiLevelHierarchy"/>
-    <dgm:cxn modelId="{2299056C-FD09-4A24-90CE-E73DA03C00F7}" type="presOf" srcId="{FEB48055-1C34-422E-8C99-E4A7B59A7524}" destId="{6F3D5773-510D-44D2-9A00-874B9AD6C990}" srcOrd="1" destOrd="0" presId="urn:microsoft.com/office/officeart/2008/layout/HorizontalMultiLevelHierarchy"/>
-    <dgm:cxn modelId="{C8128AF9-826D-4BA6-8EA1-07D8850B53E2}" srcId="{C1B80BE7-4DEE-497B-98D2-5A6920F4FB8E}" destId="{2D0898D9-1379-4C8B-848A-4DE9262983B4}" srcOrd="1" destOrd="0" parTransId="{9CE6119C-2BD8-4D82-857F-27695498162C}" sibTransId="{D4711AB0-E9D9-47E2-A8EB-1A377D29D6AB}"/>
-    <dgm:cxn modelId="{1157782D-72F3-4195-AD17-A5E78211D43F}" srcId="{5E4A91D4-2366-4C60-BB3D-496C11657DC0}" destId="{9EEBD96E-C508-492D-AC9A-9F1A3119B996}" srcOrd="2" destOrd="0" parTransId="{A26C579B-D9A2-440D-B584-E528FA053B0A}" sibTransId="{0ACEC970-6B1A-4116-B74C-21C45883D78D}"/>
-    <dgm:cxn modelId="{CDA67E71-DC84-468A-9445-016A1BB1DE0B}" type="presOf" srcId="{4380BD8A-95E9-4652-8A89-911FA9702253}" destId="{CD836FDF-C536-42DD-9BC4-B637DEB11ABF}" srcOrd="1" destOrd="0" presId="urn:microsoft.com/office/officeart/2008/layout/HorizontalMultiLevelHierarchy"/>
-    <dgm:cxn modelId="{CE4C7B90-573C-4ED1-9F8C-B613EC48112D}" type="presOf" srcId="{9ACA9546-4CA0-4D0D-A122-ADEA92156DDA}" destId="{843E92B2-B1C5-4679-9F13-92AE67F50E4B}" srcOrd="0" destOrd="0" presId="urn:microsoft.com/office/officeart/2008/layout/HorizontalMultiLevelHierarchy"/>
-    <dgm:cxn modelId="{F405EE8B-6AB6-4CE7-95F1-9CDB233D747D}" type="presOf" srcId="{A09624DF-DDC3-4005-AE6C-949C55F3D201}" destId="{646E88BD-40D7-4786-AAB6-CFE3405707CA}" srcOrd="0" destOrd="0" presId="urn:microsoft.com/office/officeart/2008/layout/HorizontalMultiLevelHierarchy"/>
-    <dgm:cxn modelId="{E309E34A-2541-4093-AE96-D08C67BBA9F2}" type="presOf" srcId="{49D92B24-F087-4E31-A4F6-E7772D5AF36E}" destId="{2D6B1399-BFF2-49EA-9491-3E6335B75829}" srcOrd="1" destOrd="0" presId="urn:microsoft.com/office/officeart/2008/layout/HorizontalMultiLevelHierarchy"/>
-    <dgm:cxn modelId="{680F2C41-4AC9-43F5-A200-1525B08A5C20}" type="presOf" srcId="{2CFC024F-40D5-4978-B0D2-5F1E40D4091C}" destId="{1297A119-EB00-45FB-9E4C-7081D9FC3578}" srcOrd="0" destOrd="0" presId="urn:microsoft.com/office/officeart/2008/layout/HorizontalMultiLevelHierarchy"/>
-    <dgm:cxn modelId="{1178D50F-366F-4EE7-A7CE-B9E360FA6C9F}" type="presOf" srcId="{DEA1A0C5-BE8D-4B82-B1D8-B4B9DCF4CE1A}" destId="{48AB6F3C-59DC-47D0-9C0E-C348A271EF25}" srcOrd="1" destOrd="0" presId="urn:microsoft.com/office/officeart/2008/layout/HorizontalMultiLevelHierarchy"/>
-    <dgm:cxn modelId="{33685DCB-1271-4436-B83A-651236C7B5A2}" type="presOf" srcId="{2D0898D9-1379-4C8B-848A-4DE9262983B4}" destId="{BFA8CB9D-9F1D-4CD9-9D73-5A458DABA331}" srcOrd="0" destOrd="0" presId="urn:microsoft.com/office/officeart/2008/layout/HorizontalMultiLevelHierarchy"/>
-    <dgm:cxn modelId="{530A820A-DE70-431E-A20B-7969DD8DB6DC}" type="presOf" srcId="{30687554-7B6A-4E42-B0D8-856A3E451C97}" destId="{F61ED2EA-3DCB-4BDF-974A-6D38D5B018AB}" srcOrd="0" destOrd="0" presId="urn:microsoft.com/office/officeart/2008/layout/HorizontalMultiLevelHierarchy"/>
-    <dgm:cxn modelId="{4D1868B3-148F-4F71-A708-469F6DEC5B07}" type="presOf" srcId="{A26C579B-D9A2-440D-B584-E528FA053B0A}" destId="{70AD1357-89BE-4B28-B9F5-7D58CDC1F51E}" srcOrd="1" destOrd="0" presId="urn:microsoft.com/office/officeart/2008/layout/HorizontalMultiLevelHierarchy"/>
-    <dgm:cxn modelId="{2288930F-53E6-4EE6-ADDE-2436FA49AA32}" type="presOf" srcId="{B376DC1C-1A4D-4446-88F6-4DFB0AAC6190}" destId="{ACF0F1AD-F143-4BEB-B9B0-4355CC987FF0}" srcOrd="1" destOrd="0" presId="urn:microsoft.com/office/officeart/2008/layout/HorizontalMultiLevelHierarchy"/>
-    <dgm:cxn modelId="{F8360B02-CBE4-46B8-B678-61781A65F5FF}" type="presOf" srcId="{0B9BCD10-1EF6-4B84-A607-3FE578E09CF8}" destId="{A20128AE-AD89-4CEA-9148-E73F5681A2EE}" srcOrd="0" destOrd="0" presId="urn:microsoft.com/office/officeart/2008/layout/HorizontalMultiLevelHierarchy"/>
-    <dgm:cxn modelId="{B9DA3036-D7DD-49E9-9AD4-515E1CC3D168}" type="presOf" srcId="{92CA22EE-41F8-4C23-BA80-310383AE6AFD}" destId="{C8A74607-627B-4791-8B31-4BA4E02B4D7C}" srcOrd="0" destOrd="0" presId="urn:microsoft.com/office/officeart/2008/layout/HorizontalMultiLevelHierarchy"/>
-    <dgm:cxn modelId="{B928830C-76B0-4413-A554-50384C624BF3}" srcId="{09A61BE4-FBF2-4678-871E-03F8CFC0E905}" destId="{9ACA9546-4CA0-4D0D-A122-ADEA92156DDA}" srcOrd="0" destOrd="0" parTransId="{B376DC1C-1A4D-4446-88F6-4DFB0AAC6190}" sibTransId="{6060A363-DEB2-4884-8F47-7BE2C926C8F8}"/>
-    <dgm:cxn modelId="{4C1E32DE-6B41-4949-ABB2-3067568C366A}" srcId="{5E4A91D4-2366-4C60-BB3D-496C11657DC0}" destId="{3AD458C6-8419-4D84-9762-23D8C70DAE66}" srcOrd="0" destOrd="0" parTransId="{28B1DEF3-FA5E-434F-985A-593161F70089}" sibTransId="{A88E28B4-7BB8-4343-8CB3-F71BAF5EB0BF}"/>
-    <dgm:cxn modelId="{C204746F-9360-4D9D-A941-80CE7D7C2729}" srcId="{2B18F95E-9338-43E9-A54D-7EB8F97F82C3}" destId="{406A186A-33BC-4105-8835-7C5D35980A40}" srcOrd="0" destOrd="0" parTransId="{DC5215DC-63FE-4AB9-A5CA-19C1598E79BB}" sibTransId="{0016C189-12DE-41B5-BFFB-F01413D9BAF6}"/>
-    <dgm:cxn modelId="{24EBC399-A533-4DD9-99A5-B26A1EF21F3F}" type="presOf" srcId="{FD783284-7709-4153-940E-9DD9E029E02A}" destId="{426AC0E4-BEF7-4521-B5BF-B55008593BD6}" srcOrd="1" destOrd="0" presId="urn:microsoft.com/office/officeart/2008/layout/HorizontalMultiLevelHierarchy"/>
-    <dgm:cxn modelId="{EDFFE7DD-3DD6-4505-A66C-AFE6E440F812}" type="presOf" srcId="{2C5D07FC-2E11-4C25-B11B-D468629BAEA7}" destId="{D2297108-BBF1-4A06-A0FE-E40031175864}" srcOrd="1" destOrd="0" presId="urn:microsoft.com/office/officeart/2008/layout/HorizontalMultiLevelHierarchy"/>
-    <dgm:cxn modelId="{3A37C727-8DD4-436B-8133-66237D514867}" type="presOf" srcId="{2BA398DC-44B5-4B11-A724-B73E05D7E9DF}" destId="{9DE0F9C2-8935-4BB2-9E9C-937F7C914306}" srcOrd="0" destOrd="0" presId="urn:microsoft.com/office/officeart/2008/layout/HorizontalMultiLevelHierarchy"/>
-    <dgm:cxn modelId="{5C6F1EB7-FC88-40C1-93A7-33335865B239}" srcId="{09A61BE4-FBF2-4678-871E-03F8CFC0E905}" destId="{BD7D0AF9-68FE-4C26-A056-56C45A6F6BF0}" srcOrd="1" destOrd="0" parTransId="{A09624DF-DDC3-4005-AE6C-949C55F3D201}" sibTransId="{BA0B6355-B7B9-4035-B438-19C3E653E713}"/>
-    <dgm:cxn modelId="{E8C98B9E-69E4-4EF5-81A5-2180D64E6D44}" type="presOf" srcId="{59511E4B-8EFD-40C1-8769-41EC8A3006F1}" destId="{9B99E809-B197-4823-8F4F-A9A5674BCDDC}" srcOrd="1" destOrd="0" presId="urn:microsoft.com/office/officeart/2008/layout/HorizontalMultiLevelHierarchy"/>
-    <dgm:cxn modelId="{0D3D2457-E634-41C0-AE20-C5FAFC283B3B}" type="presOf" srcId="{DE9229B0-83CB-4AFE-B09E-2D25B676FB5D}" destId="{2293E997-8A42-4DE4-AFF5-CE2F2C46F300}" srcOrd="0" destOrd="0" presId="urn:microsoft.com/office/officeart/2008/layout/HorizontalMultiLevelHierarchy"/>
-    <dgm:cxn modelId="{8FCFBD36-F133-40B3-AFF9-3C0FE09F7959}" srcId="{8DC7735B-9A6C-431C-92AA-042288E1B6AF}" destId="{2CFC024F-40D5-4978-B0D2-5F1E40D4091C}" srcOrd="2" destOrd="0" parTransId="{B585FA61-ABCC-4C00-904E-F590963CA53E}" sibTransId="{0F4A212E-DFC1-47F1-9D57-F1300933BA27}"/>
-    <dgm:cxn modelId="{598D3D67-BC1B-443E-9833-8ACCA111D016}" type="presOf" srcId="{BD7D0AF9-68FE-4C26-A056-56C45A6F6BF0}" destId="{F3F472E3-5157-4A9E-B0CD-16FF248F6E0E}" srcOrd="0" destOrd="0" presId="urn:microsoft.com/office/officeart/2008/layout/HorizontalMultiLevelHierarchy"/>
-    <dgm:cxn modelId="{9655C251-82EC-4546-B5C3-E7820580E64E}" type="presOf" srcId="{DF616C12-DFC6-40E5-BC46-E77E630699CC}" destId="{9F3D299C-912D-48E4-AE76-DBF8471D0058}" srcOrd="0" destOrd="0" presId="urn:microsoft.com/office/officeart/2008/layout/HorizontalMultiLevelHierarchy"/>
-    <dgm:cxn modelId="{818C5901-157D-4E0D-8721-D7923B55F53C}" srcId="{2BA398DC-44B5-4B11-A724-B73E05D7E9DF}" destId="{5E4A91D4-2366-4C60-BB3D-496C11657DC0}" srcOrd="0" destOrd="0" parTransId="{26479144-D9B7-4B50-8D7C-51FE0917EA76}" sibTransId="{423EFA55-F537-444B-A59D-5885F36136D9}"/>
     <dgm:cxn modelId="{95822C1C-8748-42E4-8681-74A1D75BF69E}" type="presParOf" srcId="{9F3D299C-912D-48E4-AE76-DBF8471D0058}" destId="{2DA7FCC0-B548-4A9C-952C-C59667CEB92C}" srcOrd="0" destOrd="0" presId="urn:microsoft.com/office/officeart/2008/layout/HorizontalMultiLevelHierarchy"/>
     <dgm:cxn modelId="{7384B2C6-DB46-4A27-8886-D4FDD6AC1CA5}" type="presParOf" srcId="{2DA7FCC0-B548-4A9C-952C-C59667CEB92C}" destId="{67239EAB-1659-405F-9D37-5E8449D29F93}" srcOrd="0" destOrd="0" presId="urn:microsoft.com/office/officeart/2008/layout/HorizontalMultiLevelHierarchy"/>
     <dgm:cxn modelId="{739730A1-CA51-49C8-B733-D1C01E3B8258}" type="presParOf" srcId="{2DA7FCC0-B548-4A9C-952C-C59667CEB92C}" destId="{820AEFFE-B798-4C54-A521-7E9D3B3ABF19}" srcOrd="1" destOrd="0" presId="urn:microsoft.com/office/officeart/2008/layout/HorizontalMultiLevelHierarchy"/>
@@ -4035,6 +4378,31 @@
     <dgm:cxn modelId="{5ED18C16-B25D-45D4-8F2B-84666070F4BA}" type="presParOf" srcId="{CB52BBDC-041F-41E3-82CD-2E2FF9D5041D}" destId="{1E12BA86-21F9-4768-98E8-F35305F73DAA}" srcOrd="3" destOrd="0" presId="urn:microsoft.com/office/officeart/2008/layout/HorizontalMultiLevelHierarchy"/>
     <dgm:cxn modelId="{0FCDCB38-A496-4998-BDD2-B78553BAB1EF}" type="presParOf" srcId="{1E12BA86-21F9-4768-98E8-F35305F73DAA}" destId="{3EE425C3-9686-4BDF-A704-1B7FE956B70F}" srcOrd="0" destOrd="0" presId="urn:microsoft.com/office/officeart/2008/layout/HorizontalMultiLevelHierarchy"/>
     <dgm:cxn modelId="{B44C20BD-BADB-4555-8E04-51A01B126248}" type="presParOf" srcId="{1E12BA86-21F9-4768-98E8-F35305F73DAA}" destId="{933C1E24-F2A3-4293-B95E-1040730DDCE5}" srcOrd="1" destOrd="0" presId="urn:microsoft.com/office/officeart/2008/layout/HorizontalMultiLevelHierarchy"/>
+    <dgm:cxn modelId="{8F868CCC-1FE8-455E-9719-300771FE2715}" type="presParOf" srcId="{9649ACAB-2321-4691-A3E4-17E5315F335D}" destId="{3277378E-1025-4B91-B646-B39624C63CFC}" srcOrd="4" destOrd="0" presId="urn:microsoft.com/office/officeart/2008/layout/HorizontalMultiLevelHierarchy"/>
+    <dgm:cxn modelId="{DD147FEC-281D-463F-A276-5C0AA25033BA}" type="presParOf" srcId="{3277378E-1025-4B91-B646-B39624C63CFC}" destId="{ED27862D-C3E6-427A-885B-0E48DC7843BB}" srcOrd="0" destOrd="0" presId="urn:microsoft.com/office/officeart/2008/layout/HorizontalMultiLevelHierarchy"/>
+    <dgm:cxn modelId="{4A8EDDA0-895B-499C-A4E4-50D4003A286C}" type="presParOf" srcId="{9649ACAB-2321-4691-A3E4-17E5315F335D}" destId="{694CBA10-92D2-4197-90E3-DF07EA10EEB8}" srcOrd="5" destOrd="0" presId="urn:microsoft.com/office/officeart/2008/layout/HorizontalMultiLevelHierarchy"/>
+    <dgm:cxn modelId="{43B4E36A-17D2-479F-8F41-05383CF7D5A5}" type="presParOf" srcId="{694CBA10-92D2-4197-90E3-DF07EA10EEB8}" destId="{3CE5715A-B463-4312-A59B-740DC19BA68B}" srcOrd="0" destOrd="0" presId="urn:microsoft.com/office/officeart/2008/layout/HorizontalMultiLevelHierarchy"/>
+    <dgm:cxn modelId="{7D0D7166-BFE3-4E3D-AFAB-66C6BDC5F476}" type="presParOf" srcId="{694CBA10-92D2-4197-90E3-DF07EA10EEB8}" destId="{63E2F988-CB6C-4238-BA57-4F2847669F56}" srcOrd="1" destOrd="0" presId="urn:microsoft.com/office/officeart/2008/layout/HorizontalMultiLevelHierarchy"/>
+    <dgm:cxn modelId="{A20983CD-2EC7-4581-B618-5D7E63793D5F}" type="presParOf" srcId="{63E2F988-CB6C-4238-BA57-4F2847669F56}" destId="{B1B95A7D-A80C-4A8C-B5CC-608F51433E24}" srcOrd="0" destOrd="0" presId="urn:microsoft.com/office/officeart/2008/layout/HorizontalMultiLevelHierarchy"/>
+    <dgm:cxn modelId="{DD6C115B-C7E7-42BB-B77B-01D7A0E3A1AF}" type="presParOf" srcId="{B1B95A7D-A80C-4A8C-B5CC-608F51433E24}" destId="{D089DFB8-6D68-45D6-93AE-4D04E31DEDBD}" srcOrd="0" destOrd="0" presId="urn:microsoft.com/office/officeart/2008/layout/HorizontalMultiLevelHierarchy"/>
+    <dgm:cxn modelId="{49645A75-3C0E-4549-BA6B-8A653FC3D20E}" type="presParOf" srcId="{63E2F988-CB6C-4238-BA57-4F2847669F56}" destId="{9BAEEE4D-1794-4993-ABA7-35B5444E3185}" srcOrd="1" destOrd="0" presId="urn:microsoft.com/office/officeart/2008/layout/HorizontalMultiLevelHierarchy"/>
+    <dgm:cxn modelId="{F662308A-7ED3-4C9F-810F-ED233768109E}" type="presParOf" srcId="{9BAEEE4D-1794-4993-ABA7-35B5444E3185}" destId="{BADDFD11-6D6A-4F6A-8B2E-2F492D67B8FF}" srcOrd="0" destOrd="0" presId="urn:microsoft.com/office/officeart/2008/layout/HorizontalMultiLevelHierarchy"/>
+    <dgm:cxn modelId="{AABB06D3-7BB3-417E-B60B-97A3A19555A5}" type="presParOf" srcId="{9BAEEE4D-1794-4993-ABA7-35B5444E3185}" destId="{674512A4-DC34-49D8-96AF-E0B4E8875587}" srcOrd="1" destOrd="0" presId="urn:microsoft.com/office/officeart/2008/layout/HorizontalMultiLevelHierarchy"/>
+    <dgm:cxn modelId="{0A81179B-F5C8-4176-BA82-C9157C81E695}" type="presParOf" srcId="{674512A4-DC34-49D8-96AF-E0B4E8875587}" destId="{1C218697-7FEC-442C-BEAC-861EDBA1EE26}" srcOrd="0" destOrd="0" presId="urn:microsoft.com/office/officeart/2008/layout/HorizontalMultiLevelHierarchy"/>
+    <dgm:cxn modelId="{A04A286E-BC65-4B22-ACF3-CCF430210792}" type="presParOf" srcId="{1C218697-7FEC-442C-BEAC-861EDBA1EE26}" destId="{81ADFB7C-14D3-491D-A8C3-619A082EA693}" srcOrd="0" destOrd="0" presId="urn:microsoft.com/office/officeart/2008/layout/HorizontalMultiLevelHierarchy"/>
+    <dgm:cxn modelId="{B72EC73D-1CFE-4C9E-B6A1-CB4908DE34D3}" type="presParOf" srcId="{674512A4-DC34-49D8-96AF-E0B4E8875587}" destId="{1E3A8E4F-0756-4205-874E-8A8A7E5A4645}" srcOrd="1" destOrd="0" presId="urn:microsoft.com/office/officeart/2008/layout/HorizontalMultiLevelHierarchy"/>
+    <dgm:cxn modelId="{EAF1DDCB-31F6-42DE-8464-BC59D03FC391}" type="presParOf" srcId="{1E3A8E4F-0756-4205-874E-8A8A7E5A4645}" destId="{A53E1177-1715-4EBC-8FFF-D2B6BE4DA7DF}" srcOrd="0" destOrd="0" presId="urn:microsoft.com/office/officeart/2008/layout/HorizontalMultiLevelHierarchy"/>
+    <dgm:cxn modelId="{DA46647C-F989-4F68-B679-2833609BFA0B}" type="presParOf" srcId="{1E3A8E4F-0756-4205-874E-8A8A7E5A4645}" destId="{96D657BE-01FB-41A5-A61B-3B35503AC2B6}" srcOrd="1" destOrd="0" presId="urn:microsoft.com/office/officeart/2008/layout/HorizontalMultiLevelHierarchy"/>
+    <dgm:cxn modelId="{38816520-EE91-47B8-BB6F-EB5AB950CC25}" type="presParOf" srcId="{674512A4-DC34-49D8-96AF-E0B4E8875587}" destId="{17D366BE-804F-4EB3-932C-7E922AA72C97}" srcOrd="2" destOrd="0" presId="urn:microsoft.com/office/officeart/2008/layout/HorizontalMultiLevelHierarchy"/>
+    <dgm:cxn modelId="{81E675FB-C647-4B68-9D60-3466889A02AC}" type="presParOf" srcId="{17D366BE-804F-4EB3-932C-7E922AA72C97}" destId="{E6F6B072-371D-4957-ABC0-3B2C22D27DBF}" srcOrd="0" destOrd="0" presId="urn:microsoft.com/office/officeart/2008/layout/HorizontalMultiLevelHierarchy"/>
+    <dgm:cxn modelId="{BD7CFE59-8203-4A46-9298-AB1550095D82}" type="presParOf" srcId="{674512A4-DC34-49D8-96AF-E0B4E8875587}" destId="{570E30F0-C1ED-4CD5-BCCD-D977F598EAF8}" srcOrd="3" destOrd="0" presId="urn:microsoft.com/office/officeart/2008/layout/HorizontalMultiLevelHierarchy"/>
+    <dgm:cxn modelId="{F9C53A65-A147-413A-9C00-3D03EC936C95}" type="presParOf" srcId="{570E30F0-C1ED-4CD5-BCCD-D977F598EAF8}" destId="{9C97ECFE-35CB-4952-AA99-AABD5BBDF8F7}" srcOrd="0" destOrd="0" presId="urn:microsoft.com/office/officeart/2008/layout/HorizontalMultiLevelHierarchy"/>
+    <dgm:cxn modelId="{302F0B1F-C183-445C-9B13-003C4A21B634}" type="presParOf" srcId="{570E30F0-C1ED-4CD5-BCCD-D977F598EAF8}" destId="{F4A1B485-8D55-4B83-ADC5-922BB2DE367E}" srcOrd="1" destOrd="0" presId="urn:microsoft.com/office/officeart/2008/layout/HorizontalMultiLevelHierarchy"/>
+    <dgm:cxn modelId="{3225DAA4-09B1-42DF-9876-011C6716F424}" type="presParOf" srcId="{63E2F988-CB6C-4238-BA57-4F2847669F56}" destId="{F5B1B54B-C837-4500-B1F9-6B55EC063495}" srcOrd="2" destOrd="0" presId="urn:microsoft.com/office/officeart/2008/layout/HorizontalMultiLevelHierarchy"/>
+    <dgm:cxn modelId="{6966FD96-3744-4982-A747-4F6E11E67C94}" type="presParOf" srcId="{F5B1B54B-C837-4500-B1F9-6B55EC063495}" destId="{D842F95B-B05B-4DE0-B764-8E26B5379FF0}" srcOrd="0" destOrd="0" presId="urn:microsoft.com/office/officeart/2008/layout/HorizontalMultiLevelHierarchy"/>
+    <dgm:cxn modelId="{4D7F6CFF-F974-4DF8-A0CE-93268F5F4744}" type="presParOf" srcId="{63E2F988-CB6C-4238-BA57-4F2847669F56}" destId="{4E596BD4-DA7C-4D4A-8CF7-CADC167A2029}" srcOrd="3" destOrd="0" presId="urn:microsoft.com/office/officeart/2008/layout/HorizontalMultiLevelHierarchy"/>
+    <dgm:cxn modelId="{EAE4E3D7-0F89-4C47-BCDF-00CBAE336F14}" type="presParOf" srcId="{4E596BD4-DA7C-4D4A-8CF7-CADC167A2029}" destId="{D95C901E-1098-4296-B1C0-A32F05673786}" srcOrd="0" destOrd="0" presId="urn:microsoft.com/office/officeart/2008/layout/HorizontalMultiLevelHierarchy"/>
+    <dgm:cxn modelId="{9629A0B0-99A9-4BEB-AB07-0602A2CED635}" type="presParOf" srcId="{4E596BD4-DA7C-4D4A-8CF7-CADC167A2029}" destId="{4EAB2BC0-F83A-4A62-B7D8-59143933720A}" srcOrd="1" destOrd="0" presId="urn:microsoft.com/office/officeart/2008/layout/HorizontalMultiLevelHierarchy"/>
     <dgm:cxn modelId="{397C5CDE-9E20-4032-9CCF-0A2C63B75098}" type="presParOf" srcId="{091F9845-6CCA-4AA6-A36D-E0DDB56C09DA}" destId="{C4C9488E-7BE6-4FC9-9B22-FCEA0EF43662}" srcOrd="2" destOrd="0" presId="urn:microsoft.com/office/officeart/2008/layout/HorizontalMultiLevelHierarchy"/>
     <dgm:cxn modelId="{F54EF338-92B8-4F2D-9481-02396BD0EDC9}" type="presParOf" srcId="{C4C9488E-7BE6-4FC9-9B22-FCEA0EF43662}" destId="{8326D004-29DB-4CCB-873E-728791BF390D}" srcOrd="0" destOrd="0" presId="urn:microsoft.com/office/officeart/2008/layout/HorizontalMultiLevelHierarchy"/>
     <dgm:cxn modelId="{BDE26333-3F6F-4C51-801F-E62C37870B79}" type="presParOf" srcId="{091F9845-6CCA-4AA6-A36D-E0DDB56C09DA}" destId="{7B41DE76-EBEE-4BB3-A8A1-4C9B0D6B6626}" srcOrd="3" destOrd="0" presId="urn:microsoft.com/office/officeart/2008/layout/HorizontalMultiLevelHierarchy"/>
@@ -4071,8 +4439,8 @@
       </dsp:nvSpPr>
       <dsp:spPr>
         <a:xfrm>
-          <a:off x="4167314" y="4474192"/>
-          <a:ext cx="215405" cy="410453"/>
+          <a:off x="4667079" y="4141643"/>
+          <a:ext cx="178664" cy="340442"/>
         </a:xfrm>
         <a:custGeom>
           <a:avLst/>
@@ -4086,13 +4454,13 @@
                 <a:pt x="0" y="0"/>
               </a:moveTo>
               <a:lnTo>
-                <a:pt x="107702" y="0"/>
+                <a:pt x="89332" y="0"/>
               </a:lnTo>
               <a:lnTo>
-                <a:pt x="107702" y="410453"/>
+                <a:pt x="89332" y="340442"/>
               </a:lnTo>
               <a:lnTo>
-                <a:pt x="215405" y="410453"/>
+                <a:pt x="178664" y="340442"/>
               </a:lnTo>
             </a:path>
           </a:pathLst>
@@ -4144,8 +4512,8 @@
         </a:p>
       </dsp:txBody>
       <dsp:txXfrm>
-        <a:off x="4263428" y="4667830"/>
-        <a:ext cx="23177" cy="23177"/>
+        <a:off x="4746799" y="4302252"/>
+        <a:ext cx="19223" cy="19223"/>
       </dsp:txXfrm>
     </dsp:sp>
     <dsp:sp modelId="{C4C9488E-7BE6-4FC9-9B22-FCEA0EF43662}">
@@ -4155,8 +4523,8 @@
       </dsp:nvSpPr>
       <dsp:spPr>
         <a:xfrm>
-          <a:off x="4167314" y="4428472"/>
-          <a:ext cx="215405" cy="91440"/>
+          <a:off x="4667079" y="4095923"/>
+          <a:ext cx="178664" cy="91440"/>
         </a:xfrm>
         <a:custGeom>
           <a:avLst/>
@@ -4170,7 +4538,7 @@
                 <a:pt x="0" y="45720"/>
               </a:moveTo>
               <a:lnTo>
-                <a:pt x="215405" y="45720"/>
+                <a:pt x="178664" y="45720"/>
               </a:lnTo>
             </a:path>
           </a:pathLst>
@@ -4222,19 +4590,19 @@
         </a:p>
       </dsp:txBody>
       <dsp:txXfrm>
-        <a:off x="4269632" y="4468807"/>
-        <a:ext cx="10770" cy="10770"/>
+        <a:off x="4751944" y="4137176"/>
+        <a:ext cx="8933" cy="8933"/>
       </dsp:txXfrm>
     </dsp:sp>
-    <dsp:sp modelId="{67D635C0-48F2-4C8E-A3A2-F35C9A9E45DC}">
+    <dsp:sp modelId="{F5B1B54B-C837-4500-B1F9-6B55EC063495}">
       <dsp:nvSpPr>
         <dsp:cNvPr id="0" name=""/>
         <dsp:cNvSpPr/>
       </dsp:nvSpPr>
       <dsp:spPr>
         <a:xfrm>
-          <a:off x="6752185" y="4679418"/>
-          <a:ext cx="215405" cy="205226"/>
+          <a:off x="6811052" y="4737418"/>
+          <a:ext cx="178664" cy="170221"/>
         </a:xfrm>
         <a:custGeom>
           <a:avLst/>
@@ -4248,13 +4616,13 @@
                 <a:pt x="0" y="0"/>
               </a:moveTo>
               <a:lnTo>
-                <a:pt x="107702" y="0"/>
+                <a:pt x="89332" y="0"/>
               </a:lnTo>
               <a:lnTo>
-                <a:pt x="107702" y="205226"/>
+                <a:pt x="89332" y="170221"/>
               </a:lnTo>
               <a:lnTo>
-                <a:pt x="215405" y="205226"/>
+                <a:pt x="178664" y="170221"/>
               </a:lnTo>
             </a:path>
           </a:pathLst>
@@ -4306,19 +4674,19 @@
         </a:p>
       </dsp:txBody>
       <dsp:txXfrm>
-        <a:off x="6852450" y="4774594"/>
-        <a:ext cx="14875" cy="14875"/>
+        <a:off x="6894215" y="4816359"/>
+        <a:ext cx="12338" cy="12338"/>
       </dsp:txXfrm>
     </dsp:sp>
-    <dsp:sp modelId="{59AE2245-54FD-442F-826F-E34D3A5503D3}">
+    <dsp:sp modelId="{17D366BE-804F-4EB3-932C-7E922AA72C97}">
       <dsp:nvSpPr>
         <dsp:cNvPr id="0" name=""/>
         <dsp:cNvSpPr/>
       </dsp:nvSpPr>
       <dsp:spPr>
         <a:xfrm>
-          <a:off x="8044620" y="4474192"/>
-          <a:ext cx="215405" cy="410453"/>
+          <a:off x="7959936" y="4567196"/>
+          <a:ext cx="345644" cy="170221"/>
         </a:xfrm>
         <a:custGeom>
           <a:avLst/>
@@ -4332,13 +4700,13 @@
                 <a:pt x="0" y="0"/>
               </a:moveTo>
               <a:lnTo>
-                <a:pt x="107702" y="0"/>
+                <a:pt x="172822" y="0"/>
               </a:lnTo>
               <a:lnTo>
-                <a:pt x="107702" y="410453"/>
+                <a:pt x="172822" y="170221"/>
               </a:lnTo>
               <a:lnTo>
-                <a:pt x="215405" y="410453"/>
+                <a:pt x="345644" y="170221"/>
               </a:lnTo>
             </a:path>
           </a:pathLst>
@@ -4390,19 +4758,19 @@
         </a:p>
       </dsp:txBody>
       <dsp:txXfrm>
-        <a:off x="8140734" y="4667830"/>
-        <a:ext cx="23177" cy="23177"/>
+        <a:off x="8123126" y="4642675"/>
+        <a:ext cx="19264" cy="19264"/>
       </dsp:txXfrm>
     </dsp:sp>
-    <dsp:sp modelId="{51ABB488-7F6B-4F15-BF1E-13957DECDEA0}">
+    <dsp:sp modelId="{1C218697-7FEC-442C-BEAC-861EDBA1EE26}">
       <dsp:nvSpPr>
         <dsp:cNvPr id="0" name=""/>
         <dsp:cNvSpPr/>
       </dsp:nvSpPr>
       <dsp:spPr>
         <a:xfrm>
-          <a:off x="8044620" y="4428472"/>
-          <a:ext cx="215405" cy="91440"/>
+          <a:off x="7959936" y="4396975"/>
+          <a:ext cx="345644" cy="170221"/>
         </a:xfrm>
         <a:custGeom>
           <a:avLst/>
@@ -4413,10 +4781,16 @@
           <a:pathLst>
             <a:path>
               <a:moveTo>
-                <a:pt x="0" y="45720"/>
+                <a:pt x="0" y="170221"/>
               </a:moveTo>
               <a:lnTo>
-                <a:pt x="215405" y="45720"/>
+                <a:pt x="172822" y="170221"/>
+              </a:lnTo>
+              <a:lnTo>
+                <a:pt x="172822" y="0"/>
+              </a:lnTo>
+              <a:lnTo>
+                <a:pt x="345644" y="0"/>
               </a:lnTo>
             </a:path>
           </a:pathLst>
@@ -4468,19 +4842,19 @@
         </a:p>
       </dsp:txBody>
       <dsp:txXfrm>
-        <a:off x="8146938" y="4468807"/>
-        <a:ext cx="10770" cy="10770"/>
+        <a:off x="8123126" y="4472454"/>
+        <a:ext cx="19264" cy="19264"/>
       </dsp:txXfrm>
     </dsp:sp>
-    <dsp:sp modelId="{6C6D8E9D-7873-4EE3-A7C8-467DB1B38886}">
+    <dsp:sp modelId="{B1B95A7D-A80C-4A8C-B5CC-608F51433E24}">
       <dsp:nvSpPr>
         <dsp:cNvPr id="0" name=""/>
         <dsp:cNvSpPr/>
       </dsp:nvSpPr>
       <dsp:spPr>
         <a:xfrm>
-          <a:off x="8044620" y="4063738"/>
-          <a:ext cx="215405" cy="410453"/>
+          <a:off x="6811052" y="4567196"/>
+          <a:ext cx="178664" cy="170221"/>
         </a:xfrm>
         <a:custGeom>
           <a:avLst/>
@@ -4491,16 +4865,16 @@
           <a:pathLst>
             <a:path>
               <a:moveTo>
-                <a:pt x="0" y="410453"/>
+                <a:pt x="0" y="170221"/>
               </a:moveTo>
               <a:lnTo>
-                <a:pt x="107702" y="410453"/>
+                <a:pt x="89332" y="170221"/>
               </a:lnTo>
               <a:lnTo>
-                <a:pt x="107702" y="0"/>
+                <a:pt x="89332" y="0"/>
               </a:lnTo>
               <a:lnTo>
-                <a:pt x="215405" y="0"/>
+                <a:pt x="178664" y="0"/>
               </a:lnTo>
             </a:path>
           </a:pathLst>
@@ -4552,19 +4926,19 @@
         </a:p>
       </dsp:txBody>
       <dsp:txXfrm>
-        <a:off x="8140734" y="4257376"/>
-        <a:ext cx="23177" cy="23177"/>
+        <a:off x="6894215" y="4646138"/>
+        <a:ext cx="12338" cy="12338"/>
       </dsp:txXfrm>
     </dsp:sp>
-    <dsp:sp modelId="{E8B9E04F-8911-439D-A990-57E0C8BD86F4}">
+    <dsp:sp modelId="{3277378E-1025-4B91-B646-B39624C63CFC}">
       <dsp:nvSpPr>
         <dsp:cNvPr id="0" name=""/>
         <dsp:cNvSpPr/>
       </dsp:nvSpPr>
       <dsp:spPr>
         <a:xfrm>
-          <a:off x="6752185" y="4474192"/>
-          <a:ext cx="215405" cy="205226"/>
+          <a:off x="5739065" y="3801200"/>
+          <a:ext cx="178664" cy="936218"/>
         </a:xfrm>
         <a:custGeom>
           <a:avLst/>
@@ -4575,16 +4949,16 @@
           <a:pathLst>
             <a:path>
               <a:moveTo>
-                <a:pt x="0" y="205226"/>
+                <a:pt x="0" y="0"/>
               </a:moveTo>
               <a:lnTo>
-                <a:pt x="107702" y="205226"/>
+                <a:pt x="89332" y="0"/>
               </a:lnTo>
               <a:lnTo>
-                <a:pt x="107702" y="0"/>
+                <a:pt x="89332" y="936218"/>
               </a:lnTo>
               <a:lnTo>
-                <a:pt x="215405" y="0"/>
+                <a:pt x="178664" y="936218"/>
               </a:lnTo>
             </a:path>
           </a:pathLst>
@@ -4636,19 +5010,19 @@
         </a:p>
       </dsp:txBody>
       <dsp:txXfrm>
-        <a:off x="6852450" y="4569367"/>
-        <a:ext cx="14875" cy="14875"/>
+        <a:off x="5804570" y="4245481"/>
+        <a:ext cx="47655" cy="47655"/>
       </dsp:txXfrm>
     </dsp:sp>
-    <dsp:sp modelId="{54971FDB-F67F-4F3B-92B6-E77D3DFFDC8A}">
+    <dsp:sp modelId="{67D635C0-48F2-4C8E-A3A2-F35C9A9E45DC}">
       <dsp:nvSpPr>
         <dsp:cNvPr id="0" name=""/>
         <dsp:cNvSpPr/>
       </dsp:nvSpPr>
       <dsp:spPr>
         <a:xfrm>
-          <a:off x="5459749" y="4063738"/>
-          <a:ext cx="215405" cy="615679"/>
+          <a:off x="6811052" y="3886310"/>
+          <a:ext cx="178664" cy="170221"/>
         </a:xfrm>
         <a:custGeom>
           <a:avLst/>
@@ -4662,13 +5036,13 @@
                 <a:pt x="0" y="0"/>
               </a:moveTo>
               <a:lnTo>
-                <a:pt x="107702" y="0"/>
+                <a:pt x="89332" y="0"/>
               </a:lnTo>
               <a:lnTo>
-                <a:pt x="107702" y="615679"/>
+                <a:pt x="89332" y="170221"/>
               </a:lnTo>
               <a:lnTo>
-                <a:pt x="215405" y="615679"/>
+                <a:pt x="178664" y="170221"/>
               </a:lnTo>
             </a:path>
           </a:pathLst>
@@ -4720,19 +5094,19 @@
         </a:p>
       </dsp:txBody>
       <dsp:txXfrm>
-        <a:off x="5551145" y="4355272"/>
-        <a:ext cx="32613" cy="32613"/>
+        <a:off x="6894215" y="3965252"/>
+        <a:ext cx="12338" cy="12338"/>
       </dsp:txXfrm>
     </dsp:sp>
-    <dsp:sp modelId="{E7DB1CDA-3D4C-4818-A88C-6D185D722EC6}">
+    <dsp:sp modelId="{59AE2245-54FD-442F-826F-E34D3A5503D3}">
       <dsp:nvSpPr>
         <dsp:cNvPr id="0" name=""/>
         <dsp:cNvSpPr/>
       </dsp:nvSpPr>
       <dsp:spPr>
         <a:xfrm>
-          <a:off x="6752185" y="3448058"/>
-          <a:ext cx="215405" cy="205226"/>
+          <a:off x="7961089" y="3716089"/>
+          <a:ext cx="357203" cy="340442"/>
         </a:xfrm>
         <a:custGeom>
           <a:avLst/>
@@ -4746,13 +5120,13 @@
                 <a:pt x="0" y="0"/>
               </a:moveTo>
               <a:lnTo>
-                <a:pt x="107702" y="0"/>
+                <a:pt x="178601" y="0"/>
               </a:lnTo>
               <a:lnTo>
-                <a:pt x="107702" y="205226"/>
+                <a:pt x="178601" y="340442"/>
               </a:lnTo>
               <a:lnTo>
-                <a:pt x="215405" y="205226"/>
+                <a:pt x="357203" y="340442"/>
               </a:lnTo>
             </a:path>
           </a:pathLst>
@@ -4804,19 +5178,19 @@
         </a:p>
       </dsp:txBody>
       <dsp:txXfrm>
-        <a:off x="6852450" y="3543234"/>
-        <a:ext cx="14875" cy="14875"/>
+        <a:off x="8127354" y="3873974"/>
+        <a:ext cx="24672" cy="24672"/>
       </dsp:txXfrm>
     </dsp:sp>
-    <dsp:sp modelId="{0F4448C4-16D0-412B-B97C-B3EE8C574400}">
+    <dsp:sp modelId="{51ABB488-7F6B-4F15-BF1E-13957DECDEA0}">
       <dsp:nvSpPr>
         <dsp:cNvPr id="0" name=""/>
         <dsp:cNvSpPr/>
       </dsp:nvSpPr>
       <dsp:spPr>
         <a:xfrm>
-          <a:off x="8044620" y="3242832"/>
-          <a:ext cx="215405" cy="410453"/>
+          <a:off x="7961089" y="3670369"/>
+          <a:ext cx="357203" cy="91440"/>
         </a:xfrm>
         <a:custGeom>
           <a:avLst/>
@@ -4827,16 +5201,10 @@
           <a:pathLst>
             <a:path>
               <a:moveTo>
-                <a:pt x="0" y="0"/>
+                <a:pt x="0" y="45720"/>
               </a:moveTo>
               <a:lnTo>
-                <a:pt x="107702" y="0"/>
-              </a:lnTo>
-              <a:lnTo>
-                <a:pt x="107702" y="410453"/>
-              </a:lnTo>
-              <a:lnTo>
-                <a:pt x="215405" y="410453"/>
+                <a:pt x="357203" y="45720"/>
               </a:lnTo>
             </a:path>
           </a:pathLst>
@@ -4888,19 +5256,19 @@
         </a:p>
       </dsp:txBody>
       <dsp:txXfrm>
-        <a:off x="8140734" y="3436470"/>
-        <a:ext cx="23177" cy="23177"/>
+        <a:off x="8130761" y="3707159"/>
+        <a:ext cx="17860" cy="17860"/>
       </dsp:txXfrm>
     </dsp:sp>
-    <dsp:sp modelId="{A3E99873-9A6B-448D-882B-6A1290124BE0}">
+    <dsp:sp modelId="{6C6D8E9D-7873-4EE3-A7C8-467DB1B38886}">
       <dsp:nvSpPr>
         <dsp:cNvPr id="0" name=""/>
         <dsp:cNvSpPr/>
       </dsp:nvSpPr>
       <dsp:spPr>
         <a:xfrm>
-          <a:off x="8044620" y="3197112"/>
-          <a:ext cx="215405" cy="91440"/>
+          <a:off x="7961089" y="3375646"/>
+          <a:ext cx="357203" cy="340442"/>
         </a:xfrm>
         <a:custGeom>
           <a:avLst/>
@@ -4911,10 +5279,16 @@
           <a:pathLst>
             <a:path>
               <a:moveTo>
-                <a:pt x="0" y="45720"/>
+                <a:pt x="0" y="340442"/>
               </a:moveTo>
               <a:lnTo>
-                <a:pt x="215405" y="45720"/>
+                <a:pt x="178601" y="340442"/>
+              </a:lnTo>
+              <a:lnTo>
+                <a:pt x="178601" y="0"/>
+              </a:lnTo>
+              <a:lnTo>
+                <a:pt x="357203" y="0"/>
               </a:lnTo>
             </a:path>
           </a:pathLst>
@@ -4966,19 +5340,19 @@
         </a:p>
       </dsp:txBody>
       <dsp:txXfrm>
-        <a:off x="8146938" y="3237447"/>
-        <a:ext cx="10770" cy="10770"/>
+        <a:off x="8127354" y="3533531"/>
+        <a:ext cx="24672" cy="24672"/>
       </dsp:txXfrm>
     </dsp:sp>
-    <dsp:sp modelId="{BCF6B846-BCE0-4A36-AB58-F37D855BACB3}">
+    <dsp:sp modelId="{E8B9E04F-8911-439D-A990-57E0C8BD86F4}">
       <dsp:nvSpPr>
         <dsp:cNvPr id="0" name=""/>
         <dsp:cNvSpPr/>
       </dsp:nvSpPr>
       <dsp:spPr>
         <a:xfrm>
-          <a:off x="8044620" y="2832378"/>
-          <a:ext cx="215405" cy="410453"/>
+          <a:off x="6811052" y="3716089"/>
+          <a:ext cx="178664" cy="170221"/>
         </a:xfrm>
         <a:custGeom>
           <a:avLst/>
@@ -4989,16 +5363,16 @@
           <a:pathLst>
             <a:path>
               <a:moveTo>
-                <a:pt x="0" y="410453"/>
+                <a:pt x="0" y="170221"/>
               </a:moveTo>
               <a:lnTo>
-                <a:pt x="107702" y="410453"/>
+                <a:pt x="89332" y="170221"/>
               </a:lnTo>
               <a:lnTo>
-                <a:pt x="107702" y="0"/>
+                <a:pt x="89332" y="0"/>
               </a:lnTo>
               <a:lnTo>
-                <a:pt x="215405" y="0"/>
+                <a:pt x="178664" y="0"/>
               </a:lnTo>
             </a:path>
           </a:pathLst>
@@ -5050,19 +5424,19 @@
         </a:p>
       </dsp:txBody>
       <dsp:txXfrm>
-        <a:off x="8140734" y="3026017"/>
-        <a:ext cx="23177" cy="23177"/>
+        <a:off x="6894215" y="3795030"/>
+        <a:ext cx="12338" cy="12338"/>
       </dsp:txXfrm>
     </dsp:sp>
-    <dsp:sp modelId="{7137EB5A-E346-4115-9F66-B74C3542748E}">
+    <dsp:sp modelId="{54971FDB-F67F-4F3B-92B6-E77D3DFFDC8A}">
       <dsp:nvSpPr>
         <dsp:cNvPr id="0" name=""/>
         <dsp:cNvSpPr/>
       </dsp:nvSpPr>
       <dsp:spPr>
         <a:xfrm>
-          <a:off x="6752185" y="3242832"/>
-          <a:ext cx="215405" cy="205226"/>
+          <a:off x="5739065" y="3755480"/>
+          <a:ext cx="178664" cy="91440"/>
         </a:xfrm>
         <a:custGeom>
           <a:avLst/>
@@ -5073,16 +5447,16 @@
           <a:pathLst>
             <a:path>
               <a:moveTo>
-                <a:pt x="0" y="205226"/>
+                <a:pt x="0" y="45720"/>
               </a:moveTo>
               <a:lnTo>
-                <a:pt x="107702" y="205226"/>
+                <a:pt x="89332" y="45720"/>
               </a:lnTo>
               <a:lnTo>
-                <a:pt x="107702" y="0"/>
+                <a:pt x="89332" y="130830"/>
               </a:lnTo>
               <a:lnTo>
-                <a:pt x="215405" y="0"/>
+                <a:pt x="178664" y="130830"/>
               </a:lnTo>
             </a:path>
           </a:pathLst>
@@ -5134,19 +5508,19 @@
         </a:p>
       </dsp:txBody>
       <dsp:txXfrm>
-        <a:off x="6852450" y="3338007"/>
-        <a:ext cx="14875" cy="14875"/>
+        <a:off x="5823450" y="3796252"/>
+        <a:ext cx="9895" cy="9895"/>
       </dsp:txXfrm>
     </dsp:sp>
-    <dsp:sp modelId="{6FB29898-0152-4460-9FA2-C023B30AA889}">
+    <dsp:sp modelId="{E7DB1CDA-3D4C-4818-A88C-6D185D722EC6}">
       <dsp:nvSpPr>
         <dsp:cNvPr id="0" name=""/>
         <dsp:cNvSpPr/>
       </dsp:nvSpPr>
       <dsp:spPr>
         <a:xfrm>
-          <a:off x="5459749" y="3448058"/>
-          <a:ext cx="215405" cy="615679"/>
+          <a:off x="6811052" y="2864981"/>
+          <a:ext cx="178664" cy="170221"/>
         </a:xfrm>
         <a:custGeom>
           <a:avLst/>
@@ -5157,16 +5531,16 @@
           <a:pathLst>
             <a:path>
               <a:moveTo>
-                <a:pt x="0" y="615679"/>
+                <a:pt x="0" y="0"/>
               </a:moveTo>
               <a:lnTo>
-                <a:pt x="107702" y="615679"/>
+                <a:pt x="89332" y="0"/>
               </a:lnTo>
               <a:lnTo>
-                <a:pt x="107702" y="0"/>
+                <a:pt x="89332" y="170221"/>
               </a:lnTo>
               <a:lnTo>
-                <a:pt x="215405" y="0"/>
+                <a:pt x="178664" y="170221"/>
               </a:lnTo>
             </a:path>
           </a:pathLst>
@@ -5218,19 +5592,19 @@
         </a:p>
       </dsp:txBody>
       <dsp:txXfrm>
-        <a:off x="5551145" y="3739592"/>
-        <a:ext cx="32613" cy="32613"/>
+        <a:off x="6894215" y="2943923"/>
+        <a:ext cx="12338" cy="12338"/>
       </dsp:txXfrm>
     </dsp:sp>
-    <dsp:sp modelId="{E0BC23FD-A123-4F6F-B29F-B1B1A8DCFCAA}">
+    <dsp:sp modelId="{0F4448C4-16D0-412B-B97C-B3EE8C574400}">
       <dsp:nvSpPr>
         <dsp:cNvPr id="0" name=""/>
         <dsp:cNvSpPr/>
       </dsp:nvSpPr>
       <dsp:spPr>
         <a:xfrm>
-          <a:off x="4167314" y="4063738"/>
-          <a:ext cx="215405" cy="410453"/>
+          <a:off x="7905301" y="2694760"/>
+          <a:ext cx="396965" cy="324540"/>
         </a:xfrm>
         <a:custGeom>
           <a:avLst/>
@@ -5241,16 +5615,16 @@
           <a:pathLst>
             <a:path>
               <a:moveTo>
-                <a:pt x="0" y="410453"/>
+                <a:pt x="0" y="0"/>
               </a:moveTo>
               <a:lnTo>
-                <a:pt x="107702" y="410453"/>
+                <a:pt x="198482" y="0"/>
               </a:lnTo>
               <a:lnTo>
-                <a:pt x="107702" y="0"/>
+                <a:pt x="198482" y="324540"/>
               </a:lnTo>
               <a:lnTo>
-                <a:pt x="215405" y="0"/>
+                <a:pt x="396965" y="324540"/>
               </a:lnTo>
             </a:path>
           </a:pathLst>
@@ -5302,8 +5676,428 @@
         </a:p>
       </dsp:txBody>
       <dsp:txXfrm>
-        <a:off x="4263428" y="4257376"/>
-        <a:ext cx="23177" cy="23177"/>
+        <a:off x="8090965" y="2844211"/>
+        <a:ext cx="25637" cy="25637"/>
+      </dsp:txXfrm>
+    </dsp:sp>
+    <dsp:sp modelId="{A3E99873-9A6B-448D-882B-6A1290124BE0}">
+      <dsp:nvSpPr>
+        <dsp:cNvPr id="0" name=""/>
+        <dsp:cNvSpPr/>
+      </dsp:nvSpPr>
+      <dsp:spPr>
+        <a:xfrm>
+          <a:off x="7905301" y="2633137"/>
+          <a:ext cx="396965" cy="91440"/>
+        </a:xfrm>
+        <a:custGeom>
+          <a:avLst/>
+          <a:gdLst/>
+          <a:ahLst/>
+          <a:cxnLst/>
+          <a:rect l="0" t="0" r="0" b="0"/>
+          <a:pathLst>
+            <a:path>
+              <a:moveTo>
+                <a:pt x="0" y="61622"/>
+              </a:moveTo>
+              <a:lnTo>
+                <a:pt x="198482" y="61622"/>
+              </a:lnTo>
+              <a:lnTo>
+                <a:pt x="198482" y="45720"/>
+              </a:lnTo>
+              <a:lnTo>
+                <a:pt x="396965" y="45720"/>
+              </a:lnTo>
+            </a:path>
+          </a:pathLst>
+        </a:custGeom>
+        <a:noFill/>
+        <a:ln w="9525" cap="rnd" cmpd="sng" algn="ctr">
+          <a:solidFill>
+            <a:schemeClr val="accent1">
+              <a:hueOff val="0"/>
+              <a:satOff val="0"/>
+              <a:lumOff val="0"/>
+              <a:alphaOff val="0"/>
+            </a:schemeClr>
+          </a:solidFill>
+          <a:prstDash val="solid"/>
+        </a:ln>
+        <a:effectLst/>
+      </dsp:spPr>
+      <dsp:style>
+        <a:lnRef idx="1">
+          <a:scrgbClr r="0" g="0" b="0"/>
+        </a:lnRef>
+        <a:fillRef idx="0">
+          <a:scrgbClr r="0" g="0" b="0"/>
+        </a:fillRef>
+        <a:effectRef idx="0">
+          <a:scrgbClr r="0" g="0" b="0"/>
+        </a:effectRef>
+        <a:fontRef idx="minor"/>
+      </dsp:style>
+      <dsp:txBody>
+        <a:bodyPr spcFirstLastPara="0" vert="horz" wrap="square" lIns="12700" tIns="0" rIns="12700" bIns="0" numCol="1" spcCol="1270" anchor="ctr" anchorCtr="0">
+          <a:noAutofit/>
+        </a:bodyPr>
+        <a:lstStyle/>
+        <a:p>
+          <a:pPr lvl="0" algn="ctr" defTabSz="222250">
+            <a:lnSpc>
+              <a:spcPct val="90000"/>
+            </a:lnSpc>
+            <a:spcBef>
+              <a:spcPct val="0"/>
+            </a:spcBef>
+            <a:spcAft>
+              <a:spcPct val="35000"/>
+            </a:spcAft>
+          </a:pPr>
+          <a:endParaRPr lang="fr-FR" sz="500" kern="1200"/>
+        </a:p>
+      </dsp:txBody>
+      <dsp:txXfrm>
+        <a:off x="8093852" y="2668925"/>
+        <a:ext cx="19864" cy="19864"/>
+      </dsp:txXfrm>
+    </dsp:sp>
+    <dsp:sp modelId="{BCF6B846-BCE0-4A36-AB58-F37D855BACB3}">
+      <dsp:nvSpPr>
+        <dsp:cNvPr id="0" name=""/>
+        <dsp:cNvSpPr/>
+      </dsp:nvSpPr>
+      <dsp:spPr>
+        <a:xfrm>
+          <a:off x="7905301" y="2338414"/>
+          <a:ext cx="396965" cy="356345"/>
+        </a:xfrm>
+        <a:custGeom>
+          <a:avLst/>
+          <a:gdLst/>
+          <a:ahLst/>
+          <a:cxnLst/>
+          <a:rect l="0" t="0" r="0" b="0"/>
+          <a:pathLst>
+            <a:path>
+              <a:moveTo>
+                <a:pt x="0" y="356345"/>
+              </a:moveTo>
+              <a:lnTo>
+                <a:pt x="198482" y="356345"/>
+              </a:lnTo>
+              <a:lnTo>
+                <a:pt x="198482" y="0"/>
+              </a:lnTo>
+              <a:lnTo>
+                <a:pt x="396965" y="0"/>
+              </a:lnTo>
+            </a:path>
+          </a:pathLst>
+        </a:custGeom>
+        <a:noFill/>
+        <a:ln w="9525" cap="rnd" cmpd="sng" algn="ctr">
+          <a:solidFill>
+            <a:schemeClr val="accent1">
+              <a:hueOff val="0"/>
+              <a:satOff val="0"/>
+              <a:lumOff val="0"/>
+              <a:alphaOff val="0"/>
+            </a:schemeClr>
+          </a:solidFill>
+          <a:prstDash val="solid"/>
+        </a:ln>
+        <a:effectLst/>
+      </dsp:spPr>
+      <dsp:style>
+        <a:lnRef idx="1">
+          <a:scrgbClr r="0" g="0" b="0"/>
+        </a:lnRef>
+        <a:fillRef idx="0">
+          <a:scrgbClr r="0" g="0" b="0"/>
+        </a:fillRef>
+        <a:effectRef idx="0">
+          <a:scrgbClr r="0" g="0" b="0"/>
+        </a:effectRef>
+        <a:fontRef idx="minor"/>
+      </dsp:style>
+      <dsp:txBody>
+        <a:bodyPr spcFirstLastPara="0" vert="horz" wrap="square" lIns="12700" tIns="0" rIns="12700" bIns="0" numCol="1" spcCol="1270" anchor="ctr" anchorCtr="0">
+          <a:noAutofit/>
+        </a:bodyPr>
+        <a:lstStyle/>
+        <a:p>
+          <a:pPr lvl="0" algn="ctr" defTabSz="222250">
+            <a:lnSpc>
+              <a:spcPct val="90000"/>
+            </a:lnSpc>
+            <a:spcBef>
+              <a:spcPct val="0"/>
+            </a:spcBef>
+            <a:spcAft>
+              <a:spcPct val="35000"/>
+            </a:spcAft>
+          </a:pPr>
+          <a:endParaRPr lang="fr-FR" sz="500" kern="1200"/>
+        </a:p>
+      </dsp:txBody>
+      <dsp:txXfrm>
+        <a:off x="8090448" y="2503251"/>
+        <a:ext cx="26672" cy="26672"/>
+      </dsp:txXfrm>
+    </dsp:sp>
+    <dsp:sp modelId="{7137EB5A-E346-4115-9F66-B74C3542748E}">
+      <dsp:nvSpPr>
+        <dsp:cNvPr id="0" name=""/>
+        <dsp:cNvSpPr/>
+      </dsp:nvSpPr>
+      <dsp:spPr>
+        <a:xfrm>
+          <a:off x="6811052" y="2694760"/>
+          <a:ext cx="178664" cy="170221"/>
+        </a:xfrm>
+        <a:custGeom>
+          <a:avLst/>
+          <a:gdLst/>
+          <a:ahLst/>
+          <a:cxnLst/>
+          <a:rect l="0" t="0" r="0" b="0"/>
+          <a:pathLst>
+            <a:path>
+              <a:moveTo>
+                <a:pt x="0" y="170221"/>
+              </a:moveTo>
+              <a:lnTo>
+                <a:pt x="89332" y="170221"/>
+              </a:lnTo>
+              <a:lnTo>
+                <a:pt x="89332" y="0"/>
+              </a:lnTo>
+              <a:lnTo>
+                <a:pt x="178664" y="0"/>
+              </a:lnTo>
+            </a:path>
+          </a:pathLst>
+        </a:custGeom>
+        <a:noFill/>
+        <a:ln w="9525" cap="rnd" cmpd="sng" algn="ctr">
+          <a:solidFill>
+            <a:schemeClr val="accent1">
+              <a:hueOff val="0"/>
+              <a:satOff val="0"/>
+              <a:lumOff val="0"/>
+              <a:alphaOff val="0"/>
+            </a:schemeClr>
+          </a:solidFill>
+          <a:prstDash val="solid"/>
+        </a:ln>
+        <a:effectLst/>
+      </dsp:spPr>
+      <dsp:style>
+        <a:lnRef idx="1">
+          <a:scrgbClr r="0" g="0" b="0"/>
+        </a:lnRef>
+        <a:fillRef idx="0">
+          <a:scrgbClr r="0" g="0" b="0"/>
+        </a:fillRef>
+        <a:effectRef idx="0">
+          <a:scrgbClr r="0" g="0" b="0"/>
+        </a:effectRef>
+        <a:fontRef idx="minor"/>
+      </dsp:style>
+      <dsp:txBody>
+        <a:bodyPr spcFirstLastPara="0" vert="horz" wrap="square" lIns="12700" tIns="0" rIns="12700" bIns="0" numCol="1" spcCol="1270" anchor="ctr" anchorCtr="0">
+          <a:noAutofit/>
+        </a:bodyPr>
+        <a:lstStyle/>
+        <a:p>
+          <a:pPr lvl="0" algn="ctr" defTabSz="222250">
+            <a:lnSpc>
+              <a:spcPct val="90000"/>
+            </a:lnSpc>
+            <a:spcBef>
+              <a:spcPct val="0"/>
+            </a:spcBef>
+            <a:spcAft>
+              <a:spcPct val="35000"/>
+            </a:spcAft>
+          </a:pPr>
+          <a:endParaRPr lang="fr-FR" sz="500" kern="1200"/>
+        </a:p>
+      </dsp:txBody>
+      <dsp:txXfrm>
+        <a:off x="6894215" y="2773701"/>
+        <a:ext cx="12338" cy="12338"/>
+      </dsp:txXfrm>
+    </dsp:sp>
+    <dsp:sp modelId="{6FB29898-0152-4460-9FA2-C023B30AA889}">
+      <dsp:nvSpPr>
+        <dsp:cNvPr id="0" name=""/>
+        <dsp:cNvSpPr/>
+      </dsp:nvSpPr>
+      <dsp:spPr>
+        <a:xfrm>
+          <a:off x="5739065" y="2864981"/>
+          <a:ext cx="178664" cy="936218"/>
+        </a:xfrm>
+        <a:custGeom>
+          <a:avLst/>
+          <a:gdLst/>
+          <a:ahLst/>
+          <a:cxnLst/>
+          <a:rect l="0" t="0" r="0" b="0"/>
+          <a:pathLst>
+            <a:path>
+              <a:moveTo>
+                <a:pt x="0" y="936218"/>
+              </a:moveTo>
+              <a:lnTo>
+                <a:pt x="89332" y="936218"/>
+              </a:lnTo>
+              <a:lnTo>
+                <a:pt x="89332" y="0"/>
+              </a:lnTo>
+              <a:lnTo>
+                <a:pt x="178664" y="0"/>
+              </a:lnTo>
+            </a:path>
+          </a:pathLst>
+        </a:custGeom>
+        <a:noFill/>
+        <a:ln w="9525" cap="rnd" cmpd="sng" algn="ctr">
+          <a:solidFill>
+            <a:schemeClr val="accent1">
+              <a:hueOff val="0"/>
+              <a:satOff val="0"/>
+              <a:lumOff val="0"/>
+              <a:alphaOff val="0"/>
+            </a:schemeClr>
+          </a:solidFill>
+          <a:prstDash val="solid"/>
+        </a:ln>
+        <a:effectLst/>
+      </dsp:spPr>
+      <dsp:style>
+        <a:lnRef idx="1">
+          <a:scrgbClr r="0" g="0" b="0"/>
+        </a:lnRef>
+        <a:fillRef idx="0">
+          <a:scrgbClr r="0" g="0" b="0"/>
+        </a:fillRef>
+        <a:effectRef idx="0">
+          <a:scrgbClr r="0" g="0" b="0"/>
+        </a:effectRef>
+        <a:fontRef idx="minor"/>
+      </dsp:style>
+      <dsp:txBody>
+        <a:bodyPr spcFirstLastPara="0" vert="horz" wrap="square" lIns="12700" tIns="0" rIns="12700" bIns="0" numCol="1" spcCol="1270" anchor="ctr" anchorCtr="0">
+          <a:noAutofit/>
+        </a:bodyPr>
+        <a:lstStyle/>
+        <a:p>
+          <a:pPr lvl="0" algn="ctr" defTabSz="222250">
+            <a:lnSpc>
+              <a:spcPct val="90000"/>
+            </a:lnSpc>
+            <a:spcBef>
+              <a:spcPct val="0"/>
+            </a:spcBef>
+            <a:spcAft>
+              <a:spcPct val="35000"/>
+            </a:spcAft>
+          </a:pPr>
+          <a:endParaRPr lang="fr-FR" sz="500" kern="1200"/>
+        </a:p>
+      </dsp:txBody>
+      <dsp:txXfrm>
+        <a:off x="5804570" y="3309263"/>
+        <a:ext cx="47655" cy="47655"/>
+      </dsp:txXfrm>
+    </dsp:sp>
+    <dsp:sp modelId="{E0BC23FD-A123-4F6F-B29F-B1B1A8DCFCAA}">
+      <dsp:nvSpPr>
+        <dsp:cNvPr id="0" name=""/>
+        <dsp:cNvSpPr/>
+      </dsp:nvSpPr>
+      <dsp:spPr>
+        <a:xfrm>
+          <a:off x="4667079" y="3801200"/>
+          <a:ext cx="178664" cy="340442"/>
+        </a:xfrm>
+        <a:custGeom>
+          <a:avLst/>
+          <a:gdLst/>
+          <a:ahLst/>
+          <a:cxnLst/>
+          <a:rect l="0" t="0" r="0" b="0"/>
+          <a:pathLst>
+            <a:path>
+              <a:moveTo>
+                <a:pt x="0" y="340442"/>
+              </a:moveTo>
+              <a:lnTo>
+                <a:pt x="89332" y="340442"/>
+              </a:lnTo>
+              <a:lnTo>
+                <a:pt x="89332" y="0"/>
+              </a:lnTo>
+              <a:lnTo>
+                <a:pt x="178664" y="0"/>
+              </a:lnTo>
+            </a:path>
+          </a:pathLst>
+        </a:custGeom>
+        <a:noFill/>
+        <a:ln w="9525" cap="rnd" cmpd="sng" algn="ctr">
+          <a:solidFill>
+            <a:schemeClr val="accent1">
+              <a:hueOff val="0"/>
+              <a:satOff val="0"/>
+              <a:lumOff val="0"/>
+              <a:alphaOff val="0"/>
+            </a:schemeClr>
+          </a:solidFill>
+          <a:prstDash val="solid"/>
+        </a:ln>
+        <a:effectLst/>
+      </dsp:spPr>
+      <dsp:style>
+        <a:lnRef idx="1">
+          <a:scrgbClr r="0" g="0" b="0"/>
+        </a:lnRef>
+        <a:fillRef idx="0">
+          <a:scrgbClr r="0" g="0" b="0"/>
+        </a:fillRef>
+        <a:effectRef idx="0">
+          <a:scrgbClr r="0" g="0" b="0"/>
+        </a:effectRef>
+        <a:fontRef idx="minor"/>
+      </dsp:style>
+      <dsp:txBody>
+        <a:bodyPr spcFirstLastPara="0" vert="horz" wrap="square" lIns="12700" tIns="0" rIns="12700" bIns="0" numCol="1" spcCol="1270" anchor="ctr" anchorCtr="0">
+          <a:noAutofit/>
+        </a:bodyPr>
+        <a:lstStyle/>
+        <a:p>
+          <a:pPr lvl="0" algn="ctr" defTabSz="222250">
+            <a:lnSpc>
+              <a:spcPct val="90000"/>
+            </a:lnSpc>
+            <a:spcBef>
+              <a:spcPct val="0"/>
+            </a:spcBef>
+            <a:spcAft>
+              <a:spcPct val="35000"/>
+            </a:spcAft>
+          </a:pPr>
+          <a:endParaRPr lang="fr-FR" sz="500" kern="1200"/>
+        </a:p>
+      </dsp:txBody>
+      <dsp:txXfrm>
+        <a:off x="4746799" y="3961809"/>
+        <a:ext cx="19223" cy="19223"/>
       </dsp:txXfrm>
     </dsp:sp>
     <dsp:sp modelId="{4DD7F22F-5100-4F0E-840A-57F6C2B4824E}">
@@ -5313,8 +6107,8 @@
       </dsp:nvSpPr>
       <dsp:spPr>
         <a:xfrm>
-          <a:off x="2874879" y="4428472"/>
-          <a:ext cx="215405" cy="91440"/>
+          <a:off x="3595092" y="4095923"/>
+          <a:ext cx="178664" cy="91440"/>
         </a:xfrm>
         <a:custGeom>
           <a:avLst/>
@@ -5328,7 +6122,7 @@
                 <a:pt x="0" y="45720"/>
               </a:moveTo>
               <a:lnTo>
-                <a:pt x="215405" y="45720"/>
+                <a:pt x="178664" y="45720"/>
               </a:lnTo>
             </a:path>
           </a:pathLst>
@@ -5380,8 +6174,8 @@
         </a:p>
       </dsp:txBody>
       <dsp:txXfrm>
-        <a:off x="2977196" y="4468807"/>
-        <a:ext cx="10770" cy="10770"/>
+        <a:off x="3679957" y="4137176"/>
+        <a:ext cx="8933" cy="8933"/>
       </dsp:txXfrm>
     </dsp:sp>
     <dsp:sp modelId="{3F497CFA-6478-4309-8C27-A4BBA02D3D1D}">
@@ -5391,8 +6185,8 @@
       </dsp:nvSpPr>
       <dsp:spPr>
         <a:xfrm>
-          <a:off x="1582443" y="2524538"/>
-          <a:ext cx="215405" cy="1949653"/>
+          <a:off x="2523105" y="2311762"/>
+          <a:ext cx="178664" cy="1829881"/>
         </a:xfrm>
         <a:custGeom>
           <a:avLst/>
@@ -5406,13 +6200,13 @@
                 <a:pt x="0" y="0"/>
               </a:moveTo>
               <a:lnTo>
-                <a:pt x="107702" y="0"/>
+                <a:pt x="89332" y="0"/>
               </a:lnTo>
               <a:lnTo>
-                <a:pt x="107702" y="1949653"/>
+                <a:pt x="89332" y="1829881"/>
               </a:lnTo>
               <a:lnTo>
-                <a:pt x="215405" y="1949653"/>
+                <a:pt x="178664" y="1829881"/>
               </a:lnTo>
             </a:path>
           </a:pathLst>
@@ -5464,8 +6258,8 @@
         </a:p>
       </dsp:txBody>
       <dsp:txXfrm>
-        <a:off x="1641108" y="3450327"/>
-        <a:ext cx="98075" cy="98075"/>
+        <a:off x="2566472" y="3180738"/>
+        <a:ext cx="91929" cy="91929"/>
       </dsp:txXfrm>
     </dsp:sp>
     <dsp:sp modelId="{BCB0C310-6712-457C-83F4-AD90D18B30F1}">
@@ -5475,8 +6269,8 @@
       </dsp:nvSpPr>
       <dsp:spPr>
         <a:xfrm>
-          <a:off x="2874879" y="2216699"/>
-          <a:ext cx="215405" cy="205226"/>
+          <a:off x="3595092" y="1843653"/>
+          <a:ext cx="178664" cy="170221"/>
         </a:xfrm>
         <a:custGeom>
           <a:avLst/>
@@ -5490,13 +6284,13 @@
                 <a:pt x="0" y="0"/>
               </a:moveTo>
               <a:lnTo>
-                <a:pt x="107702" y="0"/>
+                <a:pt x="89332" y="0"/>
               </a:lnTo>
               <a:lnTo>
-                <a:pt x="107702" y="205226"/>
+                <a:pt x="89332" y="170221"/>
               </a:lnTo>
               <a:lnTo>
-                <a:pt x="215405" y="205226"/>
+                <a:pt x="178664" y="170221"/>
               </a:lnTo>
             </a:path>
           </a:pathLst>
@@ -5548,8 +6342,8 @@
         </a:p>
       </dsp:txBody>
       <dsp:txXfrm>
-        <a:off x="2975144" y="2311874"/>
-        <a:ext cx="14875" cy="14875"/>
+        <a:off x="3678255" y="1922594"/>
+        <a:ext cx="12338" cy="12338"/>
       </dsp:txXfrm>
     </dsp:sp>
     <dsp:sp modelId="{11A95FA8-BC12-4F2B-93AC-994CC23CB247}">
@@ -5559,8 +6353,8 @@
       </dsp:nvSpPr>
       <dsp:spPr>
         <a:xfrm>
-          <a:off x="4167314" y="2011472"/>
-          <a:ext cx="215405" cy="205226"/>
+          <a:off x="4667079" y="1673431"/>
+          <a:ext cx="178664" cy="170221"/>
         </a:xfrm>
         <a:custGeom>
           <a:avLst/>
@@ -5574,13 +6368,13 @@
                 <a:pt x="0" y="0"/>
               </a:moveTo>
               <a:lnTo>
-                <a:pt x="107702" y="0"/>
+                <a:pt x="89332" y="0"/>
               </a:lnTo>
               <a:lnTo>
-                <a:pt x="107702" y="205226"/>
+                <a:pt x="89332" y="170221"/>
               </a:lnTo>
               <a:lnTo>
-                <a:pt x="215405" y="205226"/>
+                <a:pt x="178664" y="170221"/>
               </a:lnTo>
             </a:path>
           </a:pathLst>
@@ -5632,8 +6426,8 @@
         </a:p>
       </dsp:txBody>
       <dsp:txXfrm>
-        <a:off x="4267579" y="2106647"/>
-        <a:ext cx="14875" cy="14875"/>
+        <a:off x="4750241" y="1752372"/>
+        <a:ext cx="12338" cy="12338"/>
       </dsp:txXfrm>
     </dsp:sp>
     <dsp:sp modelId="{EF1303F6-08C0-48FA-B58F-D294B3FD0956}">
@@ -5643,8 +6437,8 @@
       </dsp:nvSpPr>
       <dsp:spPr>
         <a:xfrm>
-          <a:off x="5459749" y="1806245"/>
-          <a:ext cx="215405" cy="410453"/>
+          <a:off x="5739065" y="1503210"/>
+          <a:ext cx="178664" cy="340442"/>
         </a:xfrm>
         <a:custGeom>
           <a:avLst/>
@@ -5658,13 +6452,13 @@
                 <a:pt x="0" y="0"/>
               </a:moveTo>
               <a:lnTo>
-                <a:pt x="107702" y="0"/>
+                <a:pt x="89332" y="0"/>
               </a:lnTo>
               <a:lnTo>
-                <a:pt x="107702" y="410453"/>
+                <a:pt x="89332" y="340442"/>
               </a:lnTo>
               <a:lnTo>
-                <a:pt x="215405" y="410453"/>
+                <a:pt x="178664" y="340442"/>
               </a:lnTo>
             </a:path>
           </a:pathLst>
@@ -5716,8 +6510,8 @@
         </a:p>
       </dsp:txBody>
       <dsp:txXfrm>
-        <a:off x="5555864" y="1999883"/>
-        <a:ext cx="23177" cy="23177"/>
+        <a:off x="5818786" y="1663819"/>
+        <a:ext cx="19223" cy="19223"/>
       </dsp:txXfrm>
     </dsp:sp>
     <dsp:sp modelId="{F61ED2EA-3DCB-4BDF-974A-6D38D5B018AB}">
@@ -5727,8 +6521,8 @@
       </dsp:nvSpPr>
       <dsp:spPr>
         <a:xfrm>
-          <a:off x="5459749" y="1760525"/>
-          <a:ext cx="215405" cy="91440"/>
+          <a:off x="5739065" y="1457490"/>
+          <a:ext cx="178664" cy="91440"/>
         </a:xfrm>
         <a:custGeom>
           <a:avLst/>
@@ -5742,7 +6536,7 @@
                 <a:pt x="0" y="45720"/>
               </a:moveTo>
               <a:lnTo>
-                <a:pt x="215405" y="45720"/>
+                <a:pt x="178664" y="45720"/>
               </a:lnTo>
             </a:path>
           </a:pathLst>
@@ -5794,8 +6588,8 @@
         </a:p>
       </dsp:txBody>
       <dsp:txXfrm>
-        <a:off x="5562067" y="1800860"/>
-        <a:ext cx="10770" cy="10770"/>
+        <a:off x="5823931" y="1498743"/>
+        <a:ext cx="8933" cy="8933"/>
       </dsp:txXfrm>
     </dsp:sp>
     <dsp:sp modelId="{E6122314-4232-42C9-987E-46FE0FA3495B}">
@@ -5805,8 +6599,8 @@
       </dsp:nvSpPr>
       <dsp:spPr>
         <a:xfrm>
-          <a:off x="5459749" y="1395792"/>
-          <a:ext cx="215405" cy="410453"/>
+          <a:off x="5739065" y="1162767"/>
+          <a:ext cx="178664" cy="340442"/>
         </a:xfrm>
         <a:custGeom>
           <a:avLst/>
@@ -5817,16 +6611,16 @@
           <a:pathLst>
             <a:path>
               <a:moveTo>
-                <a:pt x="0" y="410453"/>
+                <a:pt x="0" y="340442"/>
               </a:moveTo>
               <a:lnTo>
-                <a:pt x="107702" y="410453"/>
+                <a:pt x="89332" y="340442"/>
               </a:lnTo>
               <a:lnTo>
-                <a:pt x="107702" y="0"/>
+                <a:pt x="89332" y="0"/>
               </a:lnTo>
               <a:lnTo>
-                <a:pt x="215405" y="0"/>
+                <a:pt x="178664" y="0"/>
               </a:lnTo>
             </a:path>
           </a:pathLst>
@@ -5878,8 +6672,8 @@
         </a:p>
       </dsp:txBody>
       <dsp:txXfrm>
-        <a:off x="5555864" y="1589430"/>
-        <a:ext cx="23177" cy="23177"/>
+        <a:off x="5818786" y="1323376"/>
+        <a:ext cx="19223" cy="19223"/>
       </dsp:txXfrm>
     </dsp:sp>
     <dsp:sp modelId="{9D957ECC-C536-4171-9E3F-ADA463C520DE}">
@@ -5889,8 +6683,8 @@
       </dsp:nvSpPr>
       <dsp:spPr>
         <a:xfrm>
-          <a:off x="4167314" y="1806245"/>
-          <a:ext cx="215405" cy="205226"/>
+          <a:off x="4667079" y="1503210"/>
+          <a:ext cx="178664" cy="170221"/>
         </a:xfrm>
         <a:custGeom>
           <a:avLst/>
@@ -5901,16 +6695,16 @@
           <a:pathLst>
             <a:path>
               <a:moveTo>
-                <a:pt x="0" y="205226"/>
+                <a:pt x="0" y="170221"/>
               </a:moveTo>
               <a:lnTo>
-                <a:pt x="107702" y="205226"/>
+                <a:pt x="89332" y="170221"/>
               </a:lnTo>
               <a:lnTo>
-                <a:pt x="107702" y="0"/>
+                <a:pt x="89332" y="0"/>
               </a:lnTo>
               <a:lnTo>
-                <a:pt x="215405" y="0"/>
+                <a:pt x="178664" y="0"/>
               </a:lnTo>
             </a:path>
           </a:pathLst>
@@ -5962,8 +6756,8 @@
         </a:p>
       </dsp:txBody>
       <dsp:txXfrm>
-        <a:off x="4267579" y="1901421"/>
-        <a:ext cx="14875" cy="14875"/>
+        <a:off x="4750241" y="1582151"/>
+        <a:ext cx="12338" cy="12338"/>
       </dsp:txXfrm>
     </dsp:sp>
     <dsp:sp modelId="{6E28F844-322A-4B11-9FD3-C3F3F369B4BB}">
@@ -5973,8 +6767,8 @@
       </dsp:nvSpPr>
       <dsp:spPr>
         <a:xfrm>
-          <a:off x="2874879" y="2011472"/>
-          <a:ext cx="215405" cy="205226"/>
+          <a:off x="3595092" y="1673431"/>
+          <a:ext cx="178664" cy="170221"/>
         </a:xfrm>
         <a:custGeom>
           <a:avLst/>
@@ -5985,16 +6779,16 @@
           <a:pathLst>
             <a:path>
               <a:moveTo>
-                <a:pt x="0" y="205226"/>
+                <a:pt x="0" y="170221"/>
               </a:moveTo>
               <a:lnTo>
-                <a:pt x="107702" y="205226"/>
+                <a:pt x="89332" y="170221"/>
               </a:lnTo>
               <a:lnTo>
-                <a:pt x="107702" y="0"/>
+                <a:pt x="89332" y="0"/>
               </a:lnTo>
               <a:lnTo>
-                <a:pt x="215405" y="0"/>
+                <a:pt x="178664" y="0"/>
               </a:lnTo>
             </a:path>
           </a:pathLst>
@@ -6046,8 +6840,8 @@
         </a:p>
       </dsp:txBody>
       <dsp:txXfrm>
-        <a:off x="2975144" y="2106647"/>
-        <a:ext cx="14875" cy="14875"/>
+        <a:off x="3678255" y="1752372"/>
+        <a:ext cx="12338" cy="12338"/>
       </dsp:txXfrm>
     </dsp:sp>
     <dsp:sp modelId="{11CBC200-06F7-4DD2-9C34-18F45043F91F}">
@@ -6057,8 +6851,8 @@
       </dsp:nvSpPr>
       <dsp:spPr>
         <a:xfrm>
-          <a:off x="1582443" y="2216699"/>
-          <a:ext cx="215405" cy="307839"/>
+          <a:off x="2523105" y="1843653"/>
+          <a:ext cx="178664" cy="468109"/>
         </a:xfrm>
         <a:custGeom>
           <a:avLst/>
@@ -6069,16 +6863,16 @@
           <a:pathLst>
             <a:path>
               <a:moveTo>
-                <a:pt x="0" y="307839"/>
+                <a:pt x="0" y="468109"/>
               </a:moveTo>
               <a:lnTo>
-                <a:pt x="107702" y="307839"/>
+                <a:pt x="89332" y="468109"/>
               </a:lnTo>
               <a:lnTo>
-                <a:pt x="107702" y="0"/>
+                <a:pt x="89332" y="0"/>
               </a:lnTo>
               <a:lnTo>
-                <a:pt x="215405" y="0"/>
+                <a:pt x="178664" y="0"/>
               </a:lnTo>
             </a:path>
           </a:pathLst>
@@ -6130,8 +6924,8 @@
         </a:p>
       </dsp:txBody>
       <dsp:txXfrm>
-        <a:off x="1680753" y="2361226"/>
-        <a:ext cx="18785" cy="18785"/>
+        <a:off x="2599911" y="2065181"/>
+        <a:ext cx="25052" cy="25052"/>
       </dsp:txXfrm>
     </dsp:sp>
     <dsp:sp modelId="{2B938EF2-BE37-4FC8-BFD3-6256540813BC}">
@@ -6141,8 +6935,8 @@
       </dsp:nvSpPr>
       <dsp:spPr>
         <a:xfrm>
-          <a:off x="2874879" y="574885"/>
-          <a:ext cx="215405" cy="410453"/>
+          <a:off x="3595092" y="481881"/>
+          <a:ext cx="178664" cy="340442"/>
         </a:xfrm>
         <a:custGeom>
           <a:avLst/>
@@ -6156,13 +6950,13 @@
                 <a:pt x="0" y="0"/>
               </a:moveTo>
               <a:lnTo>
-                <a:pt x="107702" y="0"/>
+                <a:pt x="89332" y="0"/>
               </a:lnTo>
               <a:lnTo>
-                <a:pt x="107702" y="410453"/>
+                <a:pt x="89332" y="340442"/>
               </a:lnTo>
               <a:lnTo>
-                <a:pt x="215405" y="410453"/>
+                <a:pt x="178664" y="340442"/>
               </a:lnTo>
             </a:path>
           </a:pathLst>
@@ -6214,8 +7008,8 @@
         </a:p>
       </dsp:txBody>
       <dsp:txXfrm>
-        <a:off x="2970993" y="768523"/>
-        <a:ext cx="23177" cy="23177"/>
+        <a:off x="3674812" y="642490"/>
+        <a:ext cx="19223" cy="19223"/>
       </dsp:txXfrm>
     </dsp:sp>
     <dsp:sp modelId="{646E88BD-40D7-4786-AAB6-CFE3405707CA}">
@@ -6225,8 +7019,8 @@
       </dsp:nvSpPr>
       <dsp:spPr>
         <a:xfrm>
-          <a:off x="2874879" y="529165"/>
-          <a:ext cx="215405" cy="91440"/>
+          <a:off x="3595092" y="436161"/>
+          <a:ext cx="178664" cy="91440"/>
         </a:xfrm>
         <a:custGeom>
           <a:avLst/>
@@ -6240,7 +7034,7 @@
                 <a:pt x="0" y="45720"/>
               </a:moveTo>
               <a:lnTo>
-                <a:pt x="215405" y="45720"/>
+                <a:pt x="178664" y="45720"/>
               </a:lnTo>
             </a:path>
           </a:pathLst>
@@ -6292,8 +7086,8 @@
         </a:p>
       </dsp:txBody>
       <dsp:txXfrm>
-        <a:off x="2977196" y="569500"/>
-        <a:ext cx="10770" cy="10770"/>
+        <a:off x="3679957" y="477414"/>
+        <a:ext cx="8933" cy="8933"/>
       </dsp:txXfrm>
     </dsp:sp>
     <dsp:sp modelId="{EEA2D9E6-5C3F-47D0-A681-0364417D24E2}">
@@ -6303,8 +7097,8 @@
       </dsp:nvSpPr>
       <dsp:spPr>
         <a:xfrm>
-          <a:off x="2874879" y="164432"/>
-          <a:ext cx="215405" cy="410453"/>
+          <a:off x="3595092" y="141438"/>
+          <a:ext cx="178664" cy="340442"/>
         </a:xfrm>
         <a:custGeom>
           <a:avLst/>
@@ -6315,16 +7109,16 @@
           <a:pathLst>
             <a:path>
               <a:moveTo>
-                <a:pt x="0" y="410453"/>
+                <a:pt x="0" y="340442"/>
               </a:moveTo>
               <a:lnTo>
-                <a:pt x="107702" y="410453"/>
+                <a:pt x="89332" y="340442"/>
               </a:lnTo>
               <a:lnTo>
-                <a:pt x="107702" y="0"/>
+                <a:pt x="89332" y="0"/>
               </a:lnTo>
               <a:lnTo>
-                <a:pt x="215405" y="0"/>
+                <a:pt x="178664" y="0"/>
               </a:lnTo>
             </a:path>
           </a:pathLst>
@@ -6376,8 +7170,8 @@
         </a:p>
       </dsp:txBody>
       <dsp:txXfrm>
-        <a:off x="2970993" y="358070"/>
-        <a:ext cx="23177" cy="23177"/>
+        <a:off x="3674812" y="302047"/>
+        <a:ext cx="19223" cy="19223"/>
       </dsp:txXfrm>
     </dsp:sp>
     <dsp:sp modelId="{F3C8D12A-0632-4387-A3A7-62683536F1D8}">
@@ -6387,8 +7181,8 @@
       </dsp:nvSpPr>
       <dsp:spPr>
         <a:xfrm>
-          <a:off x="1582443" y="574885"/>
-          <a:ext cx="215405" cy="1949653"/>
+          <a:off x="2523105" y="481881"/>
+          <a:ext cx="178664" cy="1829881"/>
         </a:xfrm>
         <a:custGeom>
           <a:avLst/>
@@ -6399,16 +7193,16 @@
           <a:pathLst>
             <a:path>
               <a:moveTo>
-                <a:pt x="0" y="1949653"/>
+                <a:pt x="0" y="1829881"/>
               </a:moveTo>
               <a:lnTo>
-                <a:pt x="107702" y="1949653"/>
+                <a:pt x="89332" y="1829881"/>
               </a:lnTo>
               <a:lnTo>
-                <a:pt x="107702" y="0"/>
+                <a:pt x="89332" y="0"/>
               </a:lnTo>
               <a:lnTo>
-                <a:pt x="215405" y="0"/>
+                <a:pt x="178664" y="0"/>
               </a:lnTo>
             </a:path>
           </a:pathLst>
@@ -6460,8 +7254,8 @@
         </a:p>
       </dsp:txBody>
       <dsp:txXfrm>
-        <a:off x="1641108" y="1500674"/>
-        <a:ext cx="98075" cy="98075"/>
+        <a:off x="2566472" y="1350857"/>
+        <a:ext cx="91929" cy="91929"/>
       </dsp:txXfrm>
     </dsp:sp>
     <dsp:sp modelId="{67239EAB-1659-405F-9D37-5E8449D29F93}">
@@ -6471,8 +7265,8 @@
       </dsp:nvSpPr>
       <dsp:spPr>
         <a:xfrm rot="16200000">
-          <a:off x="554150" y="2360357"/>
-          <a:ext cx="1728224" cy="328362"/>
+          <a:off x="1670205" y="2175584"/>
+          <a:ext cx="1433444" cy="272354"/>
         </a:xfrm>
         <a:prstGeom prst="rect">
           <a:avLst/>
@@ -6552,8 +7346,8 @@
         </a:p>
       </dsp:txBody>
       <dsp:txXfrm>
-        <a:off x="554150" y="2360357"/>
-        <a:ext cx="1728224" cy="328362"/>
+        <a:off x="1670205" y="2175584"/>
+        <a:ext cx="1433444" cy="272354"/>
       </dsp:txXfrm>
     </dsp:sp>
     <dsp:sp modelId="{14B6996B-15A7-4C3C-95B1-F4570CC1C169}">
@@ -6563,8 +7357,8 @@
       </dsp:nvSpPr>
       <dsp:spPr>
         <a:xfrm>
-          <a:off x="1797849" y="410704"/>
-          <a:ext cx="1077029" cy="328362"/>
+          <a:off x="2701769" y="345703"/>
+          <a:ext cx="893322" cy="272354"/>
         </a:xfrm>
         <a:prstGeom prst="rect">
           <a:avLst/>
@@ -6644,8 +7438,8 @@
         </a:p>
       </dsp:txBody>
       <dsp:txXfrm>
-        <a:off x="1797849" y="410704"/>
-        <a:ext cx="1077029" cy="328362"/>
+        <a:off x="2701769" y="345703"/>
+        <a:ext cx="893322" cy="272354"/>
       </dsp:txXfrm>
     </dsp:sp>
     <dsp:sp modelId="{843E92B2-B1C5-4679-9F13-92AE67F50E4B}">
@@ -6655,8 +7449,8 @@
       </dsp:nvSpPr>
       <dsp:spPr>
         <a:xfrm>
-          <a:off x="3090284" y="251"/>
-          <a:ext cx="1077029" cy="328362"/>
+          <a:off x="3773756" y="5260"/>
+          <a:ext cx="893322" cy="272354"/>
         </a:xfrm>
         <a:prstGeom prst="rect">
           <a:avLst/>
@@ -6736,8 +7530,8 @@
         </a:p>
       </dsp:txBody>
       <dsp:txXfrm>
-        <a:off x="3090284" y="251"/>
-        <a:ext cx="1077029" cy="328362"/>
+        <a:off x="3773756" y="5260"/>
+        <a:ext cx="893322" cy="272354"/>
       </dsp:txXfrm>
     </dsp:sp>
     <dsp:sp modelId="{F3F472E3-5157-4A9E-B0CD-16FF248F6E0E}">
@@ -6747,8 +7541,8 @@
       </dsp:nvSpPr>
       <dsp:spPr>
         <a:xfrm>
-          <a:off x="3090284" y="410704"/>
-          <a:ext cx="1077029" cy="328362"/>
+          <a:off x="3773756" y="345703"/>
+          <a:ext cx="893322" cy="272354"/>
         </a:xfrm>
         <a:prstGeom prst="rect">
           <a:avLst/>
@@ -6828,8 +7622,8 @@
         </a:p>
       </dsp:txBody>
       <dsp:txXfrm>
-        <a:off x="3090284" y="410704"/>
-        <a:ext cx="1077029" cy="328362"/>
+        <a:off x="3773756" y="345703"/>
+        <a:ext cx="893322" cy="272354"/>
       </dsp:txXfrm>
     </dsp:sp>
     <dsp:sp modelId="{C8A74607-627B-4791-8B31-4BA4E02B4D7C}">
@@ -6839,8 +7633,8 @@
       </dsp:nvSpPr>
       <dsp:spPr>
         <a:xfrm>
-          <a:off x="3090284" y="821157"/>
-          <a:ext cx="1077029" cy="328362"/>
+          <a:off x="3773756" y="686146"/>
+          <a:ext cx="893322" cy="272354"/>
         </a:xfrm>
         <a:prstGeom prst="rect">
           <a:avLst/>
@@ -6920,8 +7714,8 @@
         </a:p>
       </dsp:txBody>
       <dsp:txXfrm>
-        <a:off x="3090284" y="821157"/>
-        <a:ext cx="1077029" cy="328362"/>
+        <a:off x="3773756" y="686146"/>
+        <a:ext cx="893322" cy="272354"/>
       </dsp:txXfrm>
     </dsp:sp>
     <dsp:sp modelId="{2FE9D669-7948-4A54-92D5-EFA1A86CD105}">
@@ -6931,8 +7725,8 @@
       </dsp:nvSpPr>
       <dsp:spPr>
         <a:xfrm>
-          <a:off x="1797849" y="2052517"/>
-          <a:ext cx="1077029" cy="328362"/>
+          <a:off x="2701769" y="1707475"/>
+          <a:ext cx="893322" cy="272354"/>
         </a:xfrm>
         <a:prstGeom prst="rect">
           <a:avLst/>
@@ -7012,8 +7806,8 @@
         </a:p>
       </dsp:txBody>
       <dsp:txXfrm>
-        <a:off x="1797849" y="2052517"/>
-        <a:ext cx="1077029" cy="328362"/>
+        <a:off x="2701769" y="1707475"/>
+        <a:ext cx="893322" cy="272354"/>
       </dsp:txXfrm>
     </dsp:sp>
     <dsp:sp modelId="{7DD80175-2396-4084-9B4F-06D9AFA69696}">
@@ -7023,8 +7817,8 @@
       </dsp:nvSpPr>
       <dsp:spPr>
         <a:xfrm>
-          <a:off x="3090284" y="1847291"/>
-          <a:ext cx="1077029" cy="328362"/>
+          <a:off x="3773756" y="1537254"/>
+          <a:ext cx="893322" cy="272354"/>
         </a:xfrm>
         <a:prstGeom prst="rect">
           <a:avLst/>
@@ -7104,8 +7898,8 @@
         </a:p>
       </dsp:txBody>
       <dsp:txXfrm>
-        <a:off x="3090284" y="1847291"/>
-        <a:ext cx="1077029" cy="328362"/>
+        <a:off x="3773756" y="1537254"/>
+        <a:ext cx="893322" cy="272354"/>
       </dsp:txXfrm>
     </dsp:sp>
     <dsp:sp modelId="{D13E8E78-0981-47B7-B509-860D838BA781}">
@@ -7115,8 +7909,8 @@
       </dsp:nvSpPr>
       <dsp:spPr>
         <a:xfrm>
-          <a:off x="4382720" y="1642064"/>
-          <a:ext cx="1077029" cy="328362"/>
+          <a:off x="4845743" y="1367032"/>
+          <a:ext cx="893322" cy="272354"/>
         </a:xfrm>
         <a:prstGeom prst="rect">
           <a:avLst/>
@@ -7196,8 +7990,8 @@
         </a:p>
       </dsp:txBody>
       <dsp:txXfrm>
-        <a:off x="4382720" y="1642064"/>
-        <a:ext cx="1077029" cy="328362"/>
+        <a:off x="4845743" y="1367032"/>
+        <a:ext cx="893322" cy="272354"/>
       </dsp:txXfrm>
     </dsp:sp>
     <dsp:sp modelId="{2293E997-8A42-4DE4-AFF5-CE2F2C46F300}">
@@ -7207,8 +8001,8 @@
       </dsp:nvSpPr>
       <dsp:spPr>
         <a:xfrm>
-          <a:off x="5675155" y="1231611"/>
-          <a:ext cx="1077029" cy="328362"/>
+          <a:off x="5917730" y="1026589"/>
+          <a:ext cx="893322" cy="272354"/>
         </a:xfrm>
         <a:prstGeom prst="rect">
           <a:avLst/>
@@ -7288,8 +8082,8 @@
         </a:p>
       </dsp:txBody>
       <dsp:txXfrm>
-        <a:off x="5675155" y="1231611"/>
-        <a:ext cx="1077029" cy="328362"/>
+        <a:off x="5917730" y="1026589"/>
+        <a:ext cx="893322" cy="272354"/>
       </dsp:txXfrm>
     </dsp:sp>
     <dsp:sp modelId="{44701C57-D211-4D71-857F-299A0D735E28}">
@@ -7299,8 +8093,8 @@
       </dsp:nvSpPr>
       <dsp:spPr>
         <a:xfrm>
-          <a:off x="5675155" y="1642064"/>
-          <a:ext cx="1077029" cy="328362"/>
+          <a:off x="5917730" y="1367032"/>
+          <a:ext cx="893322" cy="272354"/>
         </a:xfrm>
         <a:prstGeom prst="rect">
           <a:avLst/>
@@ -7380,8 +8174,8 @@
         </a:p>
       </dsp:txBody>
       <dsp:txXfrm>
-        <a:off x="5675155" y="1642064"/>
-        <a:ext cx="1077029" cy="328362"/>
+        <a:off x="5917730" y="1367032"/>
+        <a:ext cx="893322" cy="272354"/>
       </dsp:txXfrm>
     </dsp:sp>
     <dsp:sp modelId="{1297A119-EB00-45FB-9E4C-7081D9FC3578}">
@@ -7391,8 +8185,8 @@
       </dsp:nvSpPr>
       <dsp:spPr>
         <a:xfrm>
-          <a:off x="5675155" y="2052517"/>
-          <a:ext cx="1077029" cy="328362"/>
+          <a:off x="5917730" y="1707475"/>
+          <a:ext cx="893322" cy="272354"/>
         </a:xfrm>
         <a:prstGeom prst="rect">
           <a:avLst/>
@@ -7472,8 +8266,8 @@
         </a:p>
       </dsp:txBody>
       <dsp:txXfrm>
-        <a:off x="5675155" y="2052517"/>
-        <a:ext cx="1077029" cy="328362"/>
+        <a:off x="5917730" y="1707475"/>
+        <a:ext cx="893322" cy="272354"/>
       </dsp:txXfrm>
     </dsp:sp>
     <dsp:sp modelId="{EFF0FDCC-9734-4C94-840C-8D241B8150A8}">
@@ -7483,8 +8277,8 @@
       </dsp:nvSpPr>
       <dsp:spPr>
         <a:xfrm>
-          <a:off x="4382720" y="2052517"/>
-          <a:ext cx="1077029" cy="328362"/>
+          <a:off x="4845743" y="1707475"/>
+          <a:ext cx="893322" cy="272354"/>
         </a:xfrm>
         <a:prstGeom prst="rect">
           <a:avLst/>
@@ -7564,8 +8358,8 @@
         </a:p>
       </dsp:txBody>
       <dsp:txXfrm>
-        <a:off x="4382720" y="2052517"/>
-        <a:ext cx="1077029" cy="328362"/>
+        <a:off x="4845743" y="1707475"/>
+        <a:ext cx="893322" cy="272354"/>
       </dsp:txXfrm>
     </dsp:sp>
     <dsp:sp modelId="{8539FE12-B94A-4DB5-9363-D625963A994D}">
@@ -7575,8 +8369,8 @@
       </dsp:nvSpPr>
       <dsp:spPr>
         <a:xfrm>
-          <a:off x="3090284" y="2257744"/>
-          <a:ext cx="1077029" cy="328362"/>
+          <a:off x="3773756" y="1877697"/>
+          <a:ext cx="893322" cy="272354"/>
         </a:xfrm>
         <a:prstGeom prst="rect">
           <a:avLst/>
@@ -7656,8 +8450,8 @@
         </a:p>
       </dsp:txBody>
       <dsp:txXfrm>
-        <a:off x="3090284" y="2257744"/>
-        <a:ext cx="1077029" cy="328362"/>
+        <a:off x="3773756" y="1877697"/>
+        <a:ext cx="893322" cy="272354"/>
       </dsp:txXfrm>
     </dsp:sp>
     <dsp:sp modelId="{65D4BBB4-1790-4173-81B6-560190FD91AB}">
@@ -7667,8 +8461,8 @@
       </dsp:nvSpPr>
       <dsp:spPr>
         <a:xfrm>
-          <a:off x="1797849" y="4310010"/>
-          <a:ext cx="1077029" cy="328362"/>
+          <a:off x="2701769" y="4005466"/>
+          <a:ext cx="893322" cy="272354"/>
         </a:xfrm>
         <a:prstGeom prst="rect">
           <a:avLst/>
@@ -7748,8 +8542,8 @@
         </a:p>
       </dsp:txBody>
       <dsp:txXfrm>
-        <a:off x="1797849" y="4310010"/>
-        <a:ext cx="1077029" cy="328362"/>
+        <a:off x="2701769" y="4005466"/>
+        <a:ext cx="893322" cy="272354"/>
       </dsp:txXfrm>
     </dsp:sp>
     <dsp:sp modelId="{A20128AE-AD89-4CEA-9148-E73F5681A2EE}">
@@ -7759,8 +8553,8 @@
       </dsp:nvSpPr>
       <dsp:spPr>
         <a:xfrm>
-          <a:off x="3090284" y="4310010"/>
-          <a:ext cx="1077029" cy="328362"/>
+          <a:off x="3773756" y="4005466"/>
+          <a:ext cx="893322" cy="272354"/>
         </a:xfrm>
         <a:prstGeom prst="rect">
           <a:avLst/>
@@ -7844,8 +8638,8 @@
         </a:p>
       </dsp:txBody>
       <dsp:txXfrm>
-        <a:off x="3090284" y="4310010"/>
-        <a:ext cx="1077029" cy="328362"/>
+        <a:off x="3773756" y="4005466"/>
+        <a:ext cx="893322" cy="272354"/>
       </dsp:txXfrm>
     </dsp:sp>
     <dsp:sp modelId="{71B02E8A-448E-4584-80E9-059B52DDB850}">
@@ -7855,8 +8649,8 @@
       </dsp:nvSpPr>
       <dsp:spPr>
         <a:xfrm>
-          <a:off x="4382720" y="3899557"/>
-          <a:ext cx="1077029" cy="328362"/>
+          <a:off x="4845743" y="3665023"/>
+          <a:ext cx="893322" cy="272354"/>
         </a:xfrm>
         <a:prstGeom prst="rect">
           <a:avLst/>
@@ -7936,8 +8730,8 @@
         </a:p>
       </dsp:txBody>
       <dsp:txXfrm>
-        <a:off x="4382720" y="3899557"/>
-        <a:ext cx="1077029" cy="328362"/>
+        <a:off x="4845743" y="3665023"/>
+        <a:ext cx="893322" cy="272354"/>
       </dsp:txXfrm>
     </dsp:sp>
     <dsp:sp modelId="{1A4238F2-78DE-41D2-AD7D-244E70141D53}">
@@ -7947,8 +8741,8 @@
       </dsp:nvSpPr>
       <dsp:spPr>
         <a:xfrm>
-          <a:off x="5675155" y="3283877"/>
-          <a:ext cx="1077029" cy="328362"/>
+          <a:off x="5917730" y="2728804"/>
+          <a:ext cx="893322" cy="272354"/>
         </a:xfrm>
         <a:prstGeom prst="rect">
           <a:avLst/>
@@ -8028,8 +8822,8 @@
         </a:p>
       </dsp:txBody>
       <dsp:txXfrm>
-        <a:off x="5675155" y="3283877"/>
-        <a:ext cx="1077029" cy="328362"/>
+        <a:off x="5917730" y="2728804"/>
+        <a:ext cx="893322" cy="272354"/>
       </dsp:txXfrm>
     </dsp:sp>
     <dsp:sp modelId="{7A687C9C-1CE1-4FCD-8F95-CDF2CE96AF7A}">
@@ -8039,8 +8833,8 @@
       </dsp:nvSpPr>
       <dsp:spPr>
         <a:xfrm>
-          <a:off x="6967591" y="3078650"/>
-          <a:ext cx="1077029" cy="328362"/>
+          <a:off x="6989717" y="2558583"/>
+          <a:ext cx="915584" cy="272354"/>
         </a:xfrm>
         <a:prstGeom prst="rect">
           <a:avLst/>
@@ -8120,8 +8914,8 @@
         </a:p>
       </dsp:txBody>
       <dsp:txXfrm>
-        <a:off x="6967591" y="3078650"/>
-        <a:ext cx="1077029" cy="328362"/>
+        <a:off x="6989717" y="2558583"/>
+        <a:ext cx="915584" cy="272354"/>
       </dsp:txXfrm>
     </dsp:sp>
     <dsp:sp modelId="{2F691A7C-9BCD-4E4F-A41F-920122DDC012}">
@@ -8131,8 +8925,8 @@
       </dsp:nvSpPr>
       <dsp:spPr>
         <a:xfrm>
-          <a:off x="8260026" y="2668197"/>
-          <a:ext cx="1077029" cy="328362"/>
+          <a:off x="8302266" y="2202237"/>
+          <a:ext cx="893322" cy="272354"/>
         </a:xfrm>
         <a:prstGeom prst="rect">
           <a:avLst/>
@@ -8212,8 +9006,8 @@
         </a:p>
       </dsp:txBody>
       <dsp:txXfrm>
-        <a:off x="8260026" y="2668197"/>
-        <a:ext cx="1077029" cy="328362"/>
+        <a:off x="8302266" y="2202237"/>
+        <a:ext cx="893322" cy="272354"/>
       </dsp:txXfrm>
     </dsp:sp>
     <dsp:sp modelId="{BFA8CB9D-9F1D-4CD9-9D73-5A458DABA331}">
@@ -8223,8 +9017,8 @@
       </dsp:nvSpPr>
       <dsp:spPr>
         <a:xfrm>
-          <a:off x="8260026" y="3078650"/>
-          <a:ext cx="1077029" cy="328362"/>
+          <a:off x="8302266" y="2542680"/>
+          <a:ext cx="893322" cy="272354"/>
         </a:xfrm>
         <a:prstGeom prst="rect">
           <a:avLst/>
@@ -8304,8 +9098,8 @@
         </a:p>
       </dsp:txBody>
       <dsp:txXfrm>
-        <a:off x="8260026" y="3078650"/>
-        <a:ext cx="1077029" cy="328362"/>
+        <a:off x="8302266" y="2542680"/>
+        <a:ext cx="893322" cy="272354"/>
       </dsp:txXfrm>
     </dsp:sp>
     <dsp:sp modelId="{C75D1124-C505-4361-BD55-C3934A33A542}">
@@ -8315,8 +9109,8 @@
       </dsp:nvSpPr>
       <dsp:spPr>
         <a:xfrm>
-          <a:off x="8260026" y="3489104"/>
-          <a:ext cx="1077029" cy="328362"/>
+          <a:off x="8302266" y="2883123"/>
+          <a:ext cx="893322" cy="272354"/>
         </a:xfrm>
         <a:prstGeom prst="rect">
           <a:avLst/>
@@ -8396,8 +9190,8 @@
         </a:p>
       </dsp:txBody>
       <dsp:txXfrm>
-        <a:off x="8260026" y="3489104"/>
-        <a:ext cx="1077029" cy="328362"/>
+        <a:off x="8302266" y="2883123"/>
+        <a:ext cx="893322" cy="272354"/>
       </dsp:txXfrm>
     </dsp:sp>
     <dsp:sp modelId="{A8FC37A2-9B31-4489-B0A8-9E802EBAF3A0}">
@@ -8407,8 +9201,8 @@
       </dsp:nvSpPr>
       <dsp:spPr>
         <a:xfrm>
-          <a:off x="6967591" y="3489104"/>
-          <a:ext cx="1077029" cy="328362"/>
+          <a:off x="6989717" y="2899026"/>
+          <a:ext cx="893322" cy="272354"/>
         </a:xfrm>
         <a:prstGeom prst="rect">
           <a:avLst/>
@@ -8488,8 +9282,8 @@
         </a:p>
       </dsp:txBody>
       <dsp:txXfrm>
-        <a:off x="6967591" y="3489104"/>
-        <a:ext cx="1077029" cy="328362"/>
+        <a:off x="6989717" y="2899026"/>
+        <a:ext cx="893322" cy="272354"/>
       </dsp:txXfrm>
     </dsp:sp>
     <dsp:sp modelId="{9DE0F9C2-8935-4BB2-9E9C-937F7C914306}">
@@ -8499,8 +9293,8 @@
       </dsp:nvSpPr>
       <dsp:spPr>
         <a:xfrm>
-          <a:off x="5675155" y="4515237"/>
-          <a:ext cx="1077029" cy="328362"/>
+          <a:off x="5917730" y="3750133"/>
+          <a:ext cx="893322" cy="272354"/>
         </a:xfrm>
         <a:prstGeom prst="rect">
           <a:avLst/>
@@ -8580,8 +9374,8 @@
         </a:p>
       </dsp:txBody>
       <dsp:txXfrm>
-        <a:off x="5675155" y="4515237"/>
-        <a:ext cx="1077029" cy="328362"/>
+        <a:off x="5917730" y="3750133"/>
+        <a:ext cx="893322" cy="272354"/>
       </dsp:txXfrm>
     </dsp:sp>
     <dsp:sp modelId="{35ACB2AC-382A-4C97-A906-4B1EC627FF3B}">
@@ -8591,8 +9385,8 @@
       </dsp:nvSpPr>
       <dsp:spPr>
         <a:xfrm>
-          <a:off x="6967591" y="4310010"/>
-          <a:ext cx="1077029" cy="328362"/>
+          <a:off x="6989717" y="3579912"/>
+          <a:ext cx="971372" cy="272354"/>
         </a:xfrm>
         <a:prstGeom prst="rect">
           <a:avLst/>
@@ -8672,8 +9466,8 @@
         </a:p>
       </dsp:txBody>
       <dsp:txXfrm>
-        <a:off x="6967591" y="4310010"/>
-        <a:ext cx="1077029" cy="328362"/>
+        <a:off x="6989717" y="3579912"/>
+        <a:ext cx="971372" cy="272354"/>
       </dsp:txXfrm>
     </dsp:sp>
     <dsp:sp modelId="{F477F308-696E-4EBB-A389-B7BC50374169}">
@@ -8683,8 +9477,8 @@
       </dsp:nvSpPr>
       <dsp:spPr>
         <a:xfrm>
-          <a:off x="8260026" y="3899557"/>
-          <a:ext cx="1077029" cy="328362"/>
+          <a:off x="8318293" y="3239469"/>
+          <a:ext cx="893322" cy="272354"/>
         </a:xfrm>
         <a:prstGeom prst="rect">
           <a:avLst/>
@@ -8764,8 +9558,8 @@
         </a:p>
       </dsp:txBody>
       <dsp:txXfrm>
-        <a:off x="8260026" y="3899557"/>
-        <a:ext cx="1077029" cy="328362"/>
+        <a:off x="8318293" y="3239469"/>
+        <a:ext cx="893322" cy="272354"/>
       </dsp:txXfrm>
     </dsp:sp>
     <dsp:sp modelId="{057661AD-CB3F-4EFF-A165-3CB41187F5B8}">
@@ -8775,8 +9569,8 @@
       </dsp:nvSpPr>
       <dsp:spPr>
         <a:xfrm>
-          <a:off x="8260026" y="4310010"/>
-          <a:ext cx="1077029" cy="328362"/>
+          <a:off x="8318293" y="3579912"/>
+          <a:ext cx="893322" cy="272354"/>
         </a:xfrm>
         <a:prstGeom prst="rect">
           <a:avLst/>
@@ -8856,8 +9650,8 @@
         </a:p>
       </dsp:txBody>
       <dsp:txXfrm>
-        <a:off x="8260026" y="4310010"/>
-        <a:ext cx="1077029" cy="328362"/>
+        <a:off x="8318293" y="3579912"/>
+        <a:ext cx="893322" cy="272354"/>
       </dsp:txXfrm>
     </dsp:sp>
     <dsp:sp modelId="{5F45AA15-FBB3-4B44-8E68-EED9491C0D70}">
@@ -8867,8 +9661,8 @@
       </dsp:nvSpPr>
       <dsp:spPr>
         <a:xfrm>
-          <a:off x="8260026" y="4720464"/>
-          <a:ext cx="1077029" cy="328362"/>
+          <a:off x="8318293" y="3920355"/>
+          <a:ext cx="893322" cy="272354"/>
         </a:xfrm>
         <a:prstGeom prst="rect">
           <a:avLst/>
@@ -8948,8 +9742,8 @@
         </a:p>
       </dsp:txBody>
       <dsp:txXfrm>
-        <a:off x="8260026" y="4720464"/>
-        <a:ext cx="1077029" cy="328362"/>
+        <a:off x="8318293" y="3920355"/>
+        <a:ext cx="893322" cy="272354"/>
       </dsp:txXfrm>
     </dsp:sp>
     <dsp:sp modelId="{3EE425C3-9686-4BDF-A704-1B7FE956B70F}">
@@ -8959,8 +9753,8 @@
       </dsp:nvSpPr>
       <dsp:spPr>
         <a:xfrm>
-          <a:off x="6967591" y="4720464"/>
-          <a:ext cx="1077029" cy="328362"/>
+          <a:off x="6989717" y="3920355"/>
+          <a:ext cx="915208" cy="272354"/>
         </a:xfrm>
         <a:prstGeom prst="rect">
           <a:avLst/>
@@ -9040,8 +9834,472 @@
         </a:p>
       </dsp:txBody>
       <dsp:txXfrm>
-        <a:off x="6967591" y="4720464"/>
-        <a:ext cx="1077029" cy="328362"/>
+        <a:off x="6989717" y="3920355"/>
+        <a:ext cx="915208" cy="272354"/>
+      </dsp:txXfrm>
+    </dsp:sp>
+    <dsp:sp modelId="{3CE5715A-B463-4312-A59B-740DC19BA68B}">
+      <dsp:nvSpPr>
+        <dsp:cNvPr id="0" name=""/>
+        <dsp:cNvSpPr/>
+      </dsp:nvSpPr>
+      <dsp:spPr>
+        <a:xfrm>
+          <a:off x="5917730" y="4601241"/>
+          <a:ext cx="893322" cy="272354"/>
+        </a:xfrm>
+        <a:prstGeom prst="rect">
+          <a:avLst/>
+        </a:prstGeom>
+        <a:gradFill rotWithShape="0">
+          <a:gsLst>
+            <a:gs pos="0">
+              <a:schemeClr val="accent1">
+                <a:hueOff val="0"/>
+                <a:satOff val="0"/>
+                <a:lumOff val="0"/>
+                <a:alphaOff val="0"/>
+                <a:tint val="96000"/>
+                <a:lumMod val="104000"/>
+              </a:schemeClr>
+            </a:gs>
+            <a:gs pos="100000">
+              <a:schemeClr val="accent1">
+                <a:hueOff val="0"/>
+                <a:satOff val="0"/>
+                <a:lumOff val="0"/>
+                <a:alphaOff val="0"/>
+                <a:shade val="98000"/>
+                <a:lumMod val="94000"/>
+              </a:schemeClr>
+            </a:gs>
+          </a:gsLst>
+          <a:lin ang="5400000" scaled="0"/>
+        </a:gradFill>
+        <a:ln>
+          <a:noFill/>
+        </a:ln>
+        <a:effectLst>
+          <a:outerShdw blurRad="38100" dist="25400" dir="5400000" rotWithShape="0">
+            <a:srgbClr val="000000">
+              <a:alpha val="25000"/>
+            </a:srgbClr>
+          </a:outerShdw>
+        </a:effectLst>
+      </dsp:spPr>
+      <dsp:style>
+        <a:lnRef idx="0">
+          <a:scrgbClr r="0" g="0" b="0"/>
+        </a:lnRef>
+        <a:fillRef idx="3">
+          <a:scrgbClr r="0" g="0" b="0"/>
+        </a:fillRef>
+        <a:effectRef idx="2">
+          <a:scrgbClr r="0" g="0" b="0"/>
+        </a:effectRef>
+        <a:fontRef idx="minor">
+          <a:schemeClr val="lt1"/>
+        </a:fontRef>
+      </dsp:style>
+      <dsp:txBody>
+        <a:bodyPr spcFirstLastPara="0" vert="horz" wrap="square" lIns="6350" tIns="6350" rIns="6350" bIns="6350" numCol="1" spcCol="1270" anchor="ctr" anchorCtr="0">
+          <a:noAutofit/>
+        </a:bodyPr>
+        <a:lstStyle/>
+        <a:p>
+          <a:pPr lvl="0" algn="ctr" defTabSz="444500">
+            <a:lnSpc>
+              <a:spcPct val="90000"/>
+            </a:lnSpc>
+            <a:spcBef>
+              <a:spcPct val="0"/>
+            </a:spcBef>
+            <a:spcAft>
+              <a:spcPct val="35000"/>
+            </a:spcAft>
+          </a:pPr>
+          <a:r>
+            <a:rPr lang="fr-FR" sz="1000" kern="1200" dirty="0" err="1" smtClean="0"/>
+            <a:t>internal</a:t>
+          </a:r>
+          <a:r>
+            <a:rPr lang="fr-FR" sz="1000" kern="1200" dirty="0" smtClean="0"/>
+            <a:t> &lt;dir&gt;</a:t>
+          </a:r>
+          <a:endParaRPr lang="fr-FR" sz="1000" kern="1200" dirty="0"/>
+        </a:p>
+      </dsp:txBody>
+      <dsp:txXfrm>
+        <a:off x="5917730" y="4601241"/>
+        <a:ext cx="893322" cy="272354"/>
+      </dsp:txXfrm>
+    </dsp:sp>
+    <dsp:sp modelId="{BADDFD11-6D6A-4F6A-8B2E-2F492D67B8FF}">
+      <dsp:nvSpPr>
+        <dsp:cNvPr id="0" name=""/>
+        <dsp:cNvSpPr/>
+      </dsp:nvSpPr>
+      <dsp:spPr>
+        <a:xfrm>
+          <a:off x="6989717" y="4431019"/>
+          <a:ext cx="970219" cy="272354"/>
+        </a:xfrm>
+        <a:prstGeom prst="rect">
+          <a:avLst/>
+        </a:prstGeom>
+        <a:gradFill rotWithShape="0">
+          <a:gsLst>
+            <a:gs pos="0">
+              <a:schemeClr val="accent1">
+                <a:hueOff val="0"/>
+                <a:satOff val="0"/>
+                <a:lumOff val="0"/>
+                <a:alphaOff val="0"/>
+                <a:tint val="96000"/>
+                <a:lumMod val="104000"/>
+              </a:schemeClr>
+            </a:gs>
+            <a:gs pos="100000">
+              <a:schemeClr val="accent1">
+                <a:hueOff val="0"/>
+                <a:satOff val="0"/>
+                <a:lumOff val="0"/>
+                <a:alphaOff val="0"/>
+                <a:shade val="98000"/>
+                <a:lumMod val="94000"/>
+              </a:schemeClr>
+            </a:gs>
+          </a:gsLst>
+          <a:lin ang="5400000" scaled="0"/>
+        </a:gradFill>
+        <a:ln>
+          <a:noFill/>
+        </a:ln>
+        <a:effectLst>
+          <a:outerShdw blurRad="38100" dist="25400" dir="5400000" rotWithShape="0">
+            <a:srgbClr val="000000">
+              <a:alpha val="25000"/>
+            </a:srgbClr>
+          </a:outerShdw>
+        </a:effectLst>
+      </dsp:spPr>
+      <dsp:style>
+        <a:lnRef idx="0">
+          <a:scrgbClr r="0" g="0" b="0"/>
+        </a:lnRef>
+        <a:fillRef idx="3">
+          <a:scrgbClr r="0" g="0" b="0"/>
+        </a:fillRef>
+        <a:effectRef idx="2">
+          <a:scrgbClr r="0" g="0" b="0"/>
+        </a:effectRef>
+        <a:fontRef idx="minor">
+          <a:schemeClr val="lt1"/>
+        </a:fontRef>
+      </dsp:style>
+      <dsp:txBody>
+        <a:bodyPr spcFirstLastPara="0" vert="horz" wrap="square" lIns="6350" tIns="6350" rIns="6350" bIns="6350" numCol="1" spcCol="1270" anchor="ctr" anchorCtr="0">
+          <a:noAutofit/>
+        </a:bodyPr>
+        <a:lstStyle/>
+        <a:p>
+          <a:pPr lvl="0" algn="ctr" defTabSz="444500">
+            <a:lnSpc>
+              <a:spcPct val="90000"/>
+            </a:lnSpc>
+            <a:spcBef>
+              <a:spcPct val="0"/>
+            </a:spcBef>
+            <a:spcAft>
+              <a:spcPct val="35000"/>
+            </a:spcAft>
+          </a:pPr>
+          <a:r>
+            <a:rPr lang="fr-FR" sz="1000" kern="1200" dirty="0" smtClean="0"/>
+            <a:t>packname&lt;dir&gt;</a:t>
+          </a:r>
+          <a:endParaRPr lang="fr-FR" sz="1000" kern="1200" dirty="0"/>
+        </a:p>
+      </dsp:txBody>
+      <dsp:txXfrm>
+        <a:off x="6989717" y="4431019"/>
+        <a:ext cx="970219" cy="272354"/>
+      </dsp:txXfrm>
+    </dsp:sp>
+    <dsp:sp modelId="{A53E1177-1715-4EBC-8FFF-D2B6BE4DA7DF}">
+      <dsp:nvSpPr>
+        <dsp:cNvPr id="0" name=""/>
+        <dsp:cNvSpPr/>
+      </dsp:nvSpPr>
+      <dsp:spPr>
+        <a:xfrm>
+          <a:off x="8305581" y="4260798"/>
+          <a:ext cx="893322" cy="272354"/>
+        </a:xfrm>
+        <a:prstGeom prst="rect">
+          <a:avLst/>
+        </a:prstGeom>
+        <a:gradFill rotWithShape="0">
+          <a:gsLst>
+            <a:gs pos="0">
+              <a:schemeClr val="accent1">
+                <a:hueOff val="0"/>
+                <a:satOff val="0"/>
+                <a:lumOff val="0"/>
+                <a:alphaOff val="0"/>
+                <a:tint val="96000"/>
+                <a:lumMod val="104000"/>
+              </a:schemeClr>
+            </a:gs>
+            <a:gs pos="100000">
+              <a:schemeClr val="accent1">
+                <a:hueOff val="0"/>
+                <a:satOff val="0"/>
+                <a:lumOff val="0"/>
+                <a:alphaOff val="0"/>
+                <a:shade val="98000"/>
+                <a:lumMod val="94000"/>
+              </a:schemeClr>
+            </a:gs>
+          </a:gsLst>
+          <a:lin ang="5400000" scaled="0"/>
+        </a:gradFill>
+        <a:ln>
+          <a:noFill/>
+        </a:ln>
+        <a:effectLst>
+          <a:outerShdw blurRad="38100" dist="25400" dir="5400000" rotWithShape="0">
+            <a:srgbClr val="000000">
+              <a:alpha val="25000"/>
+            </a:srgbClr>
+          </a:outerShdw>
+        </a:effectLst>
+      </dsp:spPr>
+      <dsp:style>
+        <a:lnRef idx="0">
+          <a:scrgbClr r="0" g="0" b="0"/>
+        </a:lnRef>
+        <a:fillRef idx="3">
+          <a:scrgbClr r="0" g="0" b="0"/>
+        </a:fillRef>
+        <a:effectRef idx="2">
+          <a:scrgbClr r="0" g="0" b="0"/>
+        </a:effectRef>
+        <a:fontRef idx="minor">
+          <a:schemeClr val="lt1"/>
+        </a:fontRef>
+      </dsp:style>
+      <dsp:txBody>
+        <a:bodyPr spcFirstLastPara="0" vert="horz" wrap="square" lIns="6350" tIns="6350" rIns="6350" bIns="6350" numCol="1" spcCol="1270" anchor="ctr" anchorCtr="0">
+          <a:noAutofit/>
+        </a:bodyPr>
+        <a:lstStyle/>
+        <a:p>
+          <a:pPr lvl="0" algn="ctr" defTabSz="444500">
+            <a:lnSpc>
+              <a:spcPct val="90000"/>
+            </a:lnSpc>
+            <a:spcBef>
+              <a:spcPct val="0"/>
+            </a:spcBef>
+            <a:spcAft>
+              <a:spcPct val="35000"/>
+            </a:spcAft>
+          </a:pPr>
+          <a:r>
+            <a:rPr lang="fr-FR" sz="1000" kern="1200" dirty="0" smtClean="0"/>
+            <a:t>.go</a:t>
+          </a:r>
+          <a:endParaRPr lang="fr-FR" sz="1000" kern="1200" dirty="0"/>
+        </a:p>
+      </dsp:txBody>
+      <dsp:txXfrm>
+        <a:off x="8305581" y="4260798"/>
+        <a:ext cx="893322" cy="272354"/>
+      </dsp:txXfrm>
+    </dsp:sp>
+    <dsp:sp modelId="{9C97ECFE-35CB-4952-AA99-AABD5BBDF8F7}">
+      <dsp:nvSpPr>
+        <dsp:cNvPr id="0" name=""/>
+        <dsp:cNvSpPr/>
+      </dsp:nvSpPr>
+      <dsp:spPr>
+        <a:xfrm>
+          <a:off x="8305581" y="4601241"/>
+          <a:ext cx="893322" cy="272354"/>
+        </a:xfrm>
+        <a:prstGeom prst="rect">
+          <a:avLst/>
+        </a:prstGeom>
+        <a:gradFill rotWithShape="0">
+          <a:gsLst>
+            <a:gs pos="0">
+              <a:schemeClr val="accent1">
+                <a:hueOff val="0"/>
+                <a:satOff val="0"/>
+                <a:lumOff val="0"/>
+                <a:alphaOff val="0"/>
+                <a:tint val="96000"/>
+                <a:lumMod val="104000"/>
+              </a:schemeClr>
+            </a:gs>
+            <a:gs pos="100000">
+              <a:schemeClr val="accent1">
+                <a:hueOff val="0"/>
+                <a:satOff val="0"/>
+                <a:lumOff val="0"/>
+                <a:alphaOff val="0"/>
+                <a:shade val="98000"/>
+                <a:lumMod val="94000"/>
+              </a:schemeClr>
+            </a:gs>
+          </a:gsLst>
+          <a:lin ang="5400000" scaled="0"/>
+        </a:gradFill>
+        <a:ln>
+          <a:noFill/>
+        </a:ln>
+        <a:effectLst>
+          <a:outerShdw blurRad="38100" dist="25400" dir="5400000" rotWithShape="0">
+            <a:srgbClr val="000000">
+              <a:alpha val="25000"/>
+            </a:srgbClr>
+          </a:outerShdw>
+        </a:effectLst>
+      </dsp:spPr>
+      <dsp:style>
+        <a:lnRef idx="0">
+          <a:scrgbClr r="0" g="0" b="0"/>
+        </a:lnRef>
+        <a:fillRef idx="3">
+          <a:scrgbClr r="0" g="0" b="0"/>
+        </a:fillRef>
+        <a:effectRef idx="2">
+          <a:scrgbClr r="0" g="0" b="0"/>
+        </a:effectRef>
+        <a:fontRef idx="minor">
+          <a:schemeClr val="lt1"/>
+        </a:fontRef>
+      </dsp:style>
+      <dsp:txBody>
+        <a:bodyPr spcFirstLastPara="0" vert="horz" wrap="square" lIns="6350" tIns="6350" rIns="6350" bIns="6350" numCol="1" spcCol="1270" anchor="ctr" anchorCtr="0">
+          <a:noAutofit/>
+        </a:bodyPr>
+        <a:lstStyle/>
+        <a:p>
+          <a:pPr lvl="0" algn="ctr" defTabSz="444500">
+            <a:lnSpc>
+              <a:spcPct val="90000"/>
+            </a:lnSpc>
+            <a:spcBef>
+              <a:spcPct val="0"/>
+            </a:spcBef>
+            <a:spcAft>
+              <a:spcPct val="35000"/>
+            </a:spcAft>
+          </a:pPr>
+          <a:r>
+            <a:rPr lang="fr-FR" sz="1000" kern="1200" dirty="0" smtClean="0"/>
+            <a:t>…</a:t>
+          </a:r>
+          <a:endParaRPr lang="fr-FR" sz="1000" kern="1200" dirty="0"/>
+        </a:p>
+      </dsp:txBody>
+      <dsp:txXfrm>
+        <a:off x="8305581" y="4601241"/>
+        <a:ext cx="893322" cy="272354"/>
+      </dsp:txXfrm>
+    </dsp:sp>
+    <dsp:sp modelId="{D95C901E-1098-4296-B1C0-A32F05673786}">
+      <dsp:nvSpPr>
+        <dsp:cNvPr id="0" name=""/>
+        <dsp:cNvSpPr/>
+      </dsp:nvSpPr>
+      <dsp:spPr>
+        <a:xfrm>
+          <a:off x="6989717" y="4771462"/>
+          <a:ext cx="955578" cy="272354"/>
+        </a:xfrm>
+        <a:prstGeom prst="rect">
+          <a:avLst/>
+        </a:prstGeom>
+        <a:gradFill rotWithShape="0">
+          <a:gsLst>
+            <a:gs pos="0">
+              <a:schemeClr val="accent1">
+                <a:hueOff val="0"/>
+                <a:satOff val="0"/>
+                <a:lumOff val="0"/>
+                <a:alphaOff val="0"/>
+                <a:tint val="96000"/>
+                <a:lumMod val="104000"/>
+              </a:schemeClr>
+            </a:gs>
+            <a:gs pos="100000">
+              <a:schemeClr val="accent1">
+                <a:hueOff val="0"/>
+                <a:satOff val="0"/>
+                <a:lumOff val="0"/>
+                <a:alphaOff val="0"/>
+                <a:shade val="98000"/>
+                <a:lumMod val="94000"/>
+              </a:schemeClr>
+            </a:gs>
+          </a:gsLst>
+          <a:lin ang="5400000" scaled="0"/>
+        </a:gradFill>
+        <a:ln>
+          <a:noFill/>
+        </a:ln>
+        <a:effectLst>
+          <a:outerShdw blurRad="38100" dist="25400" dir="5400000" rotWithShape="0">
+            <a:srgbClr val="000000">
+              <a:alpha val="25000"/>
+            </a:srgbClr>
+          </a:outerShdw>
+        </a:effectLst>
+      </dsp:spPr>
+      <dsp:style>
+        <a:lnRef idx="0">
+          <a:scrgbClr r="0" g="0" b="0"/>
+        </a:lnRef>
+        <a:fillRef idx="3">
+          <a:scrgbClr r="0" g="0" b="0"/>
+        </a:fillRef>
+        <a:effectRef idx="2">
+          <a:scrgbClr r="0" g="0" b="0"/>
+        </a:effectRef>
+        <a:fontRef idx="minor">
+          <a:schemeClr val="lt1"/>
+        </a:fontRef>
+      </dsp:style>
+      <dsp:txBody>
+        <a:bodyPr spcFirstLastPara="0" vert="horz" wrap="square" lIns="6350" tIns="6350" rIns="6350" bIns="6350" numCol="1" spcCol="1270" anchor="ctr" anchorCtr="0">
+          <a:noAutofit/>
+        </a:bodyPr>
+        <a:lstStyle/>
+        <a:p>
+          <a:pPr lvl="0" algn="ctr" defTabSz="444500">
+            <a:lnSpc>
+              <a:spcPct val="90000"/>
+            </a:lnSpc>
+            <a:spcBef>
+              <a:spcPct val="0"/>
+            </a:spcBef>
+            <a:spcAft>
+              <a:spcPct val="35000"/>
+            </a:spcAft>
+          </a:pPr>
+          <a:r>
+            <a:rPr lang="fr-FR" sz="1000" kern="1200" dirty="0" smtClean="0"/>
+            <a:t>…</a:t>
+          </a:r>
+          <a:endParaRPr lang="fr-FR" sz="1000" kern="1200" dirty="0"/>
+        </a:p>
+      </dsp:txBody>
+      <dsp:txXfrm>
+        <a:off x="6989717" y="4771462"/>
+        <a:ext cx="955578" cy="272354"/>
       </dsp:txXfrm>
     </dsp:sp>
     <dsp:sp modelId="{536E7EEE-AE26-4F15-B7DF-40567D90432E}">
@@ -9051,8 +10309,8 @@
       </dsp:nvSpPr>
       <dsp:spPr>
         <a:xfrm>
-          <a:off x="4382720" y="4310010"/>
-          <a:ext cx="1077029" cy="328362"/>
+          <a:off x="4845743" y="4005466"/>
+          <a:ext cx="893322" cy="272354"/>
         </a:xfrm>
         <a:prstGeom prst="rect">
           <a:avLst/>
@@ -9132,8 +10390,8 @@
         </a:p>
       </dsp:txBody>
       <dsp:txXfrm>
-        <a:off x="4382720" y="4310010"/>
-        <a:ext cx="1077029" cy="328362"/>
+        <a:off x="4845743" y="4005466"/>
+        <a:ext cx="893322" cy="272354"/>
       </dsp:txXfrm>
     </dsp:sp>
     <dsp:sp modelId="{ADC4EBE8-08E2-4FE3-8945-6660CEF6994F}">
@@ -9143,8 +10401,8 @@
       </dsp:nvSpPr>
       <dsp:spPr>
         <a:xfrm>
-          <a:off x="4382720" y="4720464"/>
-          <a:ext cx="1077029" cy="328362"/>
+          <a:off x="4845743" y="4345909"/>
+          <a:ext cx="893322" cy="272354"/>
         </a:xfrm>
         <a:prstGeom prst="rect">
           <a:avLst/>
@@ -9224,8 +10482,8 @@
         </a:p>
       </dsp:txBody>
       <dsp:txXfrm>
-        <a:off x="4382720" y="4720464"/>
-        <a:ext cx="1077029" cy="328362"/>
+        <a:off x="4845743" y="4345909"/>
+        <a:ext cx="893322" cy="272354"/>
       </dsp:txXfrm>
     </dsp:sp>
   </dsp:spTree>
@@ -10671,7 +11929,7 @@
           <a:p>
             <a:fld id="{ADCD2C08-3C00-4791-9388-3FB9A56F87F8}" type="datetimeFigureOut">
               <a:rPr lang="fr-FR" smtClean="0"/>
-              <a:t>13/01/2018</a:t>
+              <a:t>14/01/2018</a:t>
             </a:fld>
             <a:endParaRPr lang="fr-FR"/>
           </a:p>
@@ -11211,7 +12469,7 @@
           <a:p>
             <a:fld id="{CAB5D9F6-764D-45E8-BA35-322ECA954888}" type="datetime1">
               <a:rPr lang="en-US" smtClean="0"/>
-              <a:t>1/13/2018</a:t>
+              <a:t>1/14/2018</a:t>
             </a:fld>
             <a:endParaRPr lang="en-US" dirty="0"/>
           </a:p>
@@ -11551,7 +12809,7 @@
           <a:p>
             <a:fld id="{7E62AF45-EF0A-4378-934F-84EB6BC3D026}" type="datetime1">
               <a:rPr lang="en-US" smtClean="0"/>
-              <a:t>1/13/2018</a:t>
+              <a:t>1/14/2018</a:t>
             </a:fld>
             <a:endParaRPr lang="en-US" dirty="0"/>
           </a:p>
@@ -11953,7 +13211,7 @@
           <a:p>
             <a:fld id="{76D4023A-E694-4331-A23E-E1356D15A4BD}" type="datetime1">
               <a:rPr lang="en-US" smtClean="0"/>
-              <a:t>1/13/2018</a:t>
+              <a:t>1/14/2018</a:t>
             </a:fld>
             <a:endParaRPr lang="en-US" dirty="0"/>
           </a:p>
@@ -12290,7 +13548,7 @@
           <a:p>
             <a:fld id="{D6F2E77E-7F60-441B-806F-66DDB3F74163}" type="datetime1">
               <a:rPr lang="en-US" smtClean="0"/>
-              <a:t>1/13/2018</a:t>
+              <a:t>1/14/2018</a:t>
             </a:fld>
             <a:endParaRPr lang="en-US" dirty="0"/>
           </a:p>
@@ -12611,7 +13869,7 @@
           <a:p>
             <a:fld id="{266B8AF4-4A0E-4A4E-9660-2094B624C07D}" type="datetime1">
               <a:rPr lang="en-US" smtClean="0"/>
-              <a:t>1/13/2018</a:t>
+              <a:t>1/14/2018</a:t>
             </a:fld>
             <a:endParaRPr lang="en-US" dirty="0"/>
           </a:p>
@@ -13008,7 +14266,7 @@
           <a:p>
             <a:fld id="{CB2BF7E3-4C05-4502-A416-452E6496AE59}" type="datetime1">
               <a:rPr lang="en-US" smtClean="0"/>
-              <a:t>1/13/2018</a:t>
+              <a:t>1/14/2018</a:t>
             </a:fld>
             <a:endParaRPr lang="en-US" dirty="0"/>
           </a:p>
@@ -13266,7 +14524,7 @@
           <a:p>
             <a:fld id="{F6F8AC83-13D2-4813-AD1A-CAFB5DEDD213}" type="datetime1">
               <a:rPr lang="en-US" smtClean="0"/>
-              <a:t>1/13/2018</a:t>
+              <a:t>1/14/2018</a:t>
             </a:fld>
             <a:endParaRPr lang="en-US" dirty="0"/>
           </a:p>
@@ -13529,7 +14787,7 @@
           <a:p>
             <a:fld id="{74455543-85E2-46E2-A974-7ADB0844C12A}" type="datetime1">
               <a:rPr lang="en-US" smtClean="0"/>
-              <a:t>1/13/2018</a:t>
+              <a:t>1/14/2018</a:t>
             </a:fld>
             <a:endParaRPr lang="en-US" dirty="0"/>
           </a:p>
@@ -14641,7 +15899,7 @@
           <a:p>
             <a:fld id="{086CC522-5229-4E69-BBB2-D5F912967395}" type="datetime1">
               <a:rPr lang="en-US" smtClean="0"/>
-              <a:t>1/13/2018</a:t>
+              <a:t>1/14/2018</a:t>
             </a:fld>
             <a:endParaRPr lang="en-US" dirty="0"/>
           </a:p>
@@ -14960,7 +16218,7 @@
           <a:p>
             <a:fld id="{56B9B5DB-1D1A-42F8-93F0-BBA44C1CAF57}" type="datetime1">
               <a:rPr lang="en-US" smtClean="0"/>
-              <a:t>1/13/2018</a:t>
+              <a:t>1/14/2018</a:t>
             </a:fld>
             <a:endParaRPr lang="en-US" dirty="0"/>
           </a:p>
@@ -15418,7 +16676,7 @@
           <a:p>
             <a:fld id="{9A4E8950-D3FA-4365-B561-9EE5AC9B6B6C}" type="datetime1">
               <a:rPr lang="en-US" smtClean="0"/>
-              <a:t>1/13/2018</a:t>
+              <a:t>1/14/2018</a:t>
             </a:fld>
             <a:endParaRPr lang="en-US" dirty="0"/>
           </a:p>
@@ -15624,7 +16882,7 @@
           <a:p>
             <a:fld id="{20724122-C579-4659-8A06-81F42FC84005}" type="datetime1">
               <a:rPr lang="en-US" smtClean="0"/>
-              <a:t>1/13/2018</a:t>
+              <a:t>1/14/2018</a:t>
             </a:fld>
             <a:endParaRPr lang="en-US" dirty="0"/>
           </a:p>
@@ -15802,7 +17060,7 @@
           <a:p>
             <a:fld id="{E4C13383-9243-41F6-8072-8685ED9DD899}" type="datetime1">
               <a:rPr lang="en-US" smtClean="0"/>
-              <a:t>1/13/2018</a:t>
+              <a:t>1/14/2018</a:t>
             </a:fld>
             <a:endParaRPr lang="en-US" dirty="0"/>
           </a:p>
@@ -16136,7 +17394,7 @@
           <a:p>
             <a:fld id="{03F027E6-328C-49ED-AE4B-BD647A7E3EDE}" type="datetime1">
               <a:rPr lang="en-US" smtClean="0"/>
-              <a:t>1/13/2018</a:t>
+              <a:t>1/14/2018</a:t>
             </a:fld>
             <a:endParaRPr lang="en-US" dirty="0"/>
           </a:p>
@@ -16482,7 +17740,7 @@
           <a:p>
             <a:fld id="{6B498982-A325-4B29-8B06-CBC7789C234F}" type="datetime1">
               <a:rPr lang="en-US" smtClean="0"/>
-              <a:t>1/13/2018</a:t>
+              <a:t>1/14/2018</a:t>
             </a:fld>
             <a:endParaRPr lang="en-US" dirty="0"/>
           </a:p>
@@ -18600,7 +19858,7 @@
           <a:p>
             <a:fld id="{CAB5D9F6-764D-45E8-BA35-322ECA954888}" type="datetime1">
               <a:rPr lang="en-US" smtClean="0"/>
-              <a:t>1/13/2018</a:t>
+              <a:t>1/14/2018</a:t>
             </a:fld>
             <a:endParaRPr lang="en-US" dirty="0"/>
           </a:p>
@@ -35645,14 +36903,14 @@
           <p:nvPr>
             <p:extLst>
               <p:ext uri="{D42A27DB-BD31-4B8C-83A1-F6EECF244321}">
-                <p14:modId xmlns:p14="http://schemas.microsoft.com/office/powerpoint/2010/main" val="4153887371"/>
+                <p14:modId xmlns:p14="http://schemas.microsoft.com/office/powerpoint/2010/main" val="1724223749"/>
               </p:ext>
             </p:extLst>
           </p:nvPr>
         </p:nvGraphicFramePr>
         <p:xfrm>
-          <a:off x="1383526" y="1463040"/>
-          <a:ext cx="10591137" cy="5049078"/>
+          <a:off x="674935" y="1407381"/>
+          <a:ext cx="11283827" cy="5049078"/>
         </p:xfrm>
         <a:graphic>
           <a:graphicData uri="http://schemas.openxmlformats.org/drawingml/2006/diagram">
@@ -35668,7 +36926,7 @@
         </p:nvSpPr>
         <p:spPr>
           <a:xfrm>
-            <a:off x="2278849" y="1344135"/>
+            <a:off x="2592925" y="1264555"/>
             <a:ext cx="1168842" cy="437322"/>
           </a:xfrm>
           <a:prstGeom prst="wedgeEllipseCallout">
@@ -35734,7 +36992,7 @@
         </p:nvSpPr>
         <p:spPr>
           <a:xfrm>
-            <a:off x="1452712" y="2745456"/>
+            <a:off x="1913888" y="2405568"/>
             <a:ext cx="1140213" cy="437322"/>
           </a:xfrm>
           <a:prstGeom prst="wedgeEllipseCallout">
@@ -35800,7 +37058,7 @@
         </p:nvSpPr>
         <p:spPr>
           <a:xfrm>
-            <a:off x="7601446" y="2182931"/>
+            <a:off x="7108466" y="1905000"/>
             <a:ext cx="1311965" cy="437322"/>
           </a:xfrm>
           <a:prstGeom prst="wedgeEllipseCallout">
@@ -35846,7 +37104,7 @@
         </p:nvSpPr>
         <p:spPr>
           <a:xfrm>
-            <a:off x="10035870" y="3550257"/>
+            <a:off x="9511084" y="3081130"/>
             <a:ext cx="1311965" cy="437322"/>
           </a:xfrm>
           <a:prstGeom prst="wedgeEllipseCallout">
@@ -36997,18 +38255,7 @@
                 </a:solidFill>
                 <a:hlinkClick r:id="rId9"/>
               </a:rPr>
-              <a:t>Slice </a:t>
-            </a:r>
-            <a:r>
-              <a:rPr lang="fr-FR" sz="1200" b="1" dirty="0" smtClean="0">
-                <a:solidFill>
-                  <a:schemeClr val="accent6">
-                    <a:lumMod val="75000"/>
-                  </a:schemeClr>
-                </a:solidFill>
-                <a:hlinkClick r:id="rId9"/>
-              </a:rPr>
-              <a:t>Tricks</a:t>
+              <a:t>Slice Tricks</a:t>
             </a:r>
             <a:r>
               <a:rPr lang="fr-FR" sz="1200" b="1" dirty="0" smtClean="0">

</xml_diff>